<commit_message>
statistical tests for time series
</commit_message>
<xml_diff>
--- a/reports/Workflows.pptx
+++ b/reports/Workflows.pptx
@@ -243,7 +243,7 @@
           <a:p>
             <a:fld id="{A3B5D608-C030-4241-9E24-B3771303628F}" type="datetimeFigureOut">
               <a:rPr lang="en-CA" smtClean="0"/>
-              <a:t>2021-05-22</a:t>
+              <a:t>2021-05-28</a:t>
             </a:fld>
             <a:endParaRPr lang="en-CA"/>
           </a:p>
@@ -413,7 +413,7 @@
           <a:p>
             <a:fld id="{A3B5D608-C030-4241-9E24-B3771303628F}" type="datetimeFigureOut">
               <a:rPr lang="en-CA" smtClean="0"/>
-              <a:t>2021-05-22</a:t>
+              <a:t>2021-05-28</a:t>
             </a:fld>
             <a:endParaRPr lang="en-CA"/>
           </a:p>
@@ -593,7 +593,7 @@
           <a:p>
             <a:fld id="{A3B5D608-C030-4241-9E24-B3771303628F}" type="datetimeFigureOut">
               <a:rPr lang="en-CA" smtClean="0"/>
-              <a:t>2021-05-22</a:t>
+              <a:t>2021-05-28</a:t>
             </a:fld>
             <a:endParaRPr lang="en-CA"/>
           </a:p>
@@ -763,7 +763,7 @@
           <a:p>
             <a:fld id="{A3B5D608-C030-4241-9E24-B3771303628F}" type="datetimeFigureOut">
               <a:rPr lang="en-CA" smtClean="0"/>
-              <a:t>2021-05-22</a:t>
+              <a:t>2021-05-28</a:t>
             </a:fld>
             <a:endParaRPr lang="en-CA"/>
           </a:p>
@@ -1007,7 +1007,7 @@
           <a:p>
             <a:fld id="{A3B5D608-C030-4241-9E24-B3771303628F}" type="datetimeFigureOut">
               <a:rPr lang="en-CA" smtClean="0"/>
-              <a:t>2021-05-22</a:t>
+              <a:t>2021-05-28</a:t>
             </a:fld>
             <a:endParaRPr lang="en-CA"/>
           </a:p>
@@ -1239,7 +1239,7 @@
           <a:p>
             <a:fld id="{A3B5D608-C030-4241-9E24-B3771303628F}" type="datetimeFigureOut">
               <a:rPr lang="en-CA" smtClean="0"/>
-              <a:t>2021-05-22</a:t>
+              <a:t>2021-05-28</a:t>
             </a:fld>
             <a:endParaRPr lang="en-CA"/>
           </a:p>
@@ -1606,7 +1606,7 @@
           <a:p>
             <a:fld id="{A3B5D608-C030-4241-9E24-B3771303628F}" type="datetimeFigureOut">
               <a:rPr lang="en-CA" smtClean="0"/>
-              <a:t>2021-05-22</a:t>
+              <a:t>2021-05-28</a:t>
             </a:fld>
             <a:endParaRPr lang="en-CA"/>
           </a:p>
@@ -1724,7 +1724,7 @@
           <a:p>
             <a:fld id="{A3B5D608-C030-4241-9E24-B3771303628F}" type="datetimeFigureOut">
               <a:rPr lang="en-CA" smtClean="0"/>
-              <a:t>2021-05-22</a:t>
+              <a:t>2021-05-28</a:t>
             </a:fld>
             <a:endParaRPr lang="en-CA"/>
           </a:p>
@@ -1819,7 +1819,7 @@
           <a:p>
             <a:fld id="{A3B5D608-C030-4241-9E24-B3771303628F}" type="datetimeFigureOut">
               <a:rPr lang="en-CA" smtClean="0"/>
-              <a:t>2021-05-22</a:t>
+              <a:t>2021-05-28</a:t>
             </a:fld>
             <a:endParaRPr lang="en-CA"/>
           </a:p>
@@ -2096,7 +2096,7 @@
           <a:p>
             <a:fld id="{A3B5D608-C030-4241-9E24-B3771303628F}" type="datetimeFigureOut">
               <a:rPr lang="en-CA" smtClean="0"/>
-              <a:t>2021-05-22</a:t>
+              <a:t>2021-05-28</a:t>
             </a:fld>
             <a:endParaRPr lang="en-CA"/>
           </a:p>
@@ -2353,7 +2353,7 @@
           <a:p>
             <a:fld id="{A3B5D608-C030-4241-9E24-B3771303628F}" type="datetimeFigureOut">
               <a:rPr lang="en-CA" smtClean="0"/>
-              <a:t>2021-05-22</a:t>
+              <a:t>2021-05-28</a:t>
             </a:fld>
             <a:endParaRPr lang="en-CA"/>
           </a:p>
@@ -2566,7 +2566,7 @@
           <a:p>
             <a:fld id="{A3B5D608-C030-4241-9E24-B3771303628F}" type="datetimeFigureOut">
               <a:rPr lang="en-CA" smtClean="0"/>
-              <a:t>2021-05-22</a:t>
+              <a:t>2021-05-28</a:t>
             </a:fld>
             <a:endParaRPr lang="en-CA"/>
           </a:p>
@@ -2971,1414 +2971,6 @@
           <a:chExt cx="0" cy="0"/>
         </a:xfrm>
       </p:grpSpPr>
-      <p:sp>
-        <p:nvSpPr>
-          <p:cNvPr id="4" name="Rectangle 3">
-            <a:extLst>
-              <a:ext uri="{FF2B5EF4-FFF2-40B4-BE49-F238E27FC236}">
-                <a16:creationId xmlns:a16="http://schemas.microsoft.com/office/drawing/2014/main" id="{C7CA1EAE-F2FE-4FCF-8F3F-7BB212FCD34F}"/>
-              </a:ext>
-            </a:extLst>
-          </p:cNvPr>
-          <p:cNvSpPr/>
-          <p:nvPr/>
-        </p:nvSpPr>
-        <p:spPr>
-          <a:xfrm>
-            <a:off x="2206003" y="225926"/>
-            <a:ext cx="1199708" cy="583726"/>
-          </a:xfrm>
-          <a:prstGeom prst="rect">
-            <a:avLst/>
-          </a:prstGeom>
-          <a:solidFill>
-            <a:schemeClr val="accent6">
-              <a:lumMod val="20000"/>
-              <a:lumOff val="80000"/>
-            </a:schemeClr>
-          </a:solidFill>
-          <a:ln w="9525" cap="flat" cmpd="sng" algn="ctr">
-            <a:solidFill>
-              <a:schemeClr val="bg1"/>
-            </a:solidFill>
-            <a:prstDash val="solid"/>
-            <a:round/>
-            <a:headEnd type="none" w="med" len="med"/>
-            <a:tailEnd type="none" w="med" len="med"/>
-          </a:ln>
-        </p:spPr>
-        <p:style>
-          <a:lnRef idx="0">
-            <a:scrgbClr r="0" g="0" b="0"/>
-          </a:lnRef>
-          <a:fillRef idx="0">
-            <a:scrgbClr r="0" g="0" b="0"/>
-          </a:fillRef>
-          <a:effectRef idx="0">
-            <a:scrgbClr r="0" g="0" b="0"/>
-          </a:effectRef>
-          <a:fontRef idx="minor">
-            <a:schemeClr val="dk1"/>
-          </a:fontRef>
-        </p:style>
-        <p:txBody>
-          <a:bodyPr rot="0" spcFirstLastPara="0" vertOverflow="overflow" horzOverflow="overflow" vert="horz" wrap="square" lIns="68580" tIns="34290" rIns="68580" bIns="34290" numCol="1" spcCol="0" rtlCol="0" fromWordArt="0" anchor="ctr" anchorCtr="0" forceAA="0" compatLnSpc="1">
-            <a:prstTxWarp prst="textNoShape">
-              <a:avLst/>
-            </a:prstTxWarp>
-            <a:noAutofit/>
-          </a:bodyPr>
-          <a:lstStyle/>
-          <a:p>
-            <a:pPr algn="ctr"/>
-            <a:r>
-              <a:rPr lang="en-CA" sz="1200" dirty="0"/>
-              <a:t>US Census Bureau</a:t>
-            </a:r>
-          </a:p>
-        </p:txBody>
-      </p:sp>
-      <p:sp>
-        <p:nvSpPr>
-          <p:cNvPr id="5" name="Rectangle 4">
-            <a:extLst>
-              <a:ext uri="{FF2B5EF4-FFF2-40B4-BE49-F238E27FC236}">
-                <a16:creationId xmlns:a16="http://schemas.microsoft.com/office/drawing/2014/main" id="{AD68BA15-4457-4F0A-8BBA-23F75E31CFD5}"/>
-              </a:ext>
-            </a:extLst>
-          </p:cNvPr>
-          <p:cNvSpPr/>
-          <p:nvPr/>
-        </p:nvSpPr>
-        <p:spPr>
-          <a:xfrm>
-            <a:off x="647734" y="227125"/>
-            <a:ext cx="1044785" cy="583726"/>
-          </a:xfrm>
-          <a:prstGeom prst="rect">
-            <a:avLst/>
-          </a:prstGeom>
-          <a:pattFill prst="wdUpDiag">
-            <a:fgClr>
-              <a:schemeClr val="accent6">
-                <a:lumMod val="40000"/>
-                <a:lumOff val="60000"/>
-              </a:schemeClr>
-            </a:fgClr>
-            <a:bgClr>
-              <a:schemeClr val="bg1"/>
-            </a:bgClr>
-          </a:pattFill>
-          <a:ln w="9525" cap="flat" cmpd="sng" algn="ctr">
-            <a:solidFill>
-              <a:schemeClr val="bg1"/>
-            </a:solidFill>
-            <a:prstDash val="solid"/>
-            <a:round/>
-            <a:headEnd type="none" w="med" len="med"/>
-            <a:tailEnd type="none" w="med" len="med"/>
-          </a:ln>
-        </p:spPr>
-        <p:style>
-          <a:lnRef idx="0">
-            <a:scrgbClr r="0" g="0" b="0"/>
-          </a:lnRef>
-          <a:fillRef idx="0">
-            <a:scrgbClr r="0" g="0" b="0"/>
-          </a:fillRef>
-          <a:effectRef idx="0">
-            <a:scrgbClr r="0" g="0" b="0"/>
-          </a:effectRef>
-          <a:fontRef idx="minor">
-            <a:schemeClr val="dk1"/>
-          </a:fontRef>
-        </p:style>
-        <p:txBody>
-          <a:bodyPr rot="0" spcFirstLastPara="0" vertOverflow="overflow" horzOverflow="overflow" vert="horz" wrap="square" lIns="68580" tIns="34290" rIns="68580" bIns="34290" numCol="1" spcCol="0" rtlCol="0" fromWordArt="0" anchor="ctr" anchorCtr="0" forceAA="0" compatLnSpc="1">
-            <a:prstTxWarp prst="textNoShape">
-              <a:avLst/>
-            </a:prstTxWarp>
-            <a:noAutofit/>
-          </a:bodyPr>
-          <a:lstStyle/>
-          <a:p>
-            <a:pPr algn="ctr"/>
-            <a:r>
-              <a:rPr lang="en-CA" sz="1200" b="1" dirty="0"/>
-              <a:t>Data Sources</a:t>
-            </a:r>
-          </a:p>
-        </p:txBody>
-      </p:sp>
-      <p:sp>
-        <p:nvSpPr>
-          <p:cNvPr id="6" name="Rectangle 5">
-            <a:extLst>
-              <a:ext uri="{FF2B5EF4-FFF2-40B4-BE49-F238E27FC236}">
-                <a16:creationId xmlns:a16="http://schemas.microsoft.com/office/drawing/2014/main" id="{122144FC-E34E-4222-B196-60E52A169969}"/>
-              </a:ext>
-            </a:extLst>
-          </p:cNvPr>
-          <p:cNvSpPr/>
-          <p:nvPr/>
-        </p:nvSpPr>
-        <p:spPr>
-          <a:xfrm>
-            <a:off x="5105881" y="258114"/>
-            <a:ext cx="1266896" cy="583726"/>
-          </a:xfrm>
-          <a:prstGeom prst="rect">
-            <a:avLst/>
-          </a:prstGeom>
-          <a:solidFill>
-            <a:schemeClr val="accent6">
-              <a:lumMod val="20000"/>
-              <a:lumOff val="80000"/>
-            </a:schemeClr>
-          </a:solidFill>
-          <a:ln w="9525" cap="flat" cmpd="sng" algn="ctr">
-            <a:solidFill>
-              <a:schemeClr val="bg1"/>
-            </a:solidFill>
-            <a:prstDash val="solid"/>
-            <a:round/>
-            <a:headEnd type="none" w="med" len="med"/>
-            <a:tailEnd type="none" w="med" len="med"/>
-          </a:ln>
-        </p:spPr>
-        <p:style>
-          <a:lnRef idx="0">
-            <a:scrgbClr r="0" g="0" b="0"/>
-          </a:lnRef>
-          <a:fillRef idx="0">
-            <a:scrgbClr r="0" g="0" b="0"/>
-          </a:fillRef>
-          <a:effectRef idx="0">
-            <a:scrgbClr r="0" g="0" b="0"/>
-          </a:effectRef>
-          <a:fontRef idx="minor">
-            <a:schemeClr val="dk1"/>
-          </a:fontRef>
-        </p:style>
-        <p:txBody>
-          <a:bodyPr rot="0" spcFirstLastPara="0" vertOverflow="overflow" horzOverflow="overflow" vert="horz" wrap="square" lIns="68580" tIns="34290" rIns="68580" bIns="34290" numCol="1" spcCol="0" rtlCol="0" fromWordArt="0" anchor="ctr" anchorCtr="0" forceAA="0" compatLnSpc="1">
-            <a:prstTxWarp prst="textNoShape">
-              <a:avLst/>
-            </a:prstTxWarp>
-            <a:noAutofit/>
-          </a:bodyPr>
-          <a:lstStyle/>
-          <a:p>
-            <a:pPr algn="ctr"/>
-            <a:r>
-              <a:rPr lang="en-CA" sz="1200" dirty="0"/>
-              <a:t>Twitter API v2</a:t>
-            </a:r>
-          </a:p>
-        </p:txBody>
-      </p:sp>
-      <p:sp>
-        <p:nvSpPr>
-          <p:cNvPr id="7" name="Rectangle 6">
-            <a:extLst>
-              <a:ext uri="{FF2B5EF4-FFF2-40B4-BE49-F238E27FC236}">
-                <a16:creationId xmlns:a16="http://schemas.microsoft.com/office/drawing/2014/main" id="{445CB879-D72A-4818-A390-92A2B62389DB}"/>
-              </a:ext>
-            </a:extLst>
-          </p:cNvPr>
-          <p:cNvSpPr/>
-          <p:nvPr/>
-        </p:nvSpPr>
-        <p:spPr>
-          <a:xfrm>
-            <a:off x="647735" y="1158784"/>
-            <a:ext cx="1044785" cy="583726"/>
-          </a:xfrm>
-          <a:prstGeom prst="rect">
-            <a:avLst/>
-          </a:prstGeom>
-          <a:pattFill prst="wdUpDiag">
-            <a:fgClr>
-              <a:srgbClr val="FBE5D6"/>
-            </a:fgClr>
-            <a:bgClr>
-              <a:schemeClr val="bg1"/>
-            </a:bgClr>
-          </a:pattFill>
-          <a:ln w="9525" cap="flat" cmpd="sng" algn="ctr">
-            <a:solidFill>
-              <a:schemeClr val="bg1"/>
-            </a:solidFill>
-            <a:prstDash val="solid"/>
-            <a:round/>
-            <a:headEnd type="none" w="med" len="med"/>
-            <a:tailEnd type="none" w="med" len="med"/>
-          </a:ln>
-        </p:spPr>
-        <p:style>
-          <a:lnRef idx="0">
-            <a:scrgbClr r="0" g="0" b="0"/>
-          </a:lnRef>
-          <a:fillRef idx="0">
-            <a:scrgbClr r="0" g="0" b="0"/>
-          </a:fillRef>
-          <a:effectRef idx="0">
-            <a:scrgbClr r="0" g="0" b="0"/>
-          </a:effectRef>
-          <a:fontRef idx="minor">
-            <a:schemeClr val="dk1"/>
-          </a:fontRef>
-        </p:style>
-        <p:txBody>
-          <a:bodyPr rot="0" spcFirstLastPara="0" vertOverflow="overflow" horzOverflow="overflow" vert="horz" wrap="square" lIns="68580" tIns="34290" rIns="68580" bIns="34290" numCol="1" spcCol="0" rtlCol="0" fromWordArt="0" anchor="ctr" anchorCtr="0" forceAA="0" compatLnSpc="1">
-            <a:prstTxWarp prst="textNoShape">
-              <a:avLst/>
-            </a:prstTxWarp>
-            <a:noAutofit/>
-          </a:bodyPr>
-          <a:lstStyle/>
-          <a:p>
-            <a:pPr algn="ctr"/>
-            <a:r>
-              <a:rPr lang="en-CA" sz="1200" b="1" dirty="0"/>
-              <a:t>Data Collection</a:t>
-            </a:r>
-          </a:p>
-        </p:txBody>
-      </p:sp>
-      <p:sp>
-        <p:nvSpPr>
-          <p:cNvPr id="8" name="Rectangle 7">
-            <a:extLst>
-              <a:ext uri="{FF2B5EF4-FFF2-40B4-BE49-F238E27FC236}">
-                <a16:creationId xmlns:a16="http://schemas.microsoft.com/office/drawing/2014/main" id="{EF7FB864-459E-4A84-BA70-C06FDF340E77}"/>
-              </a:ext>
-            </a:extLst>
-          </p:cNvPr>
-          <p:cNvSpPr/>
-          <p:nvPr/>
-        </p:nvSpPr>
-        <p:spPr>
-          <a:xfrm>
-            <a:off x="2204966" y="1158786"/>
-            <a:ext cx="1199708" cy="583726"/>
-          </a:xfrm>
-          <a:prstGeom prst="rect">
-            <a:avLst/>
-          </a:prstGeom>
-          <a:solidFill>
-            <a:schemeClr val="accent2">
-              <a:lumMod val="20000"/>
-              <a:lumOff val="80000"/>
-            </a:schemeClr>
-          </a:solidFill>
-          <a:ln w="9525" cap="flat" cmpd="sng" algn="ctr">
-            <a:solidFill>
-              <a:schemeClr val="bg1"/>
-            </a:solidFill>
-            <a:prstDash val="solid"/>
-            <a:round/>
-            <a:headEnd type="none" w="med" len="med"/>
-            <a:tailEnd type="none" w="med" len="med"/>
-          </a:ln>
-        </p:spPr>
-        <p:style>
-          <a:lnRef idx="0">
-            <a:scrgbClr r="0" g="0" b="0"/>
-          </a:lnRef>
-          <a:fillRef idx="0">
-            <a:scrgbClr r="0" g="0" b="0"/>
-          </a:fillRef>
-          <a:effectRef idx="0">
-            <a:scrgbClr r="0" g="0" b="0"/>
-          </a:effectRef>
-          <a:fontRef idx="minor">
-            <a:schemeClr val="dk1"/>
-          </a:fontRef>
-        </p:style>
-        <p:txBody>
-          <a:bodyPr rot="0" spcFirstLastPara="0" vertOverflow="overflow" horzOverflow="overflow" vert="horz" wrap="square" lIns="68580" tIns="34290" rIns="68580" bIns="34290" numCol="1" spcCol="0" rtlCol="0" fromWordArt="0" anchor="ctr" anchorCtr="0" forceAA="0" compatLnSpc="1">
-            <a:prstTxWarp prst="textNoShape">
-              <a:avLst/>
-            </a:prstTxWarp>
-            <a:noAutofit/>
-          </a:bodyPr>
-          <a:lstStyle/>
-          <a:p>
-            <a:pPr algn="ctr"/>
-            <a:r>
-              <a:rPr lang="en-CA" sz="1200" dirty="0"/>
-              <a:t>2016 county shapes and demographics</a:t>
-            </a:r>
-          </a:p>
-        </p:txBody>
-      </p:sp>
-      <p:sp>
-        <p:nvSpPr>
-          <p:cNvPr id="9" name="Rectangle 8">
-            <a:extLst>
-              <a:ext uri="{FF2B5EF4-FFF2-40B4-BE49-F238E27FC236}">
-                <a16:creationId xmlns:a16="http://schemas.microsoft.com/office/drawing/2014/main" id="{CD220FE3-63D0-4256-9E75-66BD93A73799}"/>
-              </a:ext>
-            </a:extLst>
-          </p:cNvPr>
-          <p:cNvSpPr/>
-          <p:nvPr/>
-        </p:nvSpPr>
-        <p:spPr>
-          <a:xfrm>
-            <a:off x="3973487" y="1160653"/>
-            <a:ext cx="1726489" cy="583726"/>
-          </a:xfrm>
-          <a:prstGeom prst="rect">
-            <a:avLst/>
-          </a:prstGeom>
-          <a:solidFill>
-            <a:schemeClr val="accent2">
-              <a:lumMod val="20000"/>
-              <a:lumOff val="80000"/>
-            </a:schemeClr>
-          </a:solidFill>
-          <a:ln w="9525" cap="flat" cmpd="sng" algn="ctr">
-            <a:solidFill>
-              <a:schemeClr val="bg1"/>
-            </a:solidFill>
-            <a:prstDash val="solid"/>
-            <a:round/>
-            <a:headEnd type="none" w="med" len="med"/>
-            <a:tailEnd type="none" w="med" len="med"/>
-          </a:ln>
-        </p:spPr>
-        <p:style>
-          <a:lnRef idx="0">
-            <a:scrgbClr r="0" g="0" b="0"/>
-          </a:lnRef>
-          <a:fillRef idx="0">
-            <a:scrgbClr r="0" g="0" b="0"/>
-          </a:fillRef>
-          <a:effectRef idx="0">
-            <a:scrgbClr r="0" g="0" b="0"/>
-          </a:effectRef>
-          <a:fontRef idx="minor">
-            <a:schemeClr val="dk1"/>
-          </a:fontRef>
-        </p:style>
-        <p:txBody>
-          <a:bodyPr rot="0" spcFirstLastPara="0" vertOverflow="overflow" horzOverflow="overflow" vert="horz" wrap="square" lIns="68580" tIns="34290" rIns="68580" bIns="34290" numCol="1" spcCol="0" rtlCol="0" fromWordArt="0" anchor="ctr" anchorCtr="0" forceAA="0" compatLnSpc="1">
-            <a:prstTxWarp prst="textNoShape">
-              <a:avLst/>
-            </a:prstTxWarp>
-            <a:noAutofit/>
-          </a:bodyPr>
-          <a:lstStyle/>
-          <a:p>
-            <a:pPr algn="ctr"/>
-            <a:r>
-              <a:rPr lang="en-CA" sz="1200" dirty="0"/>
-              <a:t>Geo-located social media posts and geo-located physical protests</a:t>
-            </a:r>
-          </a:p>
-        </p:txBody>
-      </p:sp>
-      <p:sp>
-        <p:nvSpPr>
-          <p:cNvPr id="11" name="Rectangle 10">
-            <a:extLst>
-              <a:ext uri="{FF2B5EF4-FFF2-40B4-BE49-F238E27FC236}">
-                <a16:creationId xmlns:a16="http://schemas.microsoft.com/office/drawing/2014/main" id="{03C10606-6984-42A5-B9FC-D33DFFEC5C73}"/>
-              </a:ext>
-            </a:extLst>
-          </p:cNvPr>
-          <p:cNvSpPr/>
-          <p:nvPr/>
-        </p:nvSpPr>
-        <p:spPr>
-          <a:xfrm>
-            <a:off x="8194847" y="224311"/>
-            <a:ext cx="825357" cy="583726"/>
-          </a:xfrm>
-          <a:prstGeom prst="rect">
-            <a:avLst/>
-          </a:prstGeom>
-          <a:solidFill>
-            <a:schemeClr val="bg2"/>
-          </a:solidFill>
-          <a:ln w="9525" cap="flat" cmpd="sng" algn="ctr">
-            <a:solidFill>
-              <a:schemeClr val="bg1"/>
-            </a:solidFill>
-            <a:prstDash val="solid"/>
-            <a:round/>
-            <a:headEnd type="none" w="med" len="med"/>
-            <a:tailEnd type="none" w="med" len="med"/>
-          </a:ln>
-        </p:spPr>
-        <p:style>
-          <a:lnRef idx="0">
-            <a:scrgbClr r="0" g="0" b="0"/>
-          </a:lnRef>
-          <a:fillRef idx="0">
-            <a:scrgbClr r="0" g="0" b="0"/>
-          </a:fillRef>
-          <a:effectRef idx="0">
-            <a:scrgbClr r="0" g="0" b="0"/>
-          </a:effectRef>
-          <a:fontRef idx="minor">
-            <a:schemeClr val="dk1"/>
-          </a:fontRef>
-        </p:style>
-        <p:txBody>
-          <a:bodyPr rot="0" spcFirstLastPara="0" vertOverflow="overflow" horzOverflow="overflow" vert="horz" wrap="square" lIns="68580" tIns="34290" rIns="68580" bIns="34290" numCol="1" spcCol="0" rtlCol="0" fromWordArt="0" anchor="ctr" anchorCtr="0" forceAA="0" compatLnSpc="1">
-            <a:prstTxWarp prst="textNoShape">
-              <a:avLst/>
-            </a:prstTxWarp>
-            <a:noAutofit/>
-          </a:bodyPr>
-          <a:lstStyle/>
-          <a:p>
-            <a:pPr algn="ctr"/>
-            <a:r>
-              <a:rPr lang="en-CA" sz="1200" dirty="0"/>
-              <a:t>Web scraping</a:t>
-            </a:r>
-          </a:p>
-        </p:txBody>
-      </p:sp>
-      <p:cxnSp>
-        <p:nvCxnSpPr>
-          <p:cNvPr id="13" name="Connector: Elbow 12">
-            <a:extLst>
-              <a:ext uri="{FF2B5EF4-FFF2-40B4-BE49-F238E27FC236}">
-                <a16:creationId xmlns:a16="http://schemas.microsoft.com/office/drawing/2014/main" id="{AF456EB8-CEDA-4D1E-A3A8-FD51A3D258A4}"/>
-              </a:ext>
-            </a:extLst>
-          </p:cNvPr>
-          <p:cNvCxnSpPr>
-            <a:cxnSpLocks/>
-            <a:stCxn id="11" idx="1"/>
-            <a:endCxn id="35" idx="3"/>
-          </p:cNvCxnSpPr>
-          <p:nvPr/>
-        </p:nvCxnSpPr>
-        <p:spPr>
-          <a:xfrm rot="10800000" flipV="1">
-            <a:off x="7852531" y="516174"/>
-            <a:ext cx="342317" cy="888"/>
-          </a:xfrm>
-          <a:prstGeom prst="bentConnector3">
-            <a:avLst>
-              <a:gd name="adj1" fmla="val 50000"/>
-            </a:avLst>
-          </a:prstGeom>
-          <a:ln w="28575">
-            <a:tailEnd type="triangle"/>
-          </a:ln>
-        </p:spPr>
-        <p:style>
-          <a:lnRef idx="1">
-            <a:schemeClr val="dk1"/>
-          </a:lnRef>
-          <a:fillRef idx="0">
-            <a:schemeClr val="dk1"/>
-          </a:fillRef>
-          <a:effectRef idx="0">
-            <a:schemeClr val="dk1"/>
-          </a:effectRef>
-          <a:fontRef idx="minor">
-            <a:schemeClr val="tx1"/>
-          </a:fontRef>
-        </p:style>
-      </p:cxnSp>
-      <p:cxnSp>
-        <p:nvCxnSpPr>
-          <p:cNvPr id="21" name="Connector: Elbow 20">
-            <a:extLst>
-              <a:ext uri="{FF2B5EF4-FFF2-40B4-BE49-F238E27FC236}">
-                <a16:creationId xmlns:a16="http://schemas.microsoft.com/office/drawing/2014/main" id="{54E7344E-A942-4749-9841-5C240E9DB90D}"/>
-              </a:ext>
-            </a:extLst>
-          </p:cNvPr>
-          <p:cNvCxnSpPr>
-            <a:cxnSpLocks/>
-            <a:stCxn id="4" idx="2"/>
-            <a:endCxn id="8" idx="0"/>
-          </p:cNvCxnSpPr>
-          <p:nvPr/>
-        </p:nvCxnSpPr>
-        <p:spPr>
-          <a:xfrm rot="5400000">
-            <a:off x="2630772" y="983701"/>
-            <a:ext cx="349134" cy="1037"/>
-          </a:xfrm>
-          <a:prstGeom prst="bentConnector3">
-            <a:avLst>
-              <a:gd name="adj1" fmla="val 50000"/>
-            </a:avLst>
-          </a:prstGeom>
-          <a:ln w="28575">
-            <a:tailEnd type="triangle"/>
-          </a:ln>
-        </p:spPr>
-        <p:style>
-          <a:lnRef idx="1">
-            <a:schemeClr val="dk1"/>
-          </a:lnRef>
-          <a:fillRef idx="0">
-            <a:schemeClr val="dk1"/>
-          </a:fillRef>
-          <a:effectRef idx="0">
-            <a:schemeClr val="dk1"/>
-          </a:effectRef>
-          <a:fontRef idx="minor">
-            <a:schemeClr val="tx1"/>
-          </a:fontRef>
-        </p:style>
-      </p:cxnSp>
-      <p:sp>
-        <p:nvSpPr>
-          <p:cNvPr id="28" name="Rectangle 27">
-            <a:extLst>
-              <a:ext uri="{FF2B5EF4-FFF2-40B4-BE49-F238E27FC236}">
-                <a16:creationId xmlns:a16="http://schemas.microsoft.com/office/drawing/2014/main" id="{D46CBF6C-0F69-42B5-9136-E8BBE0C91B76}"/>
-              </a:ext>
-            </a:extLst>
-          </p:cNvPr>
-          <p:cNvSpPr/>
-          <p:nvPr/>
-        </p:nvSpPr>
-        <p:spPr>
-          <a:xfrm>
-            <a:off x="647735" y="2113020"/>
-            <a:ext cx="1044785" cy="583726"/>
-          </a:xfrm>
-          <a:prstGeom prst="rect">
-            <a:avLst/>
-          </a:prstGeom>
-          <a:pattFill prst="wdUpDiag">
-            <a:fgClr>
-              <a:srgbClr val="FFF2CC"/>
-            </a:fgClr>
-            <a:bgClr>
-              <a:schemeClr val="bg1"/>
-            </a:bgClr>
-          </a:pattFill>
-          <a:ln w="9525" cap="flat" cmpd="sng" algn="ctr">
-            <a:solidFill>
-              <a:schemeClr val="bg1"/>
-            </a:solidFill>
-            <a:prstDash val="solid"/>
-            <a:round/>
-            <a:headEnd type="none" w="med" len="med"/>
-            <a:tailEnd type="none" w="med" len="med"/>
-          </a:ln>
-        </p:spPr>
-        <p:style>
-          <a:lnRef idx="0">
-            <a:scrgbClr r="0" g="0" b="0"/>
-          </a:lnRef>
-          <a:fillRef idx="0">
-            <a:scrgbClr r="0" g="0" b="0"/>
-          </a:fillRef>
-          <a:effectRef idx="0">
-            <a:scrgbClr r="0" g="0" b="0"/>
-          </a:effectRef>
-          <a:fontRef idx="minor">
-            <a:schemeClr val="dk1"/>
-          </a:fontRef>
-        </p:style>
-        <p:txBody>
-          <a:bodyPr rot="0" spcFirstLastPara="0" vertOverflow="overflow" horzOverflow="overflow" vert="horz" wrap="square" lIns="68580" tIns="34290" rIns="68580" bIns="34290" numCol="1" spcCol="0" rtlCol="0" fromWordArt="0" anchor="ctr" anchorCtr="0" forceAA="0" compatLnSpc="1">
-            <a:prstTxWarp prst="textNoShape">
-              <a:avLst/>
-            </a:prstTxWarp>
-            <a:noAutofit/>
-          </a:bodyPr>
-          <a:lstStyle/>
-          <a:p>
-            <a:pPr algn="ctr"/>
-            <a:r>
-              <a:rPr lang="en-CA" sz="1200" b="1" dirty="0"/>
-              <a:t>Data Preprocessing</a:t>
-            </a:r>
-          </a:p>
-        </p:txBody>
-      </p:sp>
-      <p:sp>
-        <p:nvSpPr>
-          <p:cNvPr id="29" name="Rectangle 28">
-            <a:extLst>
-              <a:ext uri="{FF2B5EF4-FFF2-40B4-BE49-F238E27FC236}">
-                <a16:creationId xmlns:a16="http://schemas.microsoft.com/office/drawing/2014/main" id="{4D226B93-BC10-4BB8-83B0-4840C08259AA}"/>
-              </a:ext>
-            </a:extLst>
-          </p:cNvPr>
-          <p:cNvSpPr/>
-          <p:nvPr/>
-        </p:nvSpPr>
-        <p:spPr>
-          <a:xfrm>
-            <a:off x="1849117" y="2096422"/>
-            <a:ext cx="1904725" cy="619587"/>
-          </a:xfrm>
-          <a:prstGeom prst="rect">
-            <a:avLst/>
-          </a:prstGeom>
-          <a:solidFill>
-            <a:schemeClr val="accent4">
-              <a:lumMod val="20000"/>
-              <a:lumOff val="80000"/>
-            </a:schemeClr>
-          </a:solidFill>
-          <a:ln w="9525" cap="flat" cmpd="sng" algn="ctr">
-            <a:solidFill>
-              <a:schemeClr val="bg1"/>
-            </a:solidFill>
-            <a:prstDash val="solid"/>
-            <a:round/>
-            <a:headEnd type="none" w="med" len="med"/>
-            <a:tailEnd type="none" w="med" len="med"/>
-          </a:ln>
-        </p:spPr>
-        <p:style>
-          <a:lnRef idx="0">
-            <a:scrgbClr r="0" g="0" b="0"/>
-          </a:lnRef>
-          <a:fillRef idx="0">
-            <a:scrgbClr r="0" g="0" b="0"/>
-          </a:fillRef>
-          <a:effectRef idx="0">
-            <a:scrgbClr r="0" g="0" b="0"/>
-          </a:effectRef>
-          <a:fontRef idx="minor">
-            <a:schemeClr val="dk1"/>
-          </a:fontRef>
-        </p:style>
-        <p:txBody>
-          <a:bodyPr rot="0" spcFirstLastPara="0" vertOverflow="overflow" horzOverflow="overflow" vert="horz" wrap="square" lIns="68580" tIns="34290" rIns="68580" bIns="34290" numCol="1" spcCol="0" rtlCol="0" fromWordArt="0" anchor="ctr" anchorCtr="0" forceAA="0" compatLnSpc="1">
-            <a:prstTxWarp prst="textNoShape">
-              <a:avLst/>
-            </a:prstTxWarp>
-            <a:noAutofit/>
-          </a:bodyPr>
-          <a:lstStyle/>
-          <a:p>
-            <a:pPr algn="ctr"/>
-            <a:r>
-              <a:rPr lang="en-CA" sz="1050" dirty="0"/>
-              <a:t>Data aggregated by county (raw count, population normalized count, network weighted count)</a:t>
-            </a:r>
-          </a:p>
-        </p:txBody>
-      </p:sp>
-      <p:sp>
-        <p:nvSpPr>
-          <p:cNvPr id="30" name="Rectangle 29">
-            <a:extLst>
-              <a:ext uri="{FF2B5EF4-FFF2-40B4-BE49-F238E27FC236}">
-                <a16:creationId xmlns:a16="http://schemas.microsoft.com/office/drawing/2014/main" id="{4729B03D-684C-415A-A7FA-FC33763BECF7}"/>
-              </a:ext>
-            </a:extLst>
-          </p:cNvPr>
-          <p:cNvSpPr/>
-          <p:nvPr/>
-        </p:nvSpPr>
-        <p:spPr>
-          <a:xfrm>
-            <a:off x="7594107" y="2113827"/>
-            <a:ext cx="1129527" cy="586352"/>
-          </a:xfrm>
-          <a:prstGeom prst="rect">
-            <a:avLst/>
-          </a:prstGeom>
-          <a:solidFill>
-            <a:schemeClr val="accent4">
-              <a:lumMod val="20000"/>
-              <a:lumOff val="80000"/>
-            </a:schemeClr>
-          </a:solidFill>
-          <a:ln w="9525" cap="flat" cmpd="sng" algn="ctr">
-            <a:solidFill>
-              <a:schemeClr val="bg1"/>
-            </a:solidFill>
-            <a:prstDash val="solid"/>
-            <a:round/>
-            <a:headEnd type="none" w="med" len="med"/>
-            <a:tailEnd type="none" w="med" len="med"/>
-          </a:ln>
-        </p:spPr>
-        <p:style>
-          <a:lnRef idx="0">
-            <a:scrgbClr r="0" g="0" b="0"/>
-          </a:lnRef>
-          <a:fillRef idx="0">
-            <a:scrgbClr r="0" g="0" b="0"/>
-          </a:fillRef>
-          <a:effectRef idx="0">
-            <a:scrgbClr r="0" g="0" b="0"/>
-          </a:effectRef>
-          <a:fontRef idx="minor">
-            <a:schemeClr val="dk1"/>
-          </a:fontRef>
-        </p:style>
-        <p:txBody>
-          <a:bodyPr rot="0" spcFirstLastPara="0" vertOverflow="overflow" horzOverflow="overflow" vert="horz" wrap="square" lIns="68580" tIns="34290" rIns="68580" bIns="34290" numCol="1" spcCol="0" rtlCol="0" fromWordArt="0" anchor="ctr" anchorCtr="0" forceAA="0" compatLnSpc="1">
-            <a:prstTxWarp prst="textNoShape">
-              <a:avLst/>
-            </a:prstTxWarp>
-            <a:noAutofit/>
-          </a:bodyPr>
-          <a:lstStyle/>
-          <a:p>
-            <a:pPr algn="ctr"/>
-            <a:r>
-              <a:rPr lang="en-CA" sz="1050" dirty="0"/>
-              <a:t>Data aggregated by state (number of legislative responses)</a:t>
-            </a:r>
-          </a:p>
-        </p:txBody>
-      </p:sp>
-      <p:sp>
-        <p:nvSpPr>
-          <p:cNvPr id="45" name="Rectangle 44">
-            <a:extLst>
-              <a:ext uri="{FF2B5EF4-FFF2-40B4-BE49-F238E27FC236}">
-                <a16:creationId xmlns:a16="http://schemas.microsoft.com/office/drawing/2014/main" id="{2001091E-E0E7-4514-89E5-B2F474C46AF2}"/>
-              </a:ext>
-            </a:extLst>
-          </p:cNvPr>
-          <p:cNvSpPr/>
-          <p:nvPr/>
-        </p:nvSpPr>
-        <p:spPr>
-          <a:xfrm>
-            <a:off x="647735" y="3044109"/>
-            <a:ext cx="1044785" cy="583726"/>
-          </a:xfrm>
-          <a:prstGeom prst="rect">
-            <a:avLst/>
-          </a:prstGeom>
-          <a:pattFill prst="wdUpDiag">
-            <a:fgClr>
-              <a:srgbClr val="DEEBF7"/>
-            </a:fgClr>
-            <a:bgClr>
-              <a:schemeClr val="bg1"/>
-            </a:bgClr>
-          </a:pattFill>
-          <a:ln w="9525" cap="flat" cmpd="sng" algn="ctr">
-            <a:solidFill>
-              <a:schemeClr val="bg1"/>
-            </a:solidFill>
-            <a:prstDash val="solid"/>
-            <a:round/>
-            <a:headEnd type="none" w="med" len="med"/>
-            <a:tailEnd type="none" w="med" len="med"/>
-          </a:ln>
-        </p:spPr>
-        <p:style>
-          <a:lnRef idx="0">
-            <a:scrgbClr r="0" g="0" b="0"/>
-          </a:lnRef>
-          <a:fillRef idx="0">
-            <a:scrgbClr r="0" g="0" b="0"/>
-          </a:fillRef>
-          <a:effectRef idx="0">
-            <a:scrgbClr r="0" g="0" b="0"/>
-          </a:effectRef>
-          <a:fontRef idx="minor">
-            <a:schemeClr val="dk1"/>
-          </a:fontRef>
-        </p:style>
-        <p:txBody>
-          <a:bodyPr rot="0" spcFirstLastPara="0" vertOverflow="overflow" horzOverflow="overflow" vert="horz" wrap="square" lIns="68580" tIns="34290" rIns="68580" bIns="34290" numCol="1" spcCol="0" rtlCol="0" fromWordArt="0" anchor="ctr" anchorCtr="0" forceAA="0" compatLnSpc="1">
-            <a:prstTxWarp prst="textNoShape">
-              <a:avLst/>
-            </a:prstTxWarp>
-            <a:noAutofit/>
-          </a:bodyPr>
-          <a:lstStyle/>
-          <a:p>
-            <a:pPr algn="ctr"/>
-            <a:r>
-              <a:rPr lang="en-CA" sz="1200" b="1" dirty="0"/>
-              <a:t>Time series modelling</a:t>
-            </a:r>
-          </a:p>
-        </p:txBody>
-      </p:sp>
-      <p:sp>
-        <p:nvSpPr>
-          <p:cNvPr id="47" name="Rectangle 46">
-            <a:extLst>
-              <a:ext uri="{FF2B5EF4-FFF2-40B4-BE49-F238E27FC236}">
-                <a16:creationId xmlns:a16="http://schemas.microsoft.com/office/drawing/2014/main" id="{8B45DF2C-3566-44F5-9307-85AD65505DD9}"/>
-              </a:ext>
-            </a:extLst>
-          </p:cNvPr>
-          <p:cNvSpPr/>
-          <p:nvPr/>
-        </p:nvSpPr>
-        <p:spPr>
-          <a:xfrm>
-            <a:off x="645248" y="4005970"/>
-            <a:ext cx="1044785" cy="583726"/>
-          </a:xfrm>
-          <a:prstGeom prst="rect">
-            <a:avLst/>
-          </a:prstGeom>
-          <a:pattFill prst="wdUpDiag">
-            <a:fgClr>
-              <a:srgbClr val="FF9696"/>
-            </a:fgClr>
-            <a:bgClr>
-              <a:schemeClr val="bg1"/>
-            </a:bgClr>
-          </a:pattFill>
-          <a:ln w="9525" cap="flat" cmpd="sng" algn="ctr">
-            <a:solidFill>
-              <a:schemeClr val="bg1"/>
-            </a:solidFill>
-            <a:prstDash val="solid"/>
-            <a:round/>
-            <a:headEnd type="none" w="med" len="med"/>
-            <a:tailEnd type="none" w="med" len="med"/>
-          </a:ln>
-        </p:spPr>
-        <p:style>
-          <a:lnRef idx="0">
-            <a:scrgbClr r="0" g="0" b="0"/>
-          </a:lnRef>
-          <a:fillRef idx="0">
-            <a:scrgbClr r="0" g="0" b="0"/>
-          </a:fillRef>
-          <a:effectRef idx="0">
-            <a:scrgbClr r="0" g="0" b="0"/>
-          </a:effectRef>
-          <a:fontRef idx="minor">
-            <a:schemeClr val="dk1"/>
-          </a:fontRef>
-        </p:style>
-        <p:txBody>
-          <a:bodyPr rot="0" spcFirstLastPara="0" vertOverflow="overflow" horzOverflow="overflow" vert="horz" wrap="square" lIns="68580" tIns="34290" rIns="68580" bIns="34290" numCol="1" spcCol="0" rtlCol="0" fromWordArt="0" anchor="ctr" anchorCtr="0" forceAA="0" compatLnSpc="1">
-            <a:prstTxWarp prst="textNoShape">
-              <a:avLst/>
-            </a:prstTxWarp>
-            <a:noAutofit/>
-          </a:bodyPr>
-          <a:lstStyle/>
-          <a:p>
-            <a:pPr algn="ctr"/>
-            <a:r>
-              <a:rPr lang="en-CA" sz="1200" b="1" dirty="0"/>
-              <a:t>Regression Analysis</a:t>
-            </a:r>
-          </a:p>
-        </p:txBody>
-      </p:sp>
-      <p:sp>
-        <p:nvSpPr>
-          <p:cNvPr id="48" name="Rectangle 47">
-            <a:extLst>
-              <a:ext uri="{FF2B5EF4-FFF2-40B4-BE49-F238E27FC236}">
-                <a16:creationId xmlns:a16="http://schemas.microsoft.com/office/drawing/2014/main" id="{C3F7EB87-204C-4788-9755-00987BFAFAC0}"/>
-              </a:ext>
-            </a:extLst>
-          </p:cNvPr>
-          <p:cNvSpPr/>
-          <p:nvPr/>
-        </p:nvSpPr>
-        <p:spPr>
-          <a:xfrm>
-            <a:off x="7154639" y="4013584"/>
-            <a:ext cx="1518577" cy="583726"/>
-          </a:xfrm>
-          <a:prstGeom prst="rect">
-            <a:avLst/>
-          </a:prstGeom>
-          <a:solidFill>
-            <a:srgbClr val="FF0000">
-              <a:alpha val="41176"/>
-            </a:srgbClr>
-          </a:solidFill>
-          <a:ln w="9525" cap="flat" cmpd="sng" algn="ctr">
-            <a:solidFill>
-              <a:schemeClr val="bg1"/>
-            </a:solidFill>
-            <a:prstDash val="solid"/>
-            <a:round/>
-            <a:headEnd type="none" w="med" len="med"/>
-            <a:tailEnd type="none" w="med" len="med"/>
-          </a:ln>
-        </p:spPr>
-        <p:style>
-          <a:lnRef idx="0">
-            <a:scrgbClr r="0" g="0" b="0"/>
-          </a:lnRef>
-          <a:fillRef idx="0">
-            <a:scrgbClr r="0" g="0" b="0"/>
-          </a:fillRef>
-          <a:effectRef idx="0">
-            <a:scrgbClr r="0" g="0" b="0"/>
-          </a:effectRef>
-          <a:fontRef idx="minor">
-            <a:schemeClr val="dk1"/>
-          </a:fontRef>
-        </p:style>
-        <p:txBody>
-          <a:bodyPr rot="0" spcFirstLastPara="0" vertOverflow="overflow" horzOverflow="overflow" vert="horz" wrap="square" lIns="68580" tIns="34290" rIns="68580" bIns="34290" numCol="1" spcCol="0" rtlCol="0" fromWordArt="0" anchor="ctr" anchorCtr="0" forceAA="0" compatLnSpc="1">
-            <a:prstTxWarp prst="textNoShape">
-              <a:avLst/>
-            </a:prstTxWarp>
-            <a:noAutofit/>
-          </a:bodyPr>
-          <a:lstStyle/>
-          <a:p>
-            <a:pPr algn="ctr"/>
-            <a:r>
-              <a:rPr lang="en-CA" sz="1200" dirty="0"/>
-              <a:t>Physical protest vs. legislation count</a:t>
-            </a:r>
-          </a:p>
-        </p:txBody>
-      </p:sp>
-      <p:cxnSp>
-        <p:nvCxnSpPr>
-          <p:cNvPr id="82" name="Straight Arrow Connector 81">
-            <a:extLst>
-              <a:ext uri="{FF2B5EF4-FFF2-40B4-BE49-F238E27FC236}">
-                <a16:creationId xmlns:a16="http://schemas.microsoft.com/office/drawing/2014/main" id="{A4F8557C-19E0-4510-83E5-CF53CEE38258}"/>
-              </a:ext>
-            </a:extLst>
-          </p:cNvPr>
-          <p:cNvCxnSpPr>
-            <a:cxnSpLocks/>
-            <a:stCxn id="29" idx="2"/>
-            <a:endCxn id="222" idx="0"/>
-          </p:cNvCxnSpPr>
-          <p:nvPr/>
-        </p:nvCxnSpPr>
-        <p:spPr>
-          <a:xfrm>
-            <a:off x="2801480" y="2716009"/>
-            <a:ext cx="3340" cy="1287324"/>
-          </a:xfrm>
-          <a:prstGeom prst="straightConnector1">
-            <a:avLst/>
-          </a:prstGeom>
-          <a:ln w="28575">
-            <a:tailEnd type="triangle"/>
-          </a:ln>
-        </p:spPr>
-        <p:style>
-          <a:lnRef idx="1">
-            <a:schemeClr val="dk1"/>
-          </a:lnRef>
-          <a:fillRef idx="0">
-            <a:schemeClr val="dk1"/>
-          </a:fillRef>
-          <a:effectRef idx="0">
-            <a:schemeClr val="dk1"/>
-          </a:effectRef>
-          <a:fontRef idx="minor">
-            <a:schemeClr val="tx1"/>
-          </a:fontRef>
-        </p:style>
-      </p:cxnSp>
-      <p:sp>
-        <p:nvSpPr>
-          <p:cNvPr id="117" name="Rectangle 116">
-            <a:extLst>
-              <a:ext uri="{FF2B5EF4-FFF2-40B4-BE49-F238E27FC236}">
-                <a16:creationId xmlns:a16="http://schemas.microsoft.com/office/drawing/2014/main" id="{8A0C3007-7A33-4B23-B7E1-BC75BF09682C}"/>
-              </a:ext>
-            </a:extLst>
-          </p:cNvPr>
-          <p:cNvSpPr/>
-          <p:nvPr/>
-        </p:nvSpPr>
-        <p:spPr>
-          <a:xfrm>
-            <a:off x="4939446" y="4935212"/>
-            <a:ext cx="982174" cy="583726"/>
-          </a:xfrm>
-          <a:prstGeom prst="rect">
-            <a:avLst/>
-          </a:prstGeom>
-          <a:solidFill>
-            <a:schemeClr val="accent4">
-              <a:lumMod val="75000"/>
-              <a:alpha val="41176"/>
-            </a:schemeClr>
-          </a:solidFill>
-          <a:ln w="9525" cap="flat" cmpd="sng" algn="ctr">
-            <a:solidFill>
-              <a:schemeClr val="bg1"/>
-            </a:solidFill>
-            <a:prstDash val="solid"/>
-            <a:round/>
-            <a:headEnd type="none" w="med" len="med"/>
-            <a:tailEnd type="none" w="med" len="med"/>
-          </a:ln>
-        </p:spPr>
-        <p:style>
-          <a:lnRef idx="0">
-            <a:scrgbClr r="0" g="0" b="0"/>
-          </a:lnRef>
-          <a:fillRef idx="0">
-            <a:scrgbClr r="0" g="0" b="0"/>
-          </a:fillRef>
-          <a:effectRef idx="0">
-            <a:scrgbClr r="0" g="0" b="0"/>
-          </a:effectRef>
-          <a:fontRef idx="minor">
-            <a:schemeClr val="dk1"/>
-          </a:fontRef>
-        </p:style>
-        <p:txBody>
-          <a:bodyPr rot="0" spcFirstLastPara="0" vertOverflow="overflow" horzOverflow="overflow" vert="horz" wrap="square" lIns="68580" tIns="34290" rIns="68580" bIns="34290" numCol="1" spcCol="0" rtlCol="0" fromWordArt="0" anchor="ctr" anchorCtr="0" forceAA="0" compatLnSpc="1">
-            <a:prstTxWarp prst="textNoShape">
-              <a:avLst/>
-            </a:prstTxWarp>
-            <a:noAutofit/>
-          </a:bodyPr>
-          <a:lstStyle/>
-          <a:p>
-            <a:pPr algn="ctr"/>
-            <a:r>
-              <a:rPr lang="en-CA" sz="1200" dirty="0"/>
-              <a:t>Community detection</a:t>
-            </a:r>
-          </a:p>
-        </p:txBody>
-      </p:sp>
-      <p:cxnSp>
-        <p:nvCxnSpPr>
-          <p:cNvPr id="124" name="Straight Arrow Connector 123">
-            <a:extLst>
-              <a:ext uri="{FF2B5EF4-FFF2-40B4-BE49-F238E27FC236}">
-                <a16:creationId xmlns:a16="http://schemas.microsoft.com/office/drawing/2014/main" id="{2A9EEAF0-7CD1-4498-9768-B6FE205678C8}"/>
-              </a:ext>
-            </a:extLst>
-          </p:cNvPr>
-          <p:cNvCxnSpPr>
-            <a:cxnSpLocks/>
-            <a:stCxn id="8" idx="2"/>
-            <a:endCxn id="29" idx="0"/>
-          </p:cNvCxnSpPr>
-          <p:nvPr/>
-        </p:nvCxnSpPr>
-        <p:spPr>
-          <a:xfrm flipH="1">
-            <a:off x="2801480" y="1742512"/>
-            <a:ext cx="3340" cy="353910"/>
-          </a:xfrm>
-          <a:prstGeom prst="straightConnector1">
-            <a:avLst/>
-          </a:prstGeom>
-          <a:ln w="28575">
-            <a:tailEnd type="triangle"/>
-          </a:ln>
-        </p:spPr>
-        <p:style>
-          <a:lnRef idx="1">
-            <a:schemeClr val="dk1"/>
-          </a:lnRef>
-          <a:fillRef idx="0">
-            <a:schemeClr val="dk1"/>
-          </a:fillRef>
-          <a:effectRef idx="0">
-            <a:schemeClr val="dk1"/>
-          </a:effectRef>
-          <a:fontRef idx="minor">
-            <a:schemeClr val="tx1"/>
-          </a:fontRef>
-        </p:style>
-      </p:cxnSp>
-      <p:sp>
-        <p:nvSpPr>
-          <p:cNvPr id="116" name="Rectangle 115">
-            <a:extLst>
-              <a:ext uri="{FF2B5EF4-FFF2-40B4-BE49-F238E27FC236}">
-                <a16:creationId xmlns:a16="http://schemas.microsoft.com/office/drawing/2014/main" id="{A4403F23-E29E-4B54-8BE4-8E2D6FBFF4AB}"/>
-              </a:ext>
-            </a:extLst>
-          </p:cNvPr>
-          <p:cNvSpPr/>
-          <p:nvPr/>
-        </p:nvSpPr>
-        <p:spPr>
-          <a:xfrm>
-            <a:off x="654039" y="4938092"/>
-            <a:ext cx="1044785" cy="583726"/>
-          </a:xfrm>
-          <a:prstGeom prst="rect">
-            <a:avLst/>
-          </a:prstGeom>
-          <a:pattFill prst="wdUpDiag">
-            <a:fgClr>
-              <a:srgbClr val="E5D196"/>
-            </a:fgClr>
-            <a:bgClr>
-              <a:schemeClr val="bg1"/>
-            </a:bgClr>
-          </a:pattFill>
-          <a:ln w="9525" cap="flat" cmpd="sng" algn="ctr">
-            <a:solidFill>
-              <a:schemeClr val="bg1"/>
-            </a:solidFill>
-            <a:prstDash val="solid"/>
-            <a:round/>
-            <a:headEnd type="none" w="med" len="med"/>
-            <a:tailEnd type="none" w="med" len="med"/>
-          </a:ln>
-        </p:spPr>
-        <p:style>
-          <a:lnRef idx="0">
-            <a:scrgbClr r="0" g="0" b="0"/>
-          </a:lnRef>
-          <a:fillRef idx="0">
-            <a:scrgbClr r="0" g="0" b="0"/>
-          </a:fillRef>
-          <a:effectRef idx="0">
-            <a:scrgbClr r="0" g="0" b="0"/>
-          </a:effectRef>
-          <a:fontRef idx="minor">
-            <a:schemeClr val="dk1"/>
-          </a:fontRef>
-        </p:style>
-        <p:txBody>
-          <a:bodyPr rot="0" spcFirstLastPara="0" vertOverflow="overflow" horzOverflow="overflow" vert="horz" wrap="square" lIns="68580" tIns="34290" rIns="68580" bIns="34290" numCol="1" spcCol="0" rtlCol="0" fromWordArt="0" anchor="ctr" anchorCtr="0" forceAA="0" compatLnSpc="1">
-            <a:prstTxWarp prst="textNoShape">
-              <a:avLst/>
-            </a:prstTxWarp>
-            <a:noAutofit/>
-          </a:bodyPr>
-          <a:lstStyle/>
-          <a:p>
-            <a:pPr algn="ctr"/>
-            <a:r>
-              <a:rPr lang="en-CA" sz="1200" b="1" dirty="0"/>
-              <a:t>Network Modelling</a:t>
-            </a:r>
-          </a:p>
-        </p:txBody>
-      </p:sp>
-      <p:sp>
-        <p:nvSpPr>
-          <p:cNvPr id="35" name="Rectangle 34">
-            <a:extLst>
-              <a:ext uri="{FF2B5EF4-FFF2-40B4-BE49-F238E27FC236}">
-                <a16:creationId xmlns:a16="http://schemas.microsoft.com/office/drawing/2014/main" id="{D41E8050-6D4A-44C0-AAA2-A9968F4377EE}"/>
-              </a:ext>
-            </a:extLst>
-          </p:cNvPr>
-          <p:cNvSpPr/>
-          <p:nvPr/>
-        </p:nvSpPr>
-        <p:spPr>
-          <a:xfrm>
-            <a:off x="6652822" y="225199"/>
-            <a:ext cx="1199708" cy="583726"/>
-          </a:xfrm>
-          <a:prstGeom prst="rect">
-            <a:avLst/>
-          </a:prstGeom>
-          <a:solidFill>
-            <a:schemeClr val="accent6">
-              <a:lumMod val="20000"/>
-              <a:lumOff val="80000"/>
-            </a:schemeClr>
-          </a:solidFill>
-          <a:ln w="9525" cap="flat" cmpd="sng" algn="ctr">
-            <a:solidFill>
-              <a:schemeClr val="bg1"/>
-            </a:solidFill>
-            <a:prstDash val="solid"/>
-            <a:round/>
-            <a:headEnd type="none" w="med" len="med"/>
-            <a:tailEnd type="none" w="med" len="med"/>
-          </a:ln>
-        </p:spPr>
-        <p:style>
-          <a:lnRef idx="0">
-            <a:scrgbClr r="0" g="0" b="0"/>
-          </a:lnRef>
-          <a:fillRef idx="0">
-            <a:scrgbClr r="0" g="0" b="0"/>
-          </a:fillRef>
-          <a:effectRef idx="0">
-            <a:scrgbClr r="0" g="0" b="0"/>
-          </a:effectRef>
-          <a:fontRef idx="minor">
-            <a:schemeClr val="dk1"/>
-          </a:fontRef>
-        </p:style>
-        <p:txBody>
-          <a:bodyPr rot="0" spcFirstLastPara="0" vertOverflow="overflow" horzOverflow="overflow" vert="horz" wrap="square" lIns="68580" tIns="34290" rIns="68580" bIns="34290" numCol="1" spcCol="0" rtlCol="0" fromWordArt="0" anchor="ctr" anchorCtr="0" forceAA="0" compatLnSpc="1">
-            <a:prstTxWarp prst="textNoShape">
-              <a:avLst/>
-            </a:prstTxWarp>
-            <a:noAutofit/>
-          </a:bodyPr>
-          <a:lstStyle/>
-          <a:p>
-            <a:pPr algn="ctr"/>
-            <a:r>
-              <a:rPr lang="en-CA" sz="1200" dirty="0"/>
-              <a:t>NCSL</a:t>
-            </a:r>
-          </a:p>
-        </p:txBody>
-      </p:sp>
-      <p:sp>
-        <p:nvSpPr>
-          <p:cNvPr id="37" name="Rectangle 36">
-            <a:extLst>
-              <a:ext uri="{FF2B5EF4-FFF2-40B4-BE49-F238E27FC236}">
-                <a16:creationId xmlns:a16="http://schemas.microsoft.com/office/drawing/2014/main" id="{EDAB387D-CE09-4699-B683-D9EEF6674035}"/>
-              </a:ext>
-            </a:extLst>
-          </p:cNvPr>
-          <p:cNvSpPr/>
-          <p:nvPr/>
-        </p:nvSpPr>
-        <p:spPr>
-          <a:xfrm>
-            <a:off x="3554502" y="3047125"/>
-            <a:ext cx="1160259" cy="583726"/>
-          </a:xfrm>
-          <a:prstGeom prst="rect">
-            <a:avLst/>
-          </a:prstGeom>
-          <a:solidFill>
-            <a:schemeClr val="accent5">
-              <a:lumMod val="20000"/>
-              <a:lumOff val="80000"/>
-            </a:schemeClr>
-          </a:solidFill>
-          <a:ln w="9525" cap="flat" cmpd="sng" algn="ctr">
-            <a:solidFill>
-              <a:schemeClr val="bg1"/>
-            </a:solidFill>
-            <a:prstDash val="solid"/>
-            <a:round/>
-            <a:headEnd type="none" w="med" len="med"/>
-            <a:tailEnd type="none" w="med" len="med"/>
-          </a:ln>
-        </p:spPr>
-        <p:style>
-          <a:lnRef idx="0">
-            <a:scrgbClr r="0" g="0" b="0"/>
-          </a:lnRef>
-          <a:fillRef idx="0">
-            <a:scrgbClr r="0" g="0" b="0"/>
-          </a:fillRef>
-          <a:effectRef idx="0">
-            <a:scrgbClr r="0" g="0" b="0"/>
-          </a:effectRef>
-          <a:fontRef idx="minor">
-            <a:schemeClr val="dk1"/>
-          </a:fontRef>
-        </p:style>
-        <p:txBody>
-          <a:bodyPr rot="0" spcFirstLastPara="0" vertOverflow="overflow" horzOverflow="overflow" vert="horz" wrap="square" lIns="68580" tIns="34290" rIns="68580" bIns="34290" numCol="1" spcCol="0" rtlCol="0" fromWordArt="0" anchor="ctr" anchorCtr="0" forceAA="0" compatLnSpc="1">
-            <a:prstTxWarp prst="textNoShape">
-              <a:avLst/>
-            </a:prstTxWarp>
-            <a:noAutofit/>
-          </a:bodyPr>
-          <a:lstStyle/>
-          <a:p>
-            <a:pPr algn="ctr"/>
-            <a:r>
-              <a:rPr lang="en-CA" sz="1200" dirty="0"/>
-              <a:t>Correlated time series analysis</a:t>
-            </a:r>
-          </a:p>
-        </p:txBody>
-      </p:sp>
-      <p:cxnSp>
-        <p:nvCxnSpPr>
-          <p:cNvPr id="14" name="Straight Connector 13">
-            <a:extLst>
-              <a:ext uri="{FF2B5EF4-FFF2-40B4-BE49-F238E27FC236}">
-                <a16:creationId xmlns:a16="http://schemas.microsoft.com/office/drawing/2014/main" id="{C64AB2D3-D916-4B23-9D41-5F90BE733CC4}"/>
-              </a:ext>
-            </a:extLst>
-          </p:cNvPr>
-          <p:cNvCxnSpPr>
-            <a:cxnSpLocks/>
-          </p:cNvCxnSpPr>
-          <p:nvPr/>
-        </p:nvCxnSpPr>
-        <p:spPr>
-          <a:xfrm>
-            <a:off x="5485147" y="84381"/>
-            <a:ext cx="0" cy="3587261"/>
-          </a:xfrm>
-          <a:prstGeom prst="line">
-            <a:avLst/>
-          </a:prstGeom>
-          <a:ln w="38100">
-            <a:noFill/>
-          </a:ln>
-        </p:spPr>
-        <p:style>
-          <a:lnRef idx="1">
-            <a:schemeClr val="accent1"/>
-          </a:lnRef>
-          <a:fillRef idx="0">
-            <a:schemeClr val="accent1"/>
-          </a:fillRef>
-          <a:effectRef idx="0">
-            <a:schemeClr val="accent1"/>
-          </a:effectRef>
-          <a:fontRef idx="minor">
-            <a:schemeClr val="tx1"/>
-          </a:fontRef>
-        </p:style>
-      </p:cxnSp>
-      <p:cxnSp>
-        <p:nvCxnSpPr>
-          <p:cNvPr id="16" name="Straight Connector 15">
-            <a:extLst>
-              <a:ext uri="{FF2B5EF4-FFF2-40B4-BE49-F238E27FC236}">
-                <a16:creationId xmlns:a16="http://schemas.microsoft.com/office/drawing/2014/main" id="{1895D711-DB03-4DF6-AB65-8E87B2CF78E8}"/>
-              </a:ext>
-            </a:extLst>
-          </p:cNvPr>
-          <p:cNvCxnSpPr>
-            <a:cxnSpLocks/>
-          </p:cNvCxnSpPr>
-          <p:nvPr/>
-        </p:nvCxnSpPr>
-        <p:spPr>
-          <a:xfrm flipH="1">
-            <a:off x="3543602" y="4434731"/>
-            <a:ext cx="1939059" cy="0"/>
-          </a:xfrm>
-          <a:prstGeom prst="line">
-            <a:avLst/>
-          </a:prstGeom>
-          <a:ln w="38100">
-            <a:noFill/>
-          </a:ln>
-        </p:spPr>
-        <p:style>
-          <a:lnRef idx="1">
-            <a:schemeClr val="accent1"/>
-          </a:lnRef>
-          <a:fillRef idx="0">
-            <a:schemeClr val="accent1"/>
-          </a:fillRef>
-          <a:effectRef idx="0">
-            <a:schemeClr val="accent1"/>
-          </a:effectRef>
-          <a:fontRef idx="minor">
-            <a:schemeClr val="tx1"/>
-          </a:fontRef>
-        </p:style>
-      </p:cxnSp>
       <p:cxnSp>
         <p:nvCxnSpPr>
           <p:cNvPr id="19" name="Straight Connector 18">
@@ -4461,10 +3053,10 @@
       </p:cxnSp>
       <p:cxnSp>
         <p:nvCxnSpPr>
-          <p:cNvPr id="24" name="Straight Connector 23">
+          <p:cNvPr id="65" name="Straight Connector 64">
             <a:extLst>
               <a:ext uri="{FF2B5EF4-FFF2-40B4-BE49-F238E27FC236}">
-                <a16:creationId xmlns:a16="http://schemas.microsoft.com/office/drawing/2014/main" id="{11480F14-6E97-496C-AD4C-A582A8C35A30}"/>
+                <a16:creationId xmlns:a16="http://schemas.microsoft.com/office/drawing/2014/main" id="{04EC87F6-F8D2-4663-89A5-38F80093A65F}"/>
               </a:ext>
             </a:extLst>
           </p:cNvPr>
@@ -4474,9 +3066,9 @@
           <p:nvPr/>
         </p:nvCxnSpPr>
         <p:spPr>
-          <a:xfrm flipV="1">
-            <a:off x="8651631" y="84381"/>
-            <a:ext cx="0" cy="5653454"/>
+          <a:xfrm flipH="1">
+            <a:off x="1909610" y="-418246"/>
+            <a:ext cx="328032" cy="0"/>
           </a:xfrm>
           <a:prstGeom prst="line">
             <a:avLst/>
@@ -4500,53 +3092,12 @@
           </a:fontRef>
         </p:style>
       </p:cxnSp>
-      <p:cxnSp>
-        <p:nvCxnSpPr>
-          <p:cNvPr id="26" name="Straight Connector 25">
+      <p:sp>
+        <p:nvSpPr>
+          <p:cNvPr id="59" name="Oval 58">
             <a:extLst>
               <a:ext uri="{FF2B5EF4-FFF2-40B4-BE49-F238E27FC236}">
-                <a16:creationId xmlns:a16="http://schemas.microsoft.com/office/drawing/2014/main" id="{728CC4F6-AC47-4E00-8914-861A24CE3561}"/>
-              </a:ext>
-            </a:extLst>
-          </p:cNvPr>
-          <p:cNvCxnSpPr>
-            <a:cxnSpLocks/>
-          </p:cNvCxnSpPr>
-          <p:nvPr/>
-        </p:nvCxnSpPr>
-        <p:spPr>
-          <a:xfrm flipH="1">
-            <a:off x="5485148" y="84381"/>
-            <a:ext cx="3175275" cy="0"/>
-          </a:xfrm>
-          <a:prstGeom prst="line">
-            <a:avLst/>
-          </a:prstGeom>
-          <a:ln w="38100">
-            <a:noFill/>
-          </a:ln>
-        </p:spPr>
-        <p:style>
-          <a:lnRef idx="1">
-            <a:schemeClr val="accent1"/>
-          </a:lnRef>
-          <a:fillRef idx="0">
-            <a:schemeClr val="accent1"/>
-          </a:fillRef>
-          <a:effectRef idx="0">
-            <a:schemeClr val="accent1"/>
-          </a:effectRef>
-          <a:fontRef idx="minor">
-            <a:schemeClr val="tx1"/>
-          </a:fontRef>
-        </p:style>
-      </p:cxnSp>
-      <p:sp>
-        <p:nvSpPr>
-          <p:cNvPr id="32" name="Rectangle 31">
-            <a:extLst>
-              <a:ext uri="{FF2B5EF4-FFF2-40B4-BE49-F238E27FC236}">
-                <a16:creationId xmlns:a16="http://schemas.microsoft.com/office/drawing/2014/main" id="{F4F7932A-EDA2-46ED-A1C9-179D2287337B}"/>
+                <a16:creationId xmlns:a16="http://schemas.microsoft.com/office/drawing/2014/main" id="{79459F1D-3589-4609-BD4E-58D3FA3B94A2}"/>
               </a:ext>
             </a:extLst>
           </p:cNvPr>
@@ -4555,15 +3106,19 @@
         </p:nvSpPr>
         <p:spPr>
           <a:xfrm>
-            <a:off x="1921119" y="84381"/>
-            <a:ext cx="3447943" cy="3121269"/>
-          </a:xfrm>
-          <a:prstGeom prst="rect">
+            <a:off x="-635612" y="3983284"/>
+            <a:ext cx="5991227" cy="1976436"/>
+          </a:xfrm>
+          <a:prstGeom prst="ellipse">
             <a:avLst/>
           </a:prstGeom>
           <a:noFill/>
-          <a:ln w="38100">
-            <a:noFill/>
+          <a:ln>
+            <a:solidFill>
+              <a:srgbClr val="E7E6E6">
+                <a:alpha val="0"/>
+              </a:srgbClr>
+            </a:solidFill>
           </a:ln>
         </p:spPr>
         <p:style>
@@ -4587,61 +3142,22 @@
           <a:lstStyle/>
           <a:p>
             <a:pPr algn="ctr"/>
-            <a:endParaRPr lang="en-CA">
+            <a:endParaRPr lang="en-CA" dirty="0">
               <a:solidFill>
-                <a:schemeClr val="bg1"/>
+                <a:schemeClr val="bg2"/>
               </a:solidFill>
+              <a:latin typeface="Arial" panose="020B0604020202020204" pitchFamily="34" charset="0"/>
+              <a:cs typeface="Arial" panose="020B0604020202020204" pitchFamily="34" charset="0"/>
             </a:endParaRPr>
           </a:p>
         </p:txBody>
       </p:sp>
-      <p:cxnSp>
-        <p:nvCxnSpPr>
-          <p:cNvPr id="65" name="Straight Connector 64">
+      <p:sp>
+        <p:nvSpPr>
+          <p:cNvPr id="61" name="Rectangle 60">
             <a:extLst>
               <a:ext uri="{FF2B5EF4-FFF2-40B4-BE49-F238E27FC236}">
-                <a16:creationId xmlns:a16="http://schemas.microsoft.com/office/drawing/2014/main" id="{04EC87F6-F8D2-4663-89A5-38F80093A65F}"/>
-              </a:ext>
-            </a:extLst>
-          </p:cNvPr>
-          <p:cNvCxnSpPr>
-            <a:cxnSpLocks/>
-          </p:cNvCxnSpPr>
-          <p:nvPr/>
-        </p:nvCxnSpPr>
-        <p:spPr>
-          <a:xfrm flipH="1">
-            <a:off x="1909610" y="-418246"/>
-            <a:ext cx="328032" cy="0"/>
-          </a:xfrm>
-          <a:prstGeom prst="line">
-            <a:avLst/>
-          </a:prstGeom>
-          <a:ln w="38100">
-            <a:noFill/>
-          </a:ln>
-        </p:spPr>
-        <p:style>
-          <a:lnRef idx="1">
-            <a:schemeClr val="accent1"/>
-          </a:lnRef>
-          <a:fillRef idx="0">
-            <a:schemeClr val="accent1"/>
-          </a:fillRef>
-          <a:effectRef idx="0">
-            <a:schemeClr val="accent1"/>
-          </a:effectRef>
-          <a:fontRef idx="minor">
-            <a:schemeClr val="tx1"/>
-          </a:fontRef>
-        </p:style>
-      </p:cxnSp>
-      <p:sp>
-        <p:nvSpPr>
-          <p:cNvPr id="49" name="Rectangle 48">
-            <a:extLst>
-              <a:ext uri="{FF2B5EF4-FFF2-40B4-BE49-F238E27FC236}">
-                <a16:creationId xmlns:a16="http://schemas.microsoft.com/office/drawing/2014/main" id="{21540C55-C93B-4948-8DB2-BECE359F2870}"/>
+                <a16:creationId xmlns:a16="http://schemas.microsoft.com/office/drawing/2014/main" id="{086CD284-5F1E-4DAA-AC87-5BB20DCE06C1}"/>
               </a:ext>
             </a:extLst>
           </p:cNvPr>
@@ -4650,7 +3166,7 @@
         </p:nvSpPr>
         <p:spPr>
           <a:xfrm>
-            <a:off x="3670951" y="233476"/>
+            <a:off x="2029024" y="376097"/>
             <a:ext cx="1199708" cy="583726"/>
           </a:xfrm>
           <a:prstGeom prst="rect">
@@ -4698,62 +3214,17 @@
             <a:pPr algn="ctr"/>
             <a:r>
               <a:rPr lang="en-CA" sz="1200" dirty="0"/>
-              <a:t>ACLED</a:t>
-            </a:r>
-          </a:p>
-        </p:txBody>
-      </p:sp>
-      <p:cxnSp>
-        <p:nvCxnSpPr>
-          <p:cNvPr id="52" name="Connector: Elbow 51">
+              <a:t>US Census Bureau</a:t>
+            </a:r>
+          </a:p>
+        </p:txBody>
+      </p:sp>
+      <p:sp>
+        <p:nvSpPr>
+          <p:cNvPr id="62" name="Rectangle 61">
             <a:extLst>
               <a:ext uri="{FF2B5EF4-FFF2-40B4-BE49-F238E27FC236}">
-                <a16:creationId xmlns:a16="http://schemas.microsoft.com/office/drawing/2014/main" id="{E8BC5171-0DA3-4815-9A49-59A4DD53DD37}"/>
-              </a:ext>
-            </a:extLst>
-          </p:cNvPr>
-          <p:cNvCxnSpPr>
-            <a:cxnSpLocks/>
-            <a:stCxn id="6" idx="2"/>
-            <a:endCxn id="9" idx="0"/>
-          </p:cNvCxnSpPr>
-          <p:nvPr/>
-        </p:nvCxnSpPr>
-        <p:spPr>
-          <a:xfrm rot="5400000">
-            <a:off x="5128625" y="549948"/>
-            <a:ext cx="318813" cy="902597"/>
-          </a:xfrm>
-          <a:prstGeom prst="bentConnector3">
-            <a:avLst>
-              <a:gd name="adj1" fmla="val 50000"/>
-            </a:avLst>
-          </a:prstGeom>
-          <a:ln w="28575">
-            <a:tailEnd type="triangle"/>
-          </a:ln>
-        </p:spPr>
-        <p:style>
-          <a:lnRef idx="1">
-            <a:schemeClr val="dk1"/>
-          </a:lnRef>
-          <a:fillRef idx="0">
-            <a:schemeClr val="dk1"/>
-          </a:fillRef>
-          <a:effectRef idx="0">
-            <a:schemeClr val="dk1"/>
-          </a:effectRef>
-          <a:fontRef idx="minor">
-            <a:schemeClr val="tx1"/>
-          </a:fontRef>
-        </p:style>
-      </p:cxnSp>
-      <p:sp>
-        <p:nvSpPr>
-          <p:cNvPr id="57" name="Rectangle 56">
-            <a:extLst>
-              <a:ext uri="{FF2B5EF4-FFF2-40B4-BE49-F238E27FC236}">
-                <a16:creationId xmlns:a16="http://schemas.microsoft.com/office/drawing/2014/main" id="{012CC0C4-4404-4EAB-B8BB-272FE45875BD}"/>
+                <a16:creationId xmlns:a16="http://schemas.microsoft.com/office/drawing/2014/main" id="{38AE0771-1ABA-4BD0-9C82-7E3D095E778A}"/>
               </a:ext>
             </a:extLst>
           </p:cNvPr>
@@ -4762,8 +3233,216 @@
         </p:nvSpPr>
         <p:spPr>
           <a:xfrm>
-            <a:off x="6594655" y="1172907"/>
-            <a:ext cx="1319273" cy="583726"/>
+            <a:off x="470755" y="377296"/>
+            <a:ext cx="1044785" cy="583726"/>
+          </a:xfrm>
+          <a:prstGeom prst="rect">
+            <a:avLst/>
+          </a:prstGeom>
+          <a:pattFill prst="wdUpDiag">
+            <a:fgClr>
+              <a:schemeClr val="accent6">
+                <a:lumMod val="40000"/>
+                <a:lumOff val="60000"/>
+              </a:schemeClr>
+            </a:fgClr>
+            <a:bgClr>
+              <a:schemeClr val="bg1"/>
+            </a:bgClr>
+          </a:pattFill>
+          <a:ln w="9525" cap="flat" cmpd="sng" algn="ctr">
+            <a:solidFill>
+              <a:schemeClr val="bg1"/>
+            </a:solidFill>
+            <a:prstDash val="solid"/>
+            <a:round/>
+            <a:headEnd type="none" w="med" len="med"/>
+            <a:tailEnd type="none" w="med" len="med"/>
+          </a:ln>
+        </p:spPr>
+        <p:style>
+          <a:lnRef idx="0">
+            <a:scrgbClr r="0" g="0" b="0"/>
+          </a:lnRef>
+          <a:fillRef idx="0">
+            <a:scrgbClr r="0" g="0" b="0"/>
+          </a:fillRef>
+          <a:effectRef idx="0">
+            <a:scrgbClr r="0" g="0" b="0"/>
+          </a:effectRef>
+          <a:fontRef idx="minor">
+            <a:schemeClr val="dk1"/>
+          </a:fontRef>
+        </p:style>
+        <p:txBody>
+          <a:bodyPr rot="0" spcFirstLastPara="0" vertOverflow="overflow" horzOverflow="overflow" vert="horz" wrap="square" lIns="68580" tIns="34290" rIns="68580" bIns="34290" numCol="1" spcCol="0" rtlCol="0" fromWordArt="0" anchor="ctr" anchorCtr="0" forceAA="0" compatLnSpc="1">
+            <a:prstTxWarp prst="textNoShape">
+              <a:avLst/>
+            </a:prstTxWarp>
+            <a:noAutofit/>
+          </a:bodyPr>
+          <a:lstStyle/>
+          <a:p>
+            <a:pPr algn="ctr"/>
+            <a:r>
+              <a:rPr lang="en-CA" sz="1200" b="1" dirty="0"/>
+              <a:t>Data Sources</a:t>
+            </a:r>
+          </a:p>
+        </p:txBody>
+      </p:sp>
+      <p:sp>
+        <p:nvSpPr>
+          <p:cNvPr id="64" name="Rectangle 63">
+            <a:extLst>
+              <a:ext uri="{FF2B5EF4-FFF2-40B4-BE49-F238E27FC236}">
+                <a16:creationId xmlns:a16="http://schemas.microsoft.com/office/drawing/2014/main" id="{2DF38B91-C1AA-4370-9F05-4E8C0D9E14A6}"/>
+              </a:ext>
+            </a:extLst>
+          </p:cNvPr>
+          <p:cNvSpPr/>
+          <p:nvPr/>
+        </p:nvSpPr>
+        <p:spPr>
+          <a:xfrm>
+            <a:off x="4928902" y="408285"/>
+            <a:ext cx="1266896" cy="583726"/>
+          </a:xfrm>
+          <a:prstGeom prst="rect">
+            <a:avLst/>
+          </a:prstGeom>
+          <a:solidFill>
+            <a:schemeClr val="accent6">
+              <a:lumMod val="20000"/>
+              <a:lumOff val="80000"/>
+            </a:schemeClr>
+          </a:solidFill>
+          <a:ln w="9525" cap="flat" cmpd="sng" algn="ctr">
+            <a:solidFill>
+              <a:schemeClr val="bg1"/>
+            </a:solidFill>
+            <a:prstDash val="solid"/>
+            <a:round/>
+            <a:headEnd type="none" w="med" len="med"/>
+            <a:tailEnd type="none" w="med" len="med"/>
+          </a:ln>
+        </p:spPr>
+        <p:style>
+          <a:lnRef idx="0">
+            <a:scrgbClr r="0" g="0" b="0"/>
+          </a:lnRef>
+          <a:fillRef idx="0">
+            <a:scrgbClr r="0" g="0" b="0"/>
+          </a:fillRef>
+          <a:effectRef idx="0">
+            <a:scrgbClr r="0" g="0" b="0"/>
+          </a:effectRef>
+          <a:fontRef idx="minor">
+            <a:schemeClr val="dk1"/>
+          </a:fontRef>
+        </p:style>
+        <p:txBody>
+          <a:bodyPr rot="0" spcFirstLastPara="0" vertOverflow="overflow" horzOverflow="overflow" vert="horz" wrap="square" lIns="68580" tIns="34290" rIns="68580" bIns="34290" numCol="1" spcCol="0" rtlCol="0" fromWordArt="0" anchor="ctr" anchorCtr="0" forceAA="0" compatLnSpc="1">
+            <a:prstTxWarp prst="textNoShape">
+              <a:avLst/>
+            </a:prstTxWarp>
+            <a:noAutofit/>
+          </a:bodyPr>
+          <a:lstStyle/>
+          <a:p>
+            <a:pPr algn="ctr"/>
+            <a:r>
+              <a:rPr lang="en-CA" sz="1200" dirty="0"/>
+              <a:t>Twitter API v2</a:t>
+            </a:r>
+          </a:p>
+        </p:txBody>
+      </p:sp>
+      <p:sp>
+        <p:nvSpPr>
+          <p:cNvPr id="66" name="Rectangle 65">
+            <a:extLst>
+              <a:ext uri="{FF2B5EF4-FFF2-40B4-BE49-F238E27FC236}">
+                <a16:creationId xmlns:a16="http://schemas.microsoft.com/office/drawing/2014/main" id="{12D7600A-F20A-4EBC-B230-B2EC70F400C4}"/>
+              </a:ext>
+            </a:extLst>
+          </p:cNvPr>
+          <p:cNvSpPr/>
+          <p:nvPr/>
+        </p:nvSpPr>
+        <p:spPr>
+          <a:xfrm>
+            <a:off x="470756" y="1308955"/>
+            <a:ext cx="1044785" cy="583726"/>
+          </a:xfrm>
+          <a:prstGeom prst="rect">
+            <a:avLst/>
+          </a:prstGeom>
+          <a:pattFill prst="wdUpDiag">
+            <a:fgClr>
+              <a:srgbClr val="FBE5D6"/>
+            </a:fgClr>
+            <a:bgClr>
+              <a:schemeClr val="bg1"/>
+            </a:bgClr>
+          </a:pattFill>
+          <a:ln w="9525" cap="flat" cmpd="sng" algn="ctr">
+            <a:solidFill>
+              <a:schemeClr val="bg1"/>
+            </a:solidFill>
+            <a:prstDash val="solid"/>
+            <a:round/>
+            <a:headEnd type="none" w="med" len="med"/>
+            <a:tailEnd type="none" w="med" len="med"/>
+          </a:ln>
+        </p:spPr>
+        <p:style>
+          <a:lnRef idx="0">
+            <a:scrgbClr r="0" g="0" b="0"/>
+          </a:lnRef>
+          <a:fillRef idx="0">
+            <a:scrgbClr r="0" g="0" b="0"/>
+          </a:fillRef>
+          <a:effectRef idx="0">
+            <a:scrgbClr r="0" g="0" b="0"/>
+          </a:effectRef>
+          <a:fontRef idx="minor">
+            <a:schemeClr val="dk1"/>
+          </a:fontRef>
+        </p:style>
+        <p:txBody>
+          <a:bodyPr rot="0" spcFirstLastPara="0" vertOverflow="overflow" horzOverflow="overflow" vert="horz" wrap="square" lIns="68580" tIns="34290" rIns="68580" bIns="34290" numCol="1" spcCol="0" rtlCol="0" fromWordArt="0" anchor="ctr" anchorCtr="0" forceAA="0" compatLnSpc="1">
+            <a:prstTxWarp prst="textNoShape">
+              <a:avLst/>
+            </a:prstTxWarp>
+            <a:noAutofit/>
+          </a:bodyPr>
+          <a:lstStyle/>
+          <a:p>
+            <a:pPr algn="ctr"/>
+            <a:r>
+              <a:rPr lang="en-CA" sz="1200" b="1" dirty="0"/>
+              <a:t>Data Collection</a:t>
+            </a:r>
+          </a:p>
+        </p:txBody>
+      </p:sp>
+      <p:sp>
+        <p:nvSpPr>
+          <p:cNvPr id="68" name="Rectangle 67">
+            <a:extLst>
+              <a:ext uri="{FF2B5EF4-FFF2-40B4-BE49-F238E27FC236}">
+                <a16:creationId xmlns:a16="http://schemas.microsoft.com/office/drawing/2014/main" id="{22641AE3-4F9C-4DFB-96EF-310D7EB438B4}"/>
+              </a:ext>
+            </a:extLst>
+          </p:cNvPr>
+          <p:cNvSpPr/>
+          <p:nvPr/>
+        </p:nvSpPr>
+        <p:spPr>
+          <a:xfrm>
+            <a:off x="2027987" y="1308957"/>
+            <a:ext cx="1199708" cy="583726"/>
           </a:xfrm>
           <a:prstGeom prst="rect">
             <a:avLst/>
@@ -4809,32 +3488,163 @@
           <a:p>
             <a:pPr algn="ctr"/>
             <a:r>
-              <a:rPr lang="en-CA" sz="1000" dirty="0"/>
-              <a:t>State level legislative responses to policing</a:t>
+              <a:rPr lang="en-CA" sz="1200" dirty="0"/>
+              <a:t>2016 county shapes and demographics</a:t>
+            </a:r>
+          </a:p>
+        </p:txBody>
+      </p:sp>
+      <p:sp>
+        <p:nvSpPr>
+          <p:cNvPr id="69" name="Rectangle 68">
+            <a:extLst>
+              <a:ext uri="{FF2B5EF4-FFF2-40B4-BE49-F238E27FC236}">
+                <a16:creationId xmlns:a16="http://schemas.microsoft.com/office/drawing/2014/main" id="{260518C3-6AB5-4741-83D0-E312113CA6ED}"/>
+              </a:ext>
+            </a:extLst>
+          </p:cNvPr>
+          <p:cNvSpPr/>
+          <p:nvPr/>
+        </p:nvSpPr>
+        <p:spPr>
+          <a:xfrm>
+            <a:off x="3796508" y="1310824"/>
+            <a:ext cx="1726489" cy="583726"/>
+          </a:xfrm>
+          <a:prstGeom prst="rect">
+            <a:avLst/>
+          </a:prstGeom>
+          <a:solidFill>
+            <a:schemeClr val="accent2">
+              <a:lumMod val="20000"/>
+              <a:lumOff val="80000"/>
+            </a:schemeClr>
+          </a:solidFill>
+          <a:ln w="9525" cap="flat" cmpd="sng" algn="ctr">
+            <a:solidFill>
+              <a:schemeClr val="bg1"/>
+            </a:solidFill>
+            <a:prstDash val="solid"/>
+            <a:round/>
+            <a:headEnd type="none" w="med" len="med"/>
+            <a:tailEnd type="none" w="med" len="med"/>
+          </a:ln>
+        </p:spPr>
+        <p:style>
+          <a:lnRef idx="0">
+            <a:scrgbClr r="0" g="0" b="0"/>
+          </a:lnRef>
+          <a:fillRef idx="0">
+            <a:scrgbClr r="0" g="0" b="0"/>
+          </a:fillRef>
+          <a:effectRef idx="0">
+            <a:scrgbClr r="0" g="0" b="0"/>
+          </a:effectRef>
+          <a:fontRef idx="minor">
+            <a:schemeClr val="dk1"/>
+          </a:fontRef>
+        </p:style>
+        <p:txBody>
+          <a:bodyPr rot="0" spcFirstLastPara="0" vertOverflow="overflow" horzOverflow="overflow" vert="horz" wrap="square" lIns="68580" tIns="34290" rIns="68580" bIns="34290" numCol="1" spcCol="0" rtlCol="0" fromWordArt="0" anchor="ctr" anchorCtr="0" forceAA="0" compatLnSpc="1">
+            <a:prstTxWarp prst="textNoShape">
+              <a:avLst/>
+            </a:prstTxWarp>
+            <a:noAutofit/>
+          </a:bodyPr>
+          <a:lstStyle/>
+          <a:p>
+            <a:pPr algn="ctr"/>
+            <a:r>
+              <a:rPr lang="en-CA" sz="1200" dirty="0"/>
+              <a:t>Geo-located social media posts and geo-located physical protests</a:t>
+            </a:r>
+          </a:p>
+        </p:txBody>
+      </p:sp>
+      <p:sp>
+        <p:nvSpPr>
+          <p:cNvPr id="70" name="Rectangle 69">
+            <a:extLst>
+              <a:ext uri="{FF2B5EF4-FFF2-40B4-BE49-F238E27FC236}">
+                <a16:creationId xmlns:a16="http://schemas.microsoft.com/office/drawing/2014/main" id="{278A88D8-5B72-4895-B3E8-88C18C030065}"/>
+              </a:ext>
+            </a:extLst>
+          </p:cNvPr>
+          <p:cNvSpPr/>
+          <p:nvPr/>
+        </p:nvSpPr>
+        <p:spPr>
+          <a:xfrm>
+            <a:off x="8017868" y="374482"/>
+            <a:ext cx="825357" cy="583726"/>
+          </a:xfrm>
+          <a:prstGeom prst="rect">
+            <a:avLst/>
+          </a:prstGeom>
+          <a:solidFill>
+            <a:schemeClr val="bg2"/>
+          </a:solidFill>
+          <a:ln w="9525" cap="flat" cmpd="sng" algn="ctr">
+            <a:solidFill>
+              <a:schemeClr val="bg1"/>
+            </a:solidFill>
+            <a:prstDash val="solid"/>
+            <a:round/>
+            <a:headEnd type="none" w="med" len="med"/>
+            <a:tailEnd type="none" w="med" len="med"/>
+          </a:ln>
+        </p:spPr>
+        <p:style>
+          <a:lnRef idx="0">
+            <a:scrgbClr r="0" g="0" b="0"/>
+          </a:lnRef>
+          <a:fillRef idx="0">
+            <a:scrgbClr r="0" g="0" b="0"/>
+          </a:fillRef>
+          <a:effectRef idx="0">
+            <a:scrgbClr r="0" g="0" b="0"/>
+          </a:effectRef>
+          <a:fontRef idx="minor">
+            <a:schemeClr val="dk1"/>
+          </a:fontRef>
+        </p:style>
+        <p:txBody>
+          <a:bodyPr rot="0" spcFirstLastPara="0" vertOverflow="overflow" horzOverflow="overflow" vert="horz" wrap="square" lIns="68580" tIns="34290" rIns="68580" bIns="34290" numCol="1" spcCol="0" rtlCol="0" fromWordArt="0" anchor="ctr" anchorCtr="0" forceAA="0" compatLnSpc="1">
+            <a:prstTxWarp prst="textNoShape">
+              <a:avLst/>
+            </a:prstTxWarp>
+            <a:noAutofit/>
+          </a:bodyPr>
+          <a:lstStyle/>
+          <a:p>
+            <a:pPr algn="ctr"/>
+            <a:r>
+              <a:rPr lang="en-CA" sz="1200" dirty="0"/>
+              <a:t>Web scraping</a:t>
             </a:r>
           </a:p>
         </p:txBody>
       </p:sp>
       <p:cxnSp>
         <p:nvCxnSpPr>
-          <p:cNvPr id="58" name="Connector: Elbow 57">
+          <p:cNvPr id="72" name="Connector: Elbow 71">
             <a:extLst>
               <a:ext uri="{FF2B5EF4-FFF2-40B4-BE49-F238E27FC236}">
-                <a16:creationId xmlns:a16="http://schemas.microsoft.com/office/drawing/2014/main" id="{CD91D611-19E4-42A2-8CF5-8BD35366744C}"/>
+                <a16:creationId xmlns:a16="http://schemas.microsoft.com/office/drawing/2014/main" id="{06337F0A-DDB1-48FC-AF97-DBA80E9F060D}"/>
               </a:ext>
             </a:extLst>
           </p:cNvPr>
           <p:cNvCxnSpPr>
             <a:cxnSpLocks/>
-            <a:stCxn id="35" idx="2"/>
-            <a:endCxn id="57" idx="0"/>
+            <a:stCxn id="70" idx="1"/>
+            <a:endCxn id="85" idx="3"/>
           </p:cNvCxnSpPr>
           <p:nvPr/>
         </p:nvCxnSpPr>
         <p:spPr>
-          <a:xfrm rot="16200000" flipH="1">
-            <a:off x="7071493" y="990108"/>
-            <a:ext cx="363982" cy="1616"/>
+          <a:xfrm rot="10800000" flipV="1">
+            <a:off x="7675552" y="666345"/>
+            <a:ext cx="342317" cy="888"/>
           </a:xfrm>
           <a:prstGeom prst="bentConnector3">
             <a:avLst>
@@ -4862,24 +3672,24 @@
       </p:cxnSp>
       <p:cxnSp>
         <p:nvCxnSpPr>
-          <p:cNvPr id="67" name="Connector: Elbow 66">
+          <p:cNvPr id="73" name="Connector: Elbow 72">
             <a:extLst>
               <a:ext uri="{FF2B5EF4-FFF2-40B4-BE49-F238E27FC236}">
-                <a16:creationId xmlns:a16="http://schemas.microsoft.com/office/drawing/2014/main" id="{D46882A8-BD9D-48AE-850C-65863ED4458D}"/>
+                <a16:creationId xmlns:a16="http://schemas.microsoft.com/office/drawing/2014/main" id="{CA903898-E51E-4118-B285-0E9F8BFF5270}"/>
               </a:ext>
             </a:extLst>
           </p:cNvPr>
           <p:cNvCxnSpPr>
             <a:cxnSpLocks/>
-            <a:stCxn id="49" idx="2"/>
-            <a:endCxn id="9" idx="0"/>
+            <a:stCxn id="61" idx="2"/>
+            <a:endCxn id="68" idx="0"/>
           </p:cNvCxnSpPr>
           <p:nvPr/>
         </p:nvCxnSpPr>
         <p:spPr>
-          <a:xfrm rot="16200000" flipH="1">
-            <a:off x="4382043" y="705963"/>
-            <a:ext cx="343451" cy="565927"/>
+          <a:xfrm rot="5400000">
+            <a:off x="2453793" y="1133872"/>
+            <a:ext cx="349134" cy="1037"/>
           </a:xfrm>
           <a:prstGeom prst="bentConnector3">
             <a:avLst>
@@ -4907,10 +3717,10 @@
       </p:cxnSp>
       <p:sp>
         <p:nvSpPr>
-          <p:cNvPr id="71" name="Rectangle 70">
+          <p:cNvPr id="74" name="Rectangle 73">
             <a:extLst>
               <a:ext uri="{FF2B5EF4-FFF2-40B4-BE49-F238E27FC236}">
-                <a16:creationId xmlns:a16="http://schemas.microsoft.com/office/drawing/2014/main" id="{CC6CEC83-EDA8-4D83-9A71-116E39611E3E}"/>
+                <a16:creationId xmlns:a16="http://schemas.microsoft.com/office/drawing/2014/main" id="{9C53526B-A6E4-4E21-98BF-BEC3862988DF}"/>
               </a:ext>
             </a:extLst>
           </p:cNvPr>
@@ -4919,8 +3729,77 @@
         </p:nvSpPr>
         <p:spPr>
           <a:xfrm>
-            <a:off x="5191383" y="2085821"/>
-            <a:ext cx="1095889" cy="583726"/>
+            <a:off x="470756" y="2263191"/>
+            <a:ext cx="1044785" cy="583726"/>
+          </a:xfrm>
+          <a:prstGeom prst="rect">
+            <a:avLst/>
+          </a:prstGeom>
+          <a:pattFill prst="wdUpDiag">
+            <a:fgClr>
+              <a:srgbClr val="FFF2CC"/>
+            </a:fgClr>
+            <a:bgClr>
+              <a:schemeClr val="bg1"/>
+            </a:bgClr>
+          </a:pattFill>
+          <a:ln w="9525" cap="flat" cmpd="sng" algn="ctr">
+            <a:solidFill>
+              <a:schemeClr val="bg1"/>
+            </a:solidFill>
+            <a:prstDash val="solid"/>
+            <a:round/>
+            <a:headEnd type="none" w="med" len="med"/>
+            <a:tailEnd type="none" w="med" len="med"/>
+          </a:ln>
+        </p:spPr>
+        <p:style>
+          <a:lnRef idx="0">
+            <a:scrgbClr r="0" g="0" b="0"/>
+          </a:lnRef>
+          <a:fillRef idx="0">
+            <a:scrgbClr r="0" g="0" b="0"/>
+          </a:fillRef>
+          <a:effectRef idx="0">
+            <a:scrgbClr r="0" g="0" b="0"/>
+          </a:effectRef>
+          <a:fontRef idx="minor">
+            <a:schemeClr val="dk1"/>
+          </a:fontRef>
+        </p:style>
+        <p:txBody>
+          <a:bodyPr rot="0" spcFirstLastPara="0" vertOverflow="overflow" horzOverflow="overflow" vert="horz" wrap="square" lIns="68580" tIns="34290" rIns="68580" bIns="34290" numCol="1" spcCol="0" rtlCol="0" fromWordArt="0" anchor="ctr" anchorCtr="0" forceAA="0" compatLnSpc="1">
+            <a:prstTxWarp prst="textNoShape">
+              <a:avLst/>
+            </a:prstTxWarp>
+            <a:noAutofit/>
+          </a:bodyPr>
+          <a:lstStyle/>
+          <a:p>
+            <a:pPr algn="ctr"/>
+            <a:r>
+              <a:rPr lang="en-CA" sz="1200" b="1" dirty="0"/>
+              <a:t>Data Preprocessing</a:t>
+            </a:r>
+          </a:p>
+        </p:txBody>
+      </p:sp>
+      <p:sp>
+        <p:nvSpPr>
+          <p:cNvPr id="75" name="Rectangle 74">
+            <a:extLst>
+              <a:ext uri="{FF2B5EF4-FFF2-40B4-BE49-F238E27FC236}">
+                <a16:creationId xmlns:a16="http://schemas.microsoft.com/office/drawing/2014/main" id="{D73E4E48-34B3-48C5-A81B-AED07E8C3785}"/>
+              </a:ext>
+            </a:extLst>
+          </p:cNvPr>
+          <p:cNvSpPr/>
+          <p:nvPr/>
+        </p:nvSpPr>
+        <p:spPr>
+          <a:xfrm>
+            <a:off x="1672138" y="2246593"/>
+            <a:ext cx="1904725" cy="619587"/>
           </a:xfrm>
           <a:prstGeom prst="rect">
             <a:avLst/>
@@ -4966,31 +3845,1145 @@
           <a:p>
             <a:pPr algn="ctr"/>
             <a:r>
+              <a:rPr lang="en-CA" sz="1050" dirty="0"/>
+              <a:t>Data aggregated by county (raw count, population normalized count, network weighted count)</a:t>
+            </a:r>
+          </a:p>
+        </p:txBody>
+      </p:sp>
+      <p:sp>
+        <p:nvSpPr>
+          <p:cNvPr id="76" name="Rectangle 75">
+            <a:extLst>
+              <a:ext uri="{FF2B5EF4-FFF2-40B4-BE49-F238E27FC236}">
+                <a16:creationId xmlns:a16="http://schemas.microsoft.com/office/drawing/2014/main" id="{52B0C14E-77B5-4FA2-926E-1A6FDE7E2F12}"/>
+              </a:ext>
+            </a:extLst>
+          </p:cNvPr>
+          <p:cNvSpPr/>
+          <p:nvPr/>
+        </p:nvSpPr>
+        <p:spPr>
+          <a:xfrm>
+            <a:off x="7417128" y="2263998"/>
+            <a:ext cx="1129527" cy="586352"/>
+          </a:xfrm>
+          <a:prstGeom prst="rect">
+            <a:avLst/>
+          </a:prstGeom>
+          <a:solidFill>
+            <a:schemeClr val="accent4">
+              <a:lumMod val="20000"/>
+              <a:lumOff val="80000"/>
+            </a:schemeClr>
+          </a:solidFill>
+          <a:ln w="9525" cap="flat" cmpd="sng" algn="ctr">
+            <a:solidFill>
+              <a:schemeClr val="bg1"/>
+            </a:solidFill>
+            <a:prstDash val="solid"/>
+            <a:round/>
+            <a:headEnd type="none" w="med" len="med"/>
+            <a:tailEnd type="none" w="med" len="med"/>
+          </a:ln>
+        </p:spPr>
+        <p:style>
+          <a:lnRef idx="0">
+            <a:scrgbClr r="0" g="0" b="0"/>
+          </a:lnRef>
+          <a:fillRef idx="0">
+            <a:scrgbClr r="0" g="0" b="0"/>
+          </a:fillRef>
+          <a:effectRef idx="0">
+            <a:scrgbClr r="0" g="0" b="0"/>
+          </a:effectRef>
+          <a:fontRef idx="minor">
+            <a:schemeClr val="dk1"/>
+          </a:fontRef>
+        </p:style>
+        <p:txBody>
+          <a:bodyPr rot="0" spcFirstLastPara="0" vertOverflow="overflow" horzOverflow="overflow" vert="horz" wrap="square" lIns="68580" tIns="34290" rIns="68580" bIns="34290" numCol="1" spcCol="0" rtlCol="0" fromWordArt="0" anchor="ctr" anchorCtr="0" forceAA="0" compatLnSpc="1">
+            <a:prstTxWarp prst="textNoShape">
+              <a:avLst/>
+            </a:prstTxWarp>
+            <a:noAutofit/>
+          </a:bodyPr>
+          <a:lstStyle/>
+          <a:p>
+            <a:pPr algn="ctr"/>
+            <a:r>
+              <a:rPr lang="en-CA" sz="1050" dirty="0"/>
+              <a:t>Data aggregated by state (number of legislative responses)</a:t>
+            </a:r>
+          </a:p>
+        </p:txBody>
+      </p:sp>
+      <p:sp>
+        <p:nvSpPr>
+          <p:cNvPr id="77" name="Rectangle 76">
+            <a:extLst>
+              <a:ext uri="{FF2B5EF4-FFF2-40B4-BE49-F238E27FC236}">
+                <a16:creationId xmlns:a16="http://schemas.microsoft.com/office/drawing/2014/main" id="{2A942097-6503-44E9-8D4A-5FD8C24E20A4}"/>
+              </a:ext>
+            </a:extLst>
+          </p:cNvPr>
+          <p:cNvSpPr/>
+          <p:nvPr/>
+        </p:nvSpPr>
+        <p:spPr>
+          <a:xfrm>
+            <a:off x="470756" y="3194280"/>
+            <a:ext cx="1044785" cy="583726"/>
+          </a:xfrm>
+          <a:prstGeom prst="rect">
+            <a:avLst/>
+          </a:prstGeom>
+          <a:pattFill prst="wdUpDiag">
+            <a:fgClr>
+              <a:srgbClr val="DEEBF7"/>
+            </a:fgClr>
+            <a:bgClr>
+              <a:schemeClr val="bg1"/>
+            </a:bgClr>
+          </a:pattFill>
+          <a:ln w="9525" cap="flat" cmpd="sng" algn="ctr">
+            <a:solidFill>
+              <a:schemeClr val="bg1"/>
+            </a:solidFill>
+            <a:prstDash val="solid"/>
+            <a:round/>
+            <a:headEnd type="none" w="med" len="med"/>
+            <a:tailEnd type="none" w="med" len="med"/>
+          </a:ln>
+        </p:spPr>
+        <p:style>
+          <a:lnRef idx="0">
+            <a:scrgbClr r="0" g="0" b="0"/>
+          </a:lnRef>
+          <a:fillRef idx="0">
+            <a:scrgbClr r="0" g="0" b="0"/>
+          </a:fillRef>
+          <a:effectRef idx="0">
+            <a:scrgbClr r="0" g="0" b="0"/>
+          </a:effectRef>
+          <a:fontRef idx="minor">
+            <a:schemeClr val="dk1"/>
+          </a:fontRef>
+        </p:style>
+        <p:txBody>
+          <a:bodyPr rot="0" spcFirstLastPara="0" vertOverflow="overflow" horzOverflow="overflow" vert="horz" wrap="square" lIns="68580" tIns="34290" rIns="68580" bIns="34290" numCol="1" spcCol="0" rtlCol="0" fromWordArt="0" anchor="ctr" anchorCtr="0" forceAA="0" compatLnSpc="1">
+            <a:prstTxWarp prst="textNoShape">
+              <a:avLst/>
+            </a:prstTxWarp>
+            <a:noAutofit/>
+          </a:bodyPr>
+          <a:lstStyle/>
+          <a:p>
+            <a:pPr algn="ctr"/>
+            <a:r>
+              <a:rPr lang="en-CA" sz="1200" b="1" dirty="0"/>
+              <a:t>Time series modelling</a:t>
+            </a:r>
+          </a:p>
+        </p:txBody>
+      </p:sp>
+      <p:sp>
+        <p:nvSpPr>
+          <p:cNvPr id="78" name="Rectangle 77">
+            <a:extLst>
+              <a:ext uri="{FF2B5EF4-FFF2-40B4-BE49-F238E27FC236}">
+                <a16:creationId xmlns:a16="http://schemas.microsoft.com/office/drawing/2014/main" id="{BEEEF74C-4747-47F3-AD86-F185BCA51D5F}"/>
+              </a:ext>
+            </a:extLst>
+          </p:cNvPr>
+          <p:cNvSpPr/>
+          <p:nvPr/>
+        </p:nvSpPr>
+        <p:spPr>
+          <a:xfrm>
+            <a:off x="468269" y="4156141"/>
+            <a:ext cx="1044785" cy="583726"/>
+          </a:xfrm>
+          <a:prstGeom prst="rect">
+            <a:avLst/>
+          </a:prstGeom>
+          <a:pattFill prst="wdUpDiag">
+            <a:fgClr>
+              <a:srgbClr val="FF9696"/>
+            </a:fgClr>
+            <a:bgClr>
+              <a:schemeClr val="bg1"/>
+            </a:bgClr>
+          </a:pattFill>
+          <a:ln w="9525" cap="flat" cmpd="sng" algn="ctr">
+            <a:solidFill>
+              <a:schemeClr val="bg1"/>
+            </a:solidFill>
+            <a:prstDash val="solid"/>
+            <a:round/>
+            <a:headEnd type="none" w="med" len="med"/>
+            <a:tailEnd type="none" w="med" len="med"/>
+          </a:ln>
+        </p:spPr>
+        <p:style>
+          <a:lnRef idx="0">
+            <a:scrgbClr r="0" g="0" b="0"/>
+          </a:lnRef>
+          <a:fillRef idx="0">
+            <a:scrgbClr r="0" g="0" b="0"/>
+          </a:fillRef>
+          <a:effectRef idx="0">
+            <a:scrgbClr r="0" g="0" b="0"/>
+          </a:effectRef>
+          <a:fontRef idx="minor">
+            <a:schemeClr val="dk1"/>
+          </a:fontRef>
+        </p:style>
+        <p:txBody>
+          <a:bodyPr rot="0" spcFirstLastPara="0" vertOverflow="overflow" horzOverflow="overflow" vert="horz" wrap="square" lIns="68580" tIns="34290" rIns="68580" bIns="34290" numCol="1" spcCol="0" rtlCol="0" fromWordArt="0" anchor="ctr" anchorCtr="0" forceAA="0" compatLnSpc="1">
+            <a:prstTxWarp prst="textNoShape">
+              <a:avLst/>
+            </a:prstTxWarp>
+            <a:noAutofit/>
+          </a:bodyPr>
+          <a:lstStyle/>
+          <a:p>
+            <a:pPr algn="ctr"/>
+            <a:r>
+              <a:rPr lang="en-CA" sz="1200" b="1" dirty="0"/>
+              <a:t>Regression Analysis</a:t>
+            </a:r>
+          </a:p>
+        </p:txBody>
+      </p:sp>
+      <p:sp>
+        <p:nvSpPr>
+          <p:cNvPr id="79" name="Rectangle 78">
+            <a:extLst>
+              <a:ext uri="{FF2B5EF4-FFF2-40B4-BE49-F238E27FC236}">
+                <a16:creationId xmlns:a16="http://schemas.microsoft.com/office/drawing/2014/main" id="{241ADCA2-C1C0-4D8E-B761-6EA21FDD6D9C}"/>
+              </a:ext>
+            </a:extLst>
+          </p:cNvPr>
+          <p:cNvSpPr/>
+          <p:nvPr/>
+        </p:nvSpPr>
+        <p:spPr>
+          <a:xfrm>
+            <a:off x="6977660" y="4163755"/>
+            <a:ext cx="1518577" cy="583726"/>
+          </a:xfrm>
+          <a:prstGeom prst="rect">
+            <a:avLst/>
+          </a:prstGeom>
+          <a:solidFill>
+            <a:srgbClr val="FF0000">
+              <a:alpha val="41176"/>
+            </a:srgbClr>
+          </a:solidFill>
+          <a:ln w="9525" cap="flat" cmpd="sng" algn="ctr">
+            <a:solidFill>
+              <a:schemeClr val="bg1"/>
+            </a:solidFill>
+            <a:prstDash val="solid"/>
+            <a:round/>
+            <a:headEnd type="none" w="med" len="med"/>
+            <a:tailEnd type="none" w="med" len="med"/>
+          </a:ln>
+        </p:spPr>
+        <p:style>
+          <a:lnRef idx="0">
+            <a:scrgbClr r="0" g="0" b="0"/>
+          </a:lnRef>
+          <a:fillRef idx="0">
+            <a:scrgbClr r="0" g="0" b="0"/>
+          </a:fillRef>
+          <a:effectRef idx="0">
+            <a:scrgbClr r="0" g="0" b="0"/>
+          </a:effectRef>
+          <a:fontRef idx="minor">
+            <a:schemeClr val="dk1"/>
+          </a:fontRef>
+        </p:style>
+        <p:txBody>
+          <a:bodyPr rot="0" spcFirstLastPara="0" vertOverflow="overflow" horzOverflow="overflow" vert="horz" wrap="square" lIns="68580" tIns="34290" rIns="68580" bIns="34290" numCol="1" spcCol="0" rtlCol="0" fromWordArt="0" anchor="ctr" anchorCtr="0" forceAA="0" compatLnSpc="1">
+            <a:prstTxWarp prst="textNoShape">
+              <a:avLst/>
+            </a:prstTxWarp>
+            <a:noAutofit/>
+          </a:bodyPr>
+          <a:lstStyle/>
+          <a:p>
+            <a:pPr algn="ctr"/>
+            <a:r>
               <a:rPr lang="en-CA" sz="1200" dirty="0"/>
-              <a:t>Data aggregated by day (count)</a:t>
+              <a:t>Physical protest vs. legislation count</a:t>
             </a:r>
           </a:p>
         </p:txBody>
       </p:sp>
       <p:cxnSp>
         <p:nvCxnSpPr>
-          <p:cNvPr id="91" name="Connector: Elbow 90">
+          <p:cNvPr id="80" name="Straight Arrow Connector 79">
             <a:extLst>
               <a:ext uri="{FF2B5EF4-FFF2-40B4-BE49-F238E27FC236}">
-                <a16:creationId xmlns:a16="http://schemas.microsoft.com/office/drawing/2014/main" id="{2C44B76C-A129-4512-A0AD-E76EE6527EEC}"/>
+                <a16:creationId xmlns:a16="http://schemas.microsoft.com/office/drawing/2014/main" id="{E8DDC71E-D834-4259-9A6D-E662814EC3DC}"/>
               </a:ext>
             </a:extLst>
           </p:cNvPr>
           <p:cNvCxnSpPr>
             <a:cxnSpLocks/>
-            <a:stCxn id="9" idx="1"/>
-            <a:endCxn id="29" idx="3"/>
+            <a:stCxn id="75" idx="2"/>
+            <a:endCxn id="106" idx="0"/>
           </p:cNvCxnSpPr>
           <p:nvPr/>
         </p:nvCxnSpPr>
         <p:spPr>
+          <a:xfrm>
+            <a:off x="2624501" y="2866180"/>
+            <a:ext cx="1670" cy="1287324"/>
+          </a:xfrm>
+          <a:prstGeom prst="straightConnector1">
+            <a:avLst/>
+          </a:prstGeom>
+          <a:ln w="28575">
+            <a:tailEnd type="triangle"/>
+          </a:ln>
+        </p:spPr>
+        <p:style>
+          <a:lnRef idx="1">
+            <a:schemeClr val="dk1"/>
+          </a:lnRef>
+          <a:fillRef idx="0">
+            <a:schemeClr val="dk1"/>
+          </a:fillRef>
+          <a:effectRef idx="0">
+            <a:schemeClr val="dk1"/>
+          </a:effectRef>
+          <a:fontRef idx="minor">
+            <a:schemeClr val="tx1"/>
+          </a:fontRef>
+        </p:style>
+      </p:cxnSp>
+      <p:sp>
+        <p:nvSpPr>
+          <p:cNvPr id="81" name="Rectangle 80">
+            <a:extLst>
+              <a:ext uri="{FF2B5EF4-FFF2-40B4-BE49-F238E27FC236}">
+                <a16:creationId xmlns:a16="http://schemas.microsoft.com/office/drawing/2014/main" id="{2219B078-F62E-475B-B810-50B361D3BD7E}"/>
+              </a:ext>
+            </a:extLst>
+          </p:cNvPr>
+          <p:cNvSpPr/>
+          <p:nvPr/>
+        </p:nvSpPr>
+        <p:spPr>
+          <a:xfrm>
+            <a:off x="4790363" y="5085383"/>
+            <a:ext cx="982174" cy="583726"/>
+          </a:xfrm>
+          <a:prstGeom prst="rect">
+            <a:avLst/>
+          </a:prstGeom>
+          <a:solidFill>
+            <a:schemeClr val="accent4">
+              <a:lumMod val="75000"/>
+              <a:alpha val="41176"/>
+            </a:schemeClr>
+          </a:solidFill>
+          <a:ln w="9525" cap="flat" cmpd="sng" algn="ctr">
+            <a:solidFill>
+              <a:schemeClr val="bg1"/>
+            </a:solidFill>
+            <a:prstDash val="solid"/>
+            <a:round/>
+            <a:headEnd type="none" w="med" len="med"/>
+            <a:tailEnd type="none" w="med" len="med"/>
+          </a:ln>
+        </p:spPr>
+        <p:style>
+          <a:lnRef idx="0">
+            <a:scrgbClr r="0" g="0" b="0"/>
+          </a:lnRef>
+          <a:fillRef idx="0">
+            <a:scrgbClr r="0" g="0" b="0"/>
+          </a:fillRef>
+          <a:effectRef idx="0">
+            <a:scrgbClr r="0" g="0" b="0"/>
+          </a:effectRef>
+          <a:fontRef idx="minor">
+            <a:schemeClr val="dk1"/>
+          </a:fontRef>
+        </p:style>
+        <p:txBody>
+          <a:bodyPr rot="0" spcFirstLastPara="0" vertOverflow="overflow" horzOverflow="overflow" vert="horz" wrap="square" lIns="68580" tIns="34290" rIns="68580" bIns="34290" numCol="1" spcCol="0" rtlCol="0" fromWordArt="0" anchor="ctr" anchorCtr="0" forceAA="0" compatLnSpc="1">
+            <a:prstTxWarp prst="textNoShape">
+              <a:avLst/>
+            </a:prstTxWarp>
+            <a:noAutofit/>
+          </a:bodyPr>
+          <a:lstStyle/>
+          <a:p>
+            <a:pPr algn="ctr"/>
+            <a:r>
+              <a:rPr lang="en-CA" sz="1200" dirty="0"/>
+              <a:t>Community detection</a:t>
+            </a:r>
+          </a:p>
+        </p:txBody>
+      </p:sp>
+      <p:cxnSp>
+        <p:nvCxnSpPr>
+          <p:cNvPr id="83" name="Straight Arrow Connector 82">
+            <a:extLst>
+              <a:ext uri="{FF2B5EF4-FFF2-40B4-BE49-F238E27FC236}">
+                <a16:creationId xmlns:a16="http://schemas.microsoft.com/office/drawing/2014/main" id="{62E273B8-828A-4130-8E58-8665061D1902}"/>
+              </a:ext>
+            </a:extLst>
+          </p:cNvPr>
+          <p:cNvCxnSpPr>
+            <a:cxnSpLocks/>
+            <a:stCxn id="68" idx="2"/>
+            <a:endCxn id="75" idx="0"/>
+          </p:cNvCxnSpPr>
+          <p:nvPr/>
+        </p:nvCxnSpPr>
+        <p:spPr>
+          <a:xfrm flipH="1">
+            <a:off x="2624501" y="1892683"/>
+            <a:ext cx="3340" cy="353910"/>
+          </a:xfrm>
+          <a:prstGeom prst="straightConnector1">
+            <a:avLst/>
+          </a:prstGeom>
+          <a:ln w="28575">
+            <a:tailEnd type="triangle"/>
+          </a:ln>
+        </p:spPr>
+        <p:style>
+          <a:lnRef idx="1">
+            <a:schemeClr val="dk1"/>
+          </a:lnRef>
+          <a:fillRef idx="0">
+            <a:schemeClr val="dk1"/>
+          </a:fillRef>
+          <a:effectRef idx="0">
+            <a:schemeClr val="dk1"/>
+          </a:effectRef>
+          <a:fontRef idx="minor">
+            <a:schemeClr val="tx1"/>
+          </a:fontRef>
+        </p:style>
+      </p:cxnSp>
+      <p:sp>
+        <p:nvSpPr>
+          <p:cNvPr id="84" name="Rectangle 83">
+            <a:extLst>
+              <a:ext uri="{FF2B5EF4-FFF2-40B4-BE49-F238E27FC236}">
+                <a16:creationId xmlns:a16="http://schemas.microsoft.com/office/drawing/2014/main" id="{E8442263-D4D2-4EA5-9934-E3263AF44EE9}"/>
+              </a:ext>
+            </a:extLst>
+          </p:cNvPr>
+          <p:cNvSpPr/>
+          <p:nvPr/>
+        </p:nvSpPr>
+        <p:spPr>
+          <a:xfrm>
+            <a:off x="477060" y="5088263"/>
+            <a:ext cx="1044785" cy="583726"/>
+          </a:xfrm>
+          <a:prstGeom prst="rect">
+            <a:avLst/>
+          </a:prstGeom>
+          <a:pattFill prst="wdUpDiag">
+            <a:fgClr>
+              <a:srgbClr val="E5D196"/>
+            </a:fgClr>
+            <a:bgClr>
+              <a:schemeClr val="bg1"/>
+            </a:bgClr>
+          </a:pattFill>
+          <a:ln w="9525" cap="flat" cmpd="sng" algn="ctr">
+            <a:solidFill>
+              <a:schemeClr val="bg1"/>
+            </a:solidFill>
+            <a:prstDash val="solid"/>
+            <a:round/>
+            <a:headEnd type="none" w="med" len="med"/>
+            <a:tailEnd type="none" w="med" len="med"/>
+          </a:ln>
+        </p:spPr>
+        <p:style>
+          <a:lnRef idx="0">
+            <a:scrgbClr r="0" g="0" b="0"/>
+          </a:lnRef>
+          <a:fillRef idx="0">
+            <a:scrgbClr r="0" g="0" b="0"/>
+          </a:fillRef>
+          <a:effectRef idx="0">
+            <a:scrgbClr r="0" g="0" b="0"/>
+          </a:effectRef>
+          <a:fontRef idx="minor">
+            <a:schemeClr val="dk1"/>
+          </a:fontRef>
+        </p:style>
+        <p:txBody>
+          <a:bodyPr rot="0" spcFirstLastPara="0" vertOverflow="overflow" horzOverflow="overflow" vert="horz" wrap="square" lIns="68580" tIns="34290" rIns="68580" bIns="34290" numCol="1" spcCol="0" rtlCol="0" fromWordArt="0" anchor="ctr" anchorCtr="0" forceAA="0" compatLnSpc="1">
+            <a:prstTxWarp prst="textNoShape">
+              <a:avLst/>
+            </a:prstTxWarp>
+            <a:noAutofit/>
+          </a:bodyPr>
+          <a:lstStyle/>
+          <a:p>
+            <a:pPr algn="ctr"/>
+            <a:r>
+              <a:rPr lang="en-CA" sz="1200" b="1" dirty="0"/>
+              <a:t>Network Modelling</a:t>
+            </a:r>
+          </a:p>
+        </p:txBody>
+      </p:sp>
+      <p:sp>
+        <p:nvSpPr>
+          <p:cNvPr id="85" name="Rectangle 84">
+            <a:extLst>
+              <a:ext uri="{FF2B5EF4-FFF2-40B4-BE49-F238E27FC236}">
+                <a16:creationId xmlns:a16="http://schemas.microsoft.com/office/drawing/2014/main" id="{E4D96BD7-8364-4532-8E58-8BBD68865274}"/>
+              </a:ext>
+            </a:extLst>
+          </p:cNvPr>
+          <p:cNvSpPr/>
+          <p:nvPr/>
+        </p:nvSpPr>
+        <p:spPr>
+          <a:xfrm>
+            <a:off x="6475843" y="375370"/>
+            <a:ext cx="1199708" cy="583726"/>
+          </a:xfrm>
+          <a:prstGeom prst="rect">
+            <a:avLst/>
+          </a:prstGeom>
+          <a:solidFill>
+            <a:schemeClr val="accent6">
+              <a:lumMod val="20000"/>
+              <a:lumOff val="80000"/>
+            </a:schemeClr>
+          </a:solidFill>
+          <a:ln w="9525" cap="flat" cmpd="sng" algn="ctr">
+            <a:solidFill>
+              <a:schemeClr val="bg1"/>
+            </a:solidFill>
+            <a:prstDash val="solid"/>
+            <a:round/>
+            <a:headEnd type="none" w="med" len="med"/>
+            <a:tailEnd type="none" w="med" len="med"/>
+          </a:ln>
+        </p:spPr>
+        <p:style>
+          <a:lnRef idx="0">
+            <a:scrgbClr r="0" g="0" b="0"/>
+          </a:lnRef>
+          <a:fillRef idx="0">
+            <a:scrgbClr r="0" g="0" b="0"/>
+          </a:fillRef>
+          <a:effectRef idx="0">
+            <a:scrgbClr r="0" g="0" b="0"/>
+          </a:effectRef>
+          <a:fontRef idx="minor">
+            <a:schemeClr val="dk1"/>
+          </a:fontRef>
+        </p:style>
+        <p:txBody>
+          <a:bodyPr rot="0" spcFirstLastPara="0" vertOverflow="overflow" horzOverflow="overflow" vert="horz" wrap="square" lIns="68580" tIns="34290" rIns="68580" bIns="34290" numCol="1" spcCol="0" rtlCol="0" fromWordArt="0" anchor="ctr" anchorCtr="0" forceAA="0" compatLnSpc="1">
+            <a:prstTxWarp prst="textNoShape">
+              <a:avLst/>
+            </a:prstTxWarp>
+            <a:noAutofit/>
+          </a:bodyPr>
+          <a:lstStyle/>
+          <a:p>
+            <a:pPr algn="ctr"/>
+            <a:r>
+              <a:rPr lang="en-CA" sz="1200" dirty="0"/>
+              <a:t>NCSL</a:t>
+            </a:r>
+          </a:p>
+        </p:txBody>
+      </p:sp>
+      <p:cxnSp>
+        <p:nvCxnSpPr>
+          <p:cNvPr id="86" name="Straight Connector 85">
+            <a:extLst>
+              <a:ext uri="{FF2B5EF4-FFF2-40B4-BE49-F238E27FC236}">
+                <a16:creationId xmlns:a16="http://schemas.microsoft.com/office/drawing/2014/main" id="{37253051-8F3F-46CF-932D-1DEE018AF49E}"/>
+              </a:ext>
+            </a:extLst>
+          </p:cNvPr>
+          <p:cNvCxnSpPr>
+            <a:cxnSpLocks/>
+          </p:cNvCxnSpPr>
+          <p:nvPr/>
+        </p:nvCxnSpPr>
+        <p:spPr>
+          <a:xfrm>
+            <a:off x="5308168" y="234552"/>
+            <a:ext cx="0" cy="3587261"/>
+          </a:xfrm>
+          <a:prstGeom prst="line">
+            <a:avLst/>
+          </a:prstGeom>
+          <a:ln w="38100">
+            <a:noFill/>
+          </a:ln>
+        </p:spPr>
+        <p:style>
+          <a:lnRef idx="1">
+            <a:schemeClr val="accent1"/>
+          </a:lnRef>
+          <a:fillRef idx="0">
+            <a:schemeClr val="accent1"/>
+          </a:fillRef>
+          <a:effectRef idx="0">
+            <a:schemeClr val="accent1"/>
+          </a:effectRef>
+          <a:fontRef idx="minor">
+            <a:schemeClr val="tx1"/>
+          </a:fontRef>
+        </p:style>
+      </p:cxnSp>
+      <p:cxnSp>
+        <p:nvCxnSpPr>
+          <p:cNvPr id="87" name="Straight Connector 86">
+            <a:extLst>
+              <a:ext uri="{FF2B5EF4-FFF2-40B4-BE49-F238E27FC236}">
+                <a16:creationId xmlns:a16="http://schemas.microsoft.com/office/drawing/2014/main" id="{09A45C7A-A09A-440A-900F-32DE2F63F7D2}"/>
+              </a:ext>
+            </a:extLst>
+          </p:cNvPr>
+          <p:cNvCxnSpPr>
+            <a:cxnSpLocks/>
+          </p:cNvCxnSpPr>
+          <p:nvPr/>
+        </p:nvCxnSpPr>
+        <p:spPr>
+          <a:xfrm flipH="1">
+            <a:off x="3366623" y="4584902"/>
+            <a:ext cx="1939059" cy="0"/>
+          </a:xfrm>
+          <a:prstGeom prst="line">
+            <a:avLst/>
+          </a:prstGeom>
+          <a:ln w="38100">
+            <a:noFill/>
+          </a:ln>
+        </p:spPr>
+        <p:style>
+          <a:lnRef idx="1">
+            <a:schemeClr val="accent1"/>
+          </a:lnRef>
+          <a:fillRef idx="0">
+            <a:schemeClr val="accent1"/>
+          </a:fillRef>
+          <a:effectRef idx="0">
+            <a:schemeClr val="accent1"/>
+          </a:effectRef>
+          <a:fontRef idx="minor">
+            <a:schemeClr val="tx1"/>
+          </a:fontRef>
+        </p:style>
+      </p:cxnSp>
+      <p:cxnSp>
+        <p:nvCxnSpPr>
+          <p:cNvPr id="88" name="Straight Connector 87">
+            <a:extLst>
+              <a:ext uri="{FF2B5EF4-FFF2-40B4-BE49-F238E27FC236}">
+                <a16:creationId xmlns:a16="http://schemas.microsoft.com/office/drawing/2014/main" id="{F32B52A0-7E10-4803-9BDC-C52440ABD528}"/>
+              </a:ext>
+            </a:extLst>
+          </p:cNvPr>
+          <p:cNvCxnSpPr>
+            <a:cxnSpLocks/>
+          </p:cNvCxnSpPr>
+          <p:nvPr/>
+        </p:nvCxnSpPr>
+        <p:spPr>
+          <a:xfrm flipV="1">
+            <a:off x="8474652" y="234552"/>
+            <a:ext cx="0" cy="5653454"/>
+          </a:xfrm>
+          <a:prstGeom prst="line">
+            <a:avLst/>
+          </a:prstGeom>
+          <a:ln w="38100">
+            <a:noFill/>
+          </a:ln>
+        </p:spPr>
+        <p:style>
+          <a:lnRef idx="1">
+            <a:schemeClr val="accent1"/>
+          </a:lnRef>
+          <a:fillRef idx="0">
+            <a:schemeClr val="accent1"/>
+          </a:fillRef>
+          <a:effectRef idx="0">
+            <a:schemeClr val="accent1"/>
+          </a:effectRef>
+          <a:fontRef idx="minor">
+            <a:schemeClr val="tx1"/>
+          </a:fontRef>
+        </p:style>
+      </p:cxnSp>
+      <p:cxnSp>
+        <p:nvCxnSpPr>
+          <p:cNvPr id="89" name="Straight Connector 88">
+            <a:extLst>
+              <a:ext uri="{FF2B5EF4-FFF2-40B4-BE49-F238E27FC236}">
+                <a16:creationId xmlns:a16="http://schemas.microsoft.com/office/drawing/2014/main" id="{2BB341DA-A652-4E65-96D0-B8AD2572E967}"/>
+              </a:ext>
+            </a:extLst>
+          </p:cNvPr>
+          <p:cNvCxnSpPr>
+            <a:cxnSpLocks/>
+          </p:cNvCxnSpPr>
+          <p:nvPr/>
+        </p:nvCxnSpPr>
+        <p:spPr>
+          <a:xfrm flipH="1">
+            <a:off x="5308169" y="234552"/>
+            <a:ext cx="3175275" cy="0"/>
+          </a:xfrm>
+          <a:prstGeom prst="line">
+            <a:avLst/>
+          </a:prstGeom>
+          <a:ln w="38100">
+            <a:noFill/>
+          </a:ln>
+        </p:spPr>
+        <p:style>
+          <a:lnRef idx="1">
+            <a:schemeClr val="accent1"/>
+          </a:lnRef>
+          <a:fillRef idx="0">
+            <a:schemeClr val="accent1"/>
+          </a:fillRef>
+          <a:effectRef idx="0">
+            <a:schemeClr val="accent1"/>
+          </a:effectRef>
+          <a:fontRef idx="minor">
+            <a:schemeClr val="tx1"/>
+          </a:fontRef>
+        </p:style>
+      </p:cxnSp>
+      <p:sp>
+        <p:nvSpPr>
+          <p:cNvPr id="90" name="Rectangle 89">
+            <a:extLst>
+              <a:ext uri="{FF2B5EF4-FFF2-40B4-BE49-F238E27FC236}">
+                <a16:creationId xmlns:a16="http://schemas.microsoft.com/office/drawing/2014/main" id="{6DF6ED2B-97E4-4050-AB49-474A4975FF93}"/>
+              </a:ext>
+            </a:extLst>
+          </p:cNvPr>
+          <p:cNvSpPr/>
+          <p:nvPr/>
+        </p:nvSpPr>
+        <p:spPr>
+          <a:xfrm>
+            <a:off x="1744140" y="234552"/>
+            <a:ext cx="3447943" cy="3121269"/>
+          </a:xfrm>
+          <a:prstGeom prst="rect">
+            <a:avLst/>
+          </a:prstGeom>
+          <a:noFill/>
+          <a:ln w="38100">
+            <a:noFill/>
+          </a:ln>
+        </p:spPr>
+        <p:style>
+          <a:lnRef idx="2">
+            <a:schemeClr val="accent1">
+              <a:shade val="50000"/>
+            </a:schemeClr>
+          </a:lnRef>
+          <a:fillRef idx="1">
+            <a:schemeClr val="accent1"/>
+          </a:fillRef>
+          <a:effectRef idx="0">
+            <a:schemeClr val="accent1"/>
+          </a:effectRef>
+          <a:fontRef idx="minor">
+            <a:schemeClr val="lt1"/>
+          </a:fontRef>
+        </p:style>
+        <p:txBody>
+          <a:bodyPr rtlCol="0" anchor="ctr"/>
+          <a:lstStyle/>
+          <a:p>
+            <a:pPr algn="ctr"/>
+            <a:endParaRPr lang="en-CA">
+              <a:solidFill>
+                <a:schemeClr val="bg1"/>
+              </a:solidFill>
+            </a:endParaRPr>
+          </a:p>
+        </p:txBody>
+      </p:sp>
+      <p:sp>
+        <p:nvSpPr>
+          <p:cNvPr id="92" name="Rectangle 91">
+            <a:extLst>
+              <a:ext uri="{FF2B5EF4-FFF2-40B4-BE49-F238E27FC236}">
+                <a16:creationId xmlns:a16="http://schemas.microsoft.com/office/drawing/2014/main" id="{91197B83-94B7-44A8-8561-09B11AA95644}"/>
+              </a:ext>
+            </a:extLst>
+          </p:cNvPr>
+          <p:cNvSpPr/>
+          <p:nvPr/>
+        </p:nvSpPr>
+        <p:spPr>
+          <a:xfrm>
+            <a:off x="3493972" y="383647"/>
+            <a:ext cx="1199708" cy="583726"/>
+          </a:xfrm>
+          <a:prstGeom prst="rect">
+            <a:avLst/>
+          </a:prstGeom>
+          <a:solidFill>
+            <a:schemeClr val="accent6">
+              <a:lumMod val="20000"/>
+              <a:lumOff val="80000"/>
+            </a:schemeClr>
+          </a:solidFill>
+          <a:ln w="9525" cap="flat" cmpd="sng" algn="ctr">
+            <a:solidFill>
+              <a:schemeClr val="bg1"/>
+            </a:solidFill>
+            <a:prstDash val="solid"/>
+            <a:round/>
+            <a:headEnd type="none" w="med" len="med"/>
+            <a:tailEnd type="none" w="med" len="med"/>
+          </a:ln>
+        </p:spPr>
+        <p:style>
+          <a:lnRef idx="0">
+            <a:scrgbClr r="0" g="0" b="0"/>
+          </a:lnRef>
+          <a:fillRef idx="0">
+            <a:scrgbClr r="0" g="0" b="0"/>
+          </a:fillRef>
+          <a:effectRef idx="0">
+            <a:scrgbClr r="0" g="0" b="0"/>
+          </a:effectRef>
+          <a:fontRef idx="minor">
+            <a:schemeClr val="dk1"/>
+          </a:fontRef>
+        </p:style>
+        <p:txBody>
+          <a:bodyPr rot="0" spcFirstLastPara="0" vertOverflow="overflow" horzOverflow="overflow" vert="horz" wrap="square" lIns="68580" tIns="34290" rIns="68580" bIns="34290" numCol="1" spcCol="0" rtlCol="0" fromWordArt="0" anchor="ctr" anchorCtr="0" forceAA="0" compatLnSpc="1">
+            <a:prstTxWarp prst="textNoShape">
+              <a:avLst/>
+            </a:prstTxWarp>
+            <a:noAutofit/>
+          </a:bodyPr>
+          <a:lstStyle/>
+          <a:p>
+            <a:pPr algn="ctr"/>
+            <a:r>
+              <a:rPr lang="en-CA" sz="1200" dirty="0"/>
+              <a:t>ACLED</a:t>
+            </a:r>
+          </a:p>
+        </p:txBody>
+      </p:sp>
+      <p:cxnSp>
+        <p:nvCxnSpPr>
+          <p:cNvPr id="93" name="Connector: Elbow 92">
+            <a:extLst>
+              <a:ext uri="{FF2B5EF4-FFF2-40B4-BE49-F238E27FC236}">
+                <a16:creationId xmlns:a16="http://schemas.microsoft.com/office/drawing/2014/main" id="{3E5FB78A-9918-4A1F-BA66-4155D49B26FA}"/>
+              </a:ext>
+            </a:extLst>
+          </p:cNvPr>
+          <p:cNvCxnSpPr>
+            <a:cxnSpLocks/>
+            <a:stCxn id="64" idx="2"/>
+            <a:endCxn id="69" idx="0"/>
+          </p:cNvCxnSpPr>
+          <p:nvPr/>
+        </p:nvCxnSpPr>
+        <p:spPr>
+          <a:xfrm rot="5400000">
+            <a:off x="4951646" y="700119"/>
+            <a:ext cx="318813" cy="902597"/>
+          </a:xfrm>
+          <a:prstGeom prst="bentConnector3">
+            <a:avLst>
+              <a:gd name="adj1" fmla="val 50000"/>
+            </a:avLst>
+          </a:prstGeom>
+          <a:ln w="28575">
+            <a:tailEnd type="triangle"/>
+          </a:ln>
+        </p:spPr>
+        <p:style>
+          <a:lnRef idx="1">
+            <a:schemeClr val="dk1"/>
+          </a:lnRef>
+          <a:fillRef idx="0">
+            <a:schemeClr val="dk1"/>
+          </a:fillRef>
+          <a:effectRef idx="0">
+            <a:schemeClr val="dk1"/>
+          </a:effectRef>
+          <a:fontRef idx="minor">
+            <a:schemeClr val="tx1"/>
+          </a:fontRef>
+        </p:style>
+      </p:cxnSp>
+      <p:sp>
+        <p:nvSpPr>
+          <p:cNvPr id="94" name="Rectangle 93">
+            <a:extLst>
+              <a:ext uri="{FF2B5EF4-FFF2-40B4-BE49-F238E27FC236}">
+                <a16:creationId xmlns:a16="http://schemas.microsoft.com/office/drawing/2014/main" id="{7AF75749-2311-4CFD-8E49-6E7DC851E7A8}"/>
+              </a:ext>
+            </a:extLst>
+          </p:cNvPr>
+          <p:cNvSpPr/>
+          <p:nvPr/>
+        </p:nvSpPr>
+        <p:spPr>
+          <a:xfrm>
+            <a:off x="6417676" y="1323078"/>
+            <a:ext cx="1319273" cy="583726"/>
+          </a:xfrm>
+          <a:prstGeom prst="rect">
+            <a:avLst/>
+          </a:prstGeom>
+          <a:solidFill>
+            <a:schemeClr val="accent2">
+              <a:lumMod val="20000"/>
+              <a:lumOff val="80000"/>
+            </a:schemeClr>
+          </a:solidFill>
+          <a:ln w="9525" cap="flat" cmpd="sng" algn="ctr">
+            <a:solidFill>
+              <a:schemeClr val="bg1"/>
+            </a:solidFill>
+            <a:prstDash val="solid"/>
+            <a:round/>
+            <a:headEnd type="none" w="med" len="med"/>
+            <a:tailEnd type="none" w="med" len="med"/>
+          </a:ln>
+        </p:spPr>
+        <p:style>
+          <a:lnRef idx="0">
+            <a:scrgbClr r="0" g="0" b="0"/>
+          </a:lnRef>
+          <a:fillRef idx="0">
+            <a:scrgbClr r="0" g="0" b="0"/>
+          </a:fillRef>
+          <a:effectRef idx="0">
+            <a:scrgbClr r="0" g="0" b="0"/>
+          </a:effectRef>
+          <a:fontRef idx="minor">
+            <a:schemeClr val="dk1"/>
+          </a:fontRef>
+        </p:style>
+        <p:txBody>
+          <a:bodyPr rot="0" spcFirstLastPara="0" vertOverflow="overflow" horzOverflow="overflow" vert="horz" wrap="square" lIns="68580" tIns="34290" rIns="68580" bIns="34290" numCol="1" spcCol="0" rtlCol="0" fromWordArt="0" anchor="ctr" anchorCtr="0" forceAA="0" compatLnSpc="1">
+            <a:prstTxWarp prst="textNoShape">
+              <a:avLst/>
+            </a:prstTxWarp>
+            <a:noAutofit/>
+          </a:bodyPr>
+          <a:lstStyle/>
+          <a:p>
+            <a:pPr algn="ctr"/>
+            <a:r>
+              <a:rPr lang="en-CA" sz="1000" dirty="0"/>
+              <a:t>State level legislative responses to policing</a:t>
+            </a:r>
+          </a:p>
+        </p:txBody>
+      </p:sp>
+      <p:cxnSp>
+        <p:nvCxnSpPr>
+          <p:cNvPr id="95" name="Connector: Elbow 94">
+            <a:extLst>
+              <a:ext uri="{FF2B5EF4-FFF2-40B4-BE49-F238E27FC236}">
+                <a16:creationId xmlns:a16="http://schemas.microsoft.com/office/drawing/2014/main" id="{E952F000-22B5-4C09-B53B-CB6DC4E56804}"/>
+              </a:ext>
+            </a:extLst>
+          </p:cNvPr>
+          <p:cNvCxnSpPr>
+            <a:cxnSpLocks/>
+            <a:stCxn id="85" idx="2"/>
+            <a:endCxn id="94" idx="0"/>
+          </p:cNvCxnSpPr>
+          <p:nvPr/>
+        </p:nvCxnSpPr>
+        <p:spPr>
+          <a:xfrm rot="16200000" flipH="1">
+            <a:off x="6894514" y="1140279"/>
+            <a:ext cx="363982" cy="1616"/>
+          </a:xfrm>
+          <a:prstGeom prst="bentConnector3">
+            <a:avLst>
+              <a:gd name="adj1" fmla="val 50000"/>
+            </a:avLst>
+          </a:prstGeom>
+          <a:ln w="28575">
+            <a:tailEnd type="triangle"/>
+          </a:ln>
+        </p:spPr>
+        <p:style>
+          <a:lnRef idx="1">
+            <a:schemeClr val="dk1"/>
+          </a:lnRef>
+          <a:fillRef idx="0">
+            <a:schemeClr val="dk1"/>
+          </a:fillRef>
+          <a:effectRef idx="0">
+            <a:schemeClr val="dk1"/>
+          </a:effectRef>
+          <a:fontRef idx="minor">
+            <a:schemeClr val="tx1"/>
+          </a:fontRef>
+        </p:style>
+      </p:cxnSp>
+      <p:cxnSp>
+        <p:nvCxnSpPr>
+          <p:cNvPr id="96" name="Connector: Elbow 95">
+            <a:extLst>
+              <a:ext uri="{FF2B5EF4-FFF2-40B4-BE49-F238E27FC236}">
+                <a16:creationId xmlns:a16="http://schemas.microsoft.com/office/drawing/2014/main" id="{50170593-A485-4771-87F8-5D4AF676BABC}"/>
+              </a:ext>
+            </a:extLst>
+          </p:cNvPr>
+          <p:cNvCxnSpPr>
+            <a:cxnSpLocks/>
+            <a:stCxn id="92" idx="2"/>
+            <a:endCxn id="69" idx="0"/>
+          </p:cNvCxnSpPr>
+          <p:nvPr/>
+        </p:nvCxnSpPr>
+        <p:spPr>
+          <a:xfrm rot="16200000" flipH="1">
+            <a:off x="4205064" y="856134"/>
+            <a:ext cx="343451" cy="565927"/>
+          </a:xfrm>
+          <a:prstGeom prst="bentConnector3">
+            <a:avLst>
+              <a:gd name="adj1" fmla="val 50000"/>
+            </a:avLst>
+          </a:prstGeom>
+          <a:ln w="28575">
+            <a:tailEnd type="triangle"/>
+          </a:ln>
+        </p:spPr>
+        <p:style>
+          <a:lnRef idx="1">
+            <a:schemeClr val="dk1"/>
+          </a:lnRef>
+          <a:fillRef idx="0">
+            <a:schemeClr val="dk1"/>
+          </a:fillRef>
+          <a:effectRef idx="0">
+            <a:schemeClr val="dk1"/>
+          </a:effectRef>
+          <a:fontRef idx="minor">
+            <a:schemeClr val="tx1"/>
+          </a:fontRef>
+        </p:style>
+      </p:cxnSp>
+      <p:sp>
+        <p:nvSpPr>
+          <p:cNvPr id="97" name="Rectangle 96">
+            <a:extLst>
+              <a:ext uri="{FF2B5EF4-FFF2-40B4-BE49-F238E27FC236}">
+                <a16:creationId xmlns:a16="http://schemas.microsoft.com/office/drawing/2014/main" id="{EB4DBE34-B443-4A7D-AF82-659296AFE8E9}"/>
+              </a:ext>
+            </a:extLst>
+          </p:cNvPr>
+          <p:cNvSpPr/>
+          <p:nvPr/>
+        </p:nvSpPr>
+        <p:spPr>
+          <a:xfrm>
+            <a:off x="5014404" y="2235992"/>
+            <a:ext cx="1095889" cy="583726"/>
+          </a:xfrm>
+          <a:prstGeom prst="rect">
+            <a:avLst/>
+          </a:prstGeom>
+          <a:solidFill>
+            <a:schemeClr val="accent4">
+              <a:lumMod val="20000"/>
+              <a:lumOff val="80000"/>
+            </a:schemeClr>
+          </a:solidFill>
+          <a:ln w="9525" cap="flat" cmpd="sng" algn="ctr">
+            <a:solidFill>
+              <a:schemeClr val="bg1"/>
+            </a:solidFill>
+            <a:prstDash val="solid"/>
+            <a:round/>
+            <a:headEnd type="none" w="med" len="med"/>
+            <a:tailEnd type="none" w="med" len="med"/>
+          </a:ln>
+        </p:spPr>
+        <p:style>
+          <a:lnRef idx="0">
+            <a:scrgbClr r="0" g="0" b="0"/>
+          </a:lnRef>
+          <a:fillRef idx="0">
+            <a:scrgbClr r="0" g="0" b="0"/>
+          </a:fillRef>
+          <a:effectRef idx="0">
+            <a:scrgbClr r="0" g="0" b="0"/>
+          </a:effectRef>
+          <a:fontRef idx="minor">
+            <a:schemeClr val="dk1"/>
+          </a:fontRef>
+        </p:style>
+        <p:txBody>
+          <a:bodyPr rot="0" spcFirstLastPara="0" vertOverflow="overflow" horzOverflow="overflow" vert="horz" wrap="square" lIns="68580" tIns="34290" rIns="68580" bIns="34290" numCol="1" spcCol="0" rtlCol="0" fromWordArt="0" anchor="ctr" anchorCtr="0" forceAA="0" compatLnSpc="1">
+            <a:prstTxWarp prst="textNoShape">
+              <a:avLst/>
+            </a:prstTxWarp>
+            <a:noAutofit/>
+          </a:bodyPr>
+          <a:lstStyle/>
+          <a:p>
+            <a:pPr algn="ctr"/>
+            <a:r>
+              <a:rPr lang="en-CA" sz="1200" dirty="0"/>
+              <a:t>Data aggregated by day (count)</a:t>
+            </a:r>
+          </a:p>
+        </p:txBody>
+      </p:sp>
+      <p:cxnSp>
+        <p:nvCxnSpPr>
+          <p:cNvPr id="98" name="Connector: Elbow 97">
+            <a:extLst>
+              <a:ext uri="{FF2B5EF4-FFF2-40B4-BE49-F238E27FC236}">
+                <a16:creationId xmlns:a16="http://schemas.microsoft.com/office/drawing/2014/main" id="{1708FCE8-1745-4D7F-A489-F8AA1467E0BB}"/>
+              </a:ext>
+            </a:extLst>
+          </p:cNvPr>
+          <p:cNvCxnSpPr>
+            <a:cxnSpLocks/>
+            <a:stCxn id="69" idx="1"/>
+            <a:endCxn id="75" idx="3"/>
+          </p:cNvCxnSpPr>
+          <p:nvPr/>
+        </p:nvCxnSpPr>
+        <p:spPr>
           <a:xfrm rot="10800000" flipV="1">
-            <a:off x="3753843" y="1452516"/>
+            <a:off x="3576864" y="1602687"/>
             <a:ext cx="219645" cy="953700"/>
           </a:xfrm>
           <a:prstGeom prst="bentConnector3">
@@ -5019,22 +5012,22 @@
       </p:cxnSp>
       <p:cxnSp>
         <p:nvCxnSpPr>
-          <p:cNvPr id="109" name="Connector: Elbow 108">
+          <p:cNvPr id="99" name="Connector: Elbow 98">
             <a:extLst>
               <a:ext uri="{FF2B5EF4-FFF2-40B4-BE49-F238E27FC236}">
-                <a16:creationId xmlns:a16="http://schemas.microsoft.com/office/drawing/2014/main" id="{CD0728D5-076E-487F-8B42-624DADBFC746}"/>
+                <a16:creationId xmlns:a16="http://schemas.microsoft.com/office/drawing/2014/main" id="{676BE680-D8DC-4A42-A93B-81CE6C3EB51E}"/>
               </a:ext>
             </a:extLst>
           </p:cNvPr>
           <p:cNvCxnSpPr>
             <a:cxnSpLocks/>
-            <a:endCxn id="71" idx="1"/>
+            <a:endCxn id="97" idx="1"/>
           </p:cNvCxnSpPr>
           <p:nvPr/>
         </p:nvCxnSpPr>
         <p:spPr>
           <a:xfrm rot="16200000" flipH="1">
-            <a:off x="4605736" y="1792036"/>
+            <a:off x="4428757" y="1942207"/>
             <a:ext cx="642501" cy="528794"/>
           </a:xfrm>
           <a:prstGeom prst="bentConnector2">
@@ -5061,23 +5054,23 @@
       </p:cxnSp>
       <p:cxnSp>
         <p:nvCxnSpPr>
-          <p:cNvPr id="128" name="Connector: Elbow 127">
+          <p:cNvPr id="100" name="Connector: Elbow 99">
             <a:extLst>
               <a:ext uri="{FF2B5EF4-FFF2-40B4-BE49-F238E27FC236}">
-                <a16:creationId xmlns:a16="http://schemas.microsoft.com/office/drawing/2014/main" id="{BADE8CFB-301B-43A0-AC77-574DD89349EA}"/>
+                <a16:creationId xmlns:a16="http://schemas.microsoft.com/office/drawing/2014/main" id="{50798C6A-136F-41AF-9536-56B48FBBE031}"/>
               </a:ext>
             </a:extLst>
           </p:cNvPr>
           <p:cNvCxnSpPr>
             <a:cxnSpLocks/>
-            <a:stCxn id="57" idx="2"/>
-            <a:endCxn id="30" idx="3"/>
+            <a:stCxn id="94" idx="2"/>
+            <a:endCxn id="76" idx="3"/>
           </p:cNvCxnSpPr>
           <p:nvPr/>
         </p:nvCxnSpPr>
         <p:spPr>
           <a:xfrm rot="16200000" flipH="1">
-            <a:off x="7663778" y="1347147"/>
+            <a:off x="7486799" y="1497318"/>
             <a:ext cx="650370" cy="1469342"/>
           </a:xfrm>
           <a:prstGeom prst="bentConnector4">
@@ -5107,22 +5100,21 @@
       </p:cxnSp>
       <p:cxnSp>
         <p:nvCxnSpPr>
-          <p:cNvPr id="137" name="Connector: Elbow 136">
+          <p:cNvPr id="101" name="Connector: Elbow 100">
             <a:extLst>
               <a:ext uri="{FF2B5EF4-FFF2-40B4-BE49-F238E27FC236}">
-                <a16:creationId xmlns:a16="http://schemas.microsoft.com/office/drawing/2014/main" id="{EEDE1FAB-7A2C-45B5-B9BC-3105F4EDF80B}"/>
+                <a16:creationId xmlns:a16="http://schemas.microsoft.com/office/drawing/2014/main" id="{14A27137-FFF3-4E6B-80DF-E5EC9B4E0F27}"/>
               </a:ext>
             </a:extLst>
           </p:cNvPr>
           <p:cNvCxnSpPr>
             <a:cxnSpLocks/>
-            <a:endCxn id="37" idx="0"/>
           </p:cNvCxnSpPr>
           <p:nvPr/>
         </p:nvCxnSpPr>
         <p:spPr>
           <a:xfrm rot="10800000" flipV="1">
-            <a:off x="4134633" y="2601383"/>
+            <a:off x="3957654" y="2751554"/>
             <a:ext cx="1055913" cy="445742"/>
           </a:xfrm>
           <a:prstGeom prst="bentConnector2">
@@ -5149,10 +5141,10 @@
       </p:cxnSp>
       <p:sp>
         <p:nvSpPr>
-          <p:cNvPr id="148" name="Rectangle 147">
+          <p:cNvPr id="102" name="Rectangle 101">
             <a:extLst>
               <a:ext uri="{FF2B5EF4-FFF2-40B4-BE49-F238E27FC236}">
-                <a16:creationId xmlns:a16="http://schemas.microsoft.com/office/drawing/2014/main" id="{EC3673E4-770D-4BAE-B418-2E742C0A731D}"/>
+                <a16:creationId xmlns:a16="http://schemas.microsoft.com/office/drawing/2014/main" id="{93A9EC37-6D43-4010-B3B5-BD55DD6838CD}"/>
               </a:ext>
             </a:extLst>
           </p:cNvPr>
@@ -5161,8 +5153,8 @@
         </p:nvSpPr>
         <p:spPr>
           <a:xfrm>
-            <a:off x="4783452" y="3039688"/>
-            <a:ext cx="786314" cy="583726"/>
+            <a:off x="5469656" y="3189859"/>
+            <a:ext cx="1030599" cy="583726"/>
           </a:xfrm>
           <a:prstGeom prst="rect">
             <a:avLst/>
@@ -5208,18 +5200,18 @@
           <a:p>
             <a:pPr algn="ctr"/>
             <a:r>
-              <a:rPr lang="en-CA" sz="1200" dirty="0"/>
-              <a:t>Granger causality analysis</a:t>
-            </a:r>
-          </a:p>
-        </p:txBody>
-      </p:sp>
-      <p:sp>
-        <p:nvSpPr>
-          <p:cNvPr id="149" name="Rectangle 148">
+              <a:rPr lang="en-CA" sz="900" dirty="0"/>
+              <a:t>Multivariate time-series forecasting (LSTM, VAR)</a:t>
+            </a:r>
+          </a:p>
+        </p:txBody>
+      </p:sp>
+      <p:sp>
+        <p:nvSpPr>
+          <p:cNvPr id="103" name="Rectangle 102">
             <a:extLst>
               <a:ext uri="{FF2B5EF4-FFF2-40B4-BE49-F238E27FC236}">
-                <a16:creationId xmlns:a16="http://schemas.microsoft.com/office/drawing/2014/main" id="{777BAD3A-3458-43F1-AD1A-9DA98F88DF2C}"/>
+                <a16:creationId xmlns:a16="http://schemas.microsoft.com/office/drawing/2014/main" id="{6FFF3C90-0627-4CE2-9E72-4AB11ED1659E}"/>
               </a:ext>
             </a:extLst>
           </p:cNvPr>
@@ -5228,8 +5220,672 @@
         </p:nvSpPr>
         <p:spPr>
           <a:xfrm>
-            <a:off x="5646635" y="3039688"/>
+            <a:off x="6244647" y="2260464"/>
             <a:ext cx="1030599" cy="583726"/>
+          </a:xfrm>
+          <a:prstGeom prst="rect">
+            <a:avLst/>
+          </a:prstGeom>
+          <a:solidFill>
+            <a:schemeClr val="accent4">
+              <a:lumMod val="20000"/>
+              <a:lumOff val="80000"/>
+            </a:schemeClr>
+          </a:solidFill>
+          <a:ln w="9525" cap="flat" cmpd="sng" algn="ctr">
+            <a:solidFill>
+              <a:schemeClr val="bg1"/>
+            </a:solidFill>
+            <a:prstDash val="solid"/>
+            <a:round/>
+            <a:headEnd type="none" w="med" len="med"/>
+            <a:tailEnd type="none" w="med" len="med"/>
+          </a:ln>
+        </p:spPr>
+        <p:style>
+          <a:lnRef idx="0">
+            <a:scrgbClr r="0" g="0" b="0"/>
+          </a:lnRef>
+          <a:fillRef idx="0">
+            <a:scrgbClr r="0" g="0" b="0"/>
+          </a:fillRef>
+          <a:effectRef idx="0">
+            <a:scrgbClr r="0" g="0" b="0"/>
+          </a:effectRef>
+          <a:fontRef idx="minor">
+            <a:schemeClr val="dk1"/>
+          </a:fontRef>
+        </p:style>
+        <p:txBody>
+          <a:bodyPr rot="0" spcFirstLastPara="0" vertOverflow="overflow" horzOverflow="overflow" vert="horz" wrap="square" lIns="68580" tIns="34290" rIns="68580" bIns="34290" numCol="1" spcCol="0" rtlCol="0" fromWordArt="0" anchor="ctr" anchorCtr="0" forceAA="0" compatLnSpc="1">
+            <a:prstTxWarp prst="textNoShape">
+              <a:avLst/>
+            </a:prstTxWarp>
+            <a:noAutofit/>
+          </a:bodyPr>
+          <a:lstStyle/>
+          <a:p>
+            <a:pPr algn="ctr"/>
+            <a:r>
+              <a:rPr lang="en-CA" sz="1200" dirty="0"/>
+              <a:t>Geo-located social network</a:t>
+            </a:r>
+          </a:p>
+        </p:txBody>
+      </p:sp>
+      <p:cxnSp>
+        <p:nvCxnSpPr>
+          <p:cNvPr id="104" name="Connector: Elbow 103">
+            <a:extLst>
+              <a:ext uri="{FF2B5EF4-FFF2-40B4-BE49-F238E27FC236}">
+                <a16:creationId xmlns:a16="http://schemas.microsoft.com/office/drawing/2014/main" id="{591A08B0-7FBC-4A0B-ABF2-1E4CA03C2898}"/>
+              </a:ext>
+            </a:extLst>
+          </p:cNvPr>
+          <p:cNvCxnSpPr>
+            <a:cxnSpLocks/>
+            <a:stCxn id="69" idx="2"/>
+            <a:endCxn id="103" idx="0"/>
+          </p:cNvCxnSpPr>
+          <p:nvPr/>
+        </p:nvCxnSpPr>
+        <p:spPr>
+          <a:xfrm rot="16200000" flipH="1">
+            <a:off x="5526893" y="1027410"/>
+            <a:ext cx="365914" cy="2100194"/>
+          </a:xfrm>
+          <a:prstGeom prst="bentConnector3">
+            <a:avLst>
+              <a:gd name="adj1" fmla="val 50000"/>
+            </a:avLst>
+          </a:prstGeom>
+          <a:ln w="28575">
+            <a:tailEnd type="triangle"/>
+          </a:ln>
+        </p:spPr>
+        <p:style>
+          <a:lnRef idx="1">
+            <a:schemeClr val="dk1"/>
+          </a:lnRef>
+          <a:fillRef idx="0">
+            <a:schemeClr val="dk1"/>
+          </a:fillRef>
+          <a:effectRef idx="0">
+            <a:schemeClr val="dk1"/>
+          </a:effectRef>
+          <a:fontRef idx="minor">
+            <a:schemeClr val="tx1"/>
+          </a:fontRef>
+        </p:style>
+      </p:cxnSp>
+      <p:cxnSp>
+        <p:nvCxnSpPr>
+          <p:cNvPr id="105" name="Connector: Elbow 104">
+            <a:extLst>
+              <a:ext uri="{FF2B5EF4-FFF2-40B4-BE49-F238E27FC236}">
+                <a16:creationId xmlns:a16="http://schemas.microsoft.com/office/drawing/2014/main" id="{EC107074-F01D-42FF-A498-80DEC7AF3C3B}"/>
+              </a:ext>
+            </a:extLst>
+          </p:cNvPr>
+          <p:cNvCxnSpPr>
+            <a:cxnSpLocks/>
+            <a:stCxn id="97" idx="2"/>
+            <a:endCxn id="102" idx="0"/>
+          </p:cNvCxnSpPr>
+          <p:nvPr/>
+        </p:nvCxnSpPr>
+        <p:spPr>
+          <a:xfrm rot="16200000" flipH="1">
+            <a:off x="5588582" y="2793484"/>
+            <a:ext cx="370141" cy="422607"/>
+          </a:xfrm>
+          <a:prstGeom prst="bentConnector3">
+            <a:avLst>
+              <a:gd name="adj1" fmla="val 50000"/>
+            </a:avLst>
+          </a:prstGeom>
+          <a:ln w="28575">
+            <a:tailEnd type="triangle"/>
+          </a:ln>
+        </p:spPr>
+        <p:style>
+          <a:lnRef idx="1">
+            <a:schemeClr val="dk1"/>
+          </a:lnRef>
+          <a:fillRef idx="0">
+            <a:schemeClr val="dk1"/>
+          </a:fillRef>
+          <a:effectRef idx="0">
+            <a:schemeClr val="dk1"/>
+          </a:effectRef>
+          <a:fontRef idx="minor">
+            <a:schemeClr val="tx1"/>
+          </a:fontRef>
+        </p:style>
+      </p:cxnSp>
+      <p:sp>
+        <p:nvSpPr>
+          <p:cNvPr id="106" name="Rectangle 105">
+            <a:extLst>
+              <a:ext uri="{FF2B5EF4-FFF2-40B4-BE49-F238E27FC236}">
+                <a16:creationId xmlns:a16="http://schemas.microsoft.com/office/drawing/2014/main" id="{088DE489-0D75-4452-A901-7FA176F25795}"/>
+              </a:ext>
+            </a:extLst>
+          </p:cNvPr>
+          <p:cNvSpPr/>
+          <p:nvPr/>
+        </p:nvSpPr>
+        <p:spPr>
+          <a:xfrm>
+            <a:off x="1995802" y="4153504"/>
+            <a:ext cx="1260737" cy="583726"/>
+          </a:xfrm>
+          <a:prstGeom prst="rect">
+            <a:avLst/>
+          </a:prstGeom>
+          <a:solidFill>
+            <a:srgbClr val="FF0000">
+              <a:alpha val="41176"/>
+            </a:srgbClr>
+          </a:solidFill>
+          <a:ln w="9525" cap="flat" cmpd="sng" algn="ctr">
+            <a:solidFill>
+              <a:schemeClr val="bg1"/>
+            </a:solidFill>
+            <a:prstDash val="solid"/>
+            <a:round/>
+            <a:headEnd type="none" w="med" len="med"/>
+            <a:tailEnd type="none" w="med" len="med"/>
+          </a:ln>
+        </p:spPr>
+        <p:style>
+          <a:lnRef idx="0">
+            <a:scrgbClr r="0" g="0" b="0"/>
+          </a:lnRef>
+          <a:fillRef idx="0">
+            <a:scrgbClr r="0" g="0" b="0"/>
+          </a:fillRef>
+          <a:effectRef idx="0">
+            <a:scrgbClr r="0" g="0" b="0"/>
+          </a:effectRef>
+          <a:fontRef idx="minor">
+            <a:schemeClr val="dk1"/>
+          </a:fontRef>
+        </p:style>
+        <p:txBody>
+          <a:bodyPr rot="0" spcFirstLastPara="0" vertOverflow="overflow" horzOverflow="overflow" vert="horz" wrap="square" lIns="68580" tIns="34290" rIns="68580" bIns="34290" numCol="1" spcCol="0" rtlCol="0" fromWordArt="0" anchor="ctr" anchorCtr="0" forceAA="0" compatLnSpc="1">
+            <a:prstTxWarp prst="textNoShape">
+              <a:avLst/>
+            </a:prstTxWarp>
+            <a:noAutofit/>
+          </a:bodyPr>
+          <a:lstStyle/>
+          <a:p>
+            <a:pPr algn="ctr"/>
+            <a:r>
+              <a:rPr lang="en-CA" sz="1200" dirty="0"/>
+              <a:t>tweets vs. physical protests</a:t>
+            </a:r>
+          </a:p>
+        </p:txBody>
+      </p:sp>
+      <p:sp>
+        <p:nvSpPr>
+          <p:cNvPr id="107" name="Rectangle 106">
+            <a:extLst>
+              <a:ext uri="{FF2B5EF4-FFF2-40B4-BE49-F238E27FC236}">
+                <a16:creationId xmlns:a16="http://schemas.microsoft.com/office/drawing/2014/main" id="{1CA47ADA-53DA-4950-AC62-80BDD6742410}"/>
+              </a:ext>
+            </a:extLst>
+          </p:cNvPr>
+          <p:cNvSpPr/>
+          <p:nvPr/>
+        </p:nvSpPr>
+        <p:spPr>
+          <a:xfrm>
+            <a:off x="4605548" y="4157595"/>
+            <a:ext cx="1518577" cy="583726"/>
+          </a:xfrm>
+          <a:prstGeom prst="rect">
+            <a:avLst/>
+          </a:prstGeom>
+          <a:solidFill>
+            <a:srgbClr val="FF0000">
+              <a:alpha val="41176"/>
+            </a:srgbClr>
+          </a:solidFill>
+          <a:ln w="9525" cap="flat" cmpd="sng" algn="ctr">
+            <a:solidFill>
+              <a:schemeClr val="bg1"/>
+            </a:solidFill>
+            <a:prstDash val="solid"/>
+            <a:round/>
+            <a:headEnd type="none" w="med" len="med"/>
+            <a:tailEnd type="none" w="med" len="med"/>
+          </a:ln>
+        </p:spPr>
+        <p:style>
+          <a:lnRef idx="0">
+            <a:scrgbClr r="0" g="0" b="0"/>
+          </a:lnRef>
+          <a:fillRef idx="0">
+            <a:scrgbClr r="0" g="0" b="0"/>
+          </a:fillRef>
+          <a:effectRef idx="0">
+            <a:scrgbClr r="0" g="0" b="0"/>
+          </a:effectRef>
+          <a:fontRef idx="minor">
+            <a:schemeClr val="dk1"/>
+          </a:fontRef>
+        </p:style>
+        <p:txBody>
+          <a:bodyPr rot="0" spcFirstLastPara="0" vertOverflow="overflow" horzOverflow="overflow" vert="horz" wrap="square" lIns="68580" tIns="34290" rIns="68580" bIns="34290" numCol="1" spcCol="0" rtlCol="0" fromWordArt="0" anchor="ctr" anchorCtr="0" forceAA="0" compatLnSpc="1">
+            <a:prstTxWarp prst="textNoShape">
+              <a:avLst/>
+            </a:prstTxWarp>
+            <a:noAutofit/>
+          </a:bodyPr>
+          <a:lstStyle/>
+          <a:p>
+            <a:pPr algn="ctr"/>
+            <a:r>
+              <a:rPr lang="en-CA" sz="1200" dirty="0"/>
+              <a:t>tweets vs. legislation count</a:t>
+            </a:r>
+          </a:p>
+        </p:txBody>
+      </p:sp>
+      <p:cxnSp>
+        <p:nvCxnSpPr>
+          <p:cNvPr id="108" name="Connector: Elbow 107">
+            <a:extLst>
+              <a:ext uri="{FF2B5EF4-FFF2-40B4-BE49-F238E27FC236}">
+                <a16:creationId xmlns:a16="http://schemas.microsoft.com/office/drawing/2014/main" id="{0B5D6A79-1D8F-4254-B50C-6178D096E616}"/>
+              </a:ext>
+            </a:extLst>
+          </p:cNvPr>
+          <p:cNvCxnSpPr>
+            <a:cxnSpLocks/>
+            <a:stCxn id="76" idx="2"/>
+            <a:endCxn id="79" idx="3"/>
+          </p:cNvCxnSpPr>
+          <p:nvPr/>
+        </p:nvCxnSpPr>
+        <p:spPr>
+          <a:xfrm rot="16200000" flipH="1">
+            <a:off x="7436430" y="3395811"/>
+            <a:ext cx="1605268" cy="514345"/>
+          </a:xfrm>
+          <a:prstGeom prst="bentConnector4">
+            <a:avLst>
+              <a:gd name="adj1" fmla="val 40909"/>
+              <a:gd name="adj2" fmla="val 154247"/>
+            </a:avLst>
+          </a:prstGeom>
+          <a:ln w="28575">
+            <a:tailEnd type="triangle"/>
+          </a:ln>
+        </p:spPr>
+        <p:style>
+          <a:lnRef idx="1">
+            <a:schemeClr val="dk1"/>
+          </a:lnRef>
+          <a:fillRef idx="0">
+            <a:schemeClr val="dk1"/>
+          </a:fillRef>
+          <a:effectRef idx="0">
+            <a:schemeClr val="dk1"/>
+          </a:effectRef>
+          <a:fontRef idx="minor">
+            <a:schemeClr val="tx1"/>
+          </a:fontRef>
+        </p:style>
+      </p:cxnSp>
+      <p:cxnSp>
+        <p:nvCxnSpPr>
+          <p:cNvPr id="110" name="Connector: Elbow 109">
+            <a:extLst>
+              <a:ext uri="{FF2B5EF4-FFF2-40B4-BE49-F238E27FC236}">
+                <a16:creationId xmlns:a16="http://schemas.microsoft.com/office/drawing/2014/main" id="{23107793-954F-4511-90B9-77121D6D2DC9}"/>
+              </a:ext>
+            </a:extLst>
+          </p:cNvPr>
+          <p:cNvCxnSpPr>
+            <a:cxnSpLocks/>
+            <a:stCxn id="69" idx="2"/>
+            <a:endCxn id="76" idx="0"/>
+          </p:cNvCxnSpPr>
+          <p:nvPr/>
+        </p:nvCxnSpPr>
+        <p:spPr>
+          <a:xfrm rot="16200000" flipH="1">
+            <a:off x="6136098" y="418204"/>
+            <a:ext cx="369448" cy="3322139"/>
+          </a:xfrm>
+          <a:prstGeom prst="bentConnector3">
+            <a:avLst>
+              <a:gd name="adj1" fmla="val 50000"/>
+            </a:avLst>
+          </a:prstGeom>
+          <a:ln w="28575">
+            <a:tailEnd type="triangle"/>
+          </a:ln>
+        </p:spPr>
+        <p:style>
+          <a:lnRef idx="1">
+            <a:schemeClr val="dk1"/>
+          </a:lnRef>
+          <a:fillRef idx="0">
+            <a:schemeClr val="dk1"/>
+          </a:fillRef>
+          <a:effectRef idx="0">
+            <a:schemeClr val="dk1"/>
+          </a:effectRef>
+          <a:fontRef idx="minor">
+            <a:schemeClr val="tx1"/>
+          </a:fontRef>
+        </p:style>
+      </p:cxnSp>
+      <p:cxnSp>
+        <p:nvCxnSpPr>
+          <p:cNvPr id="111" name="Connector: Elbow 110">
+            <a:extLst>
+              <a:ext uri="{FF2B5EF4-FFF2-40B4-BE49-F238E27FC236}">
+                <a16:creationId xmlns:a16="http://schemas.microsoft.com/office/drawing/2014/main" id="{4EBD692C-F496-4DDA-8E68-A0490FB9A6C3}"/>
+              </a:ext>
+            </a:extLst>
+          </p:cNvPr>
+          <p:cNvCxnSpPr>
+            <a:cxnSpLocks/>
+            <a:stCxn id="76" idx="2"/>
+            <a:endCxn id="107" idx="0"/>
+          </p:cNvCxnSpPr>
+          <p:nvPr/>
+        </p:nvCxnSpPr>
+        <p:spPr>
+          <a:xfrm rot="5400000">
+            <a:off x="6019743" y="2195445"/>
+            <a:ext cx="1307245" cy="2617055"/>
+          </a:xfrm>
+          <a:prstGeom prst="bentConnector3">
+            <a:avLst>
+              <a:gd name="adj1" fmla="val 81611"/>
+            </a:avLst>
+          </a:prstGeom>
+          <a:ln w="28575">
+            <a:tailEnd type="triangle"/>
+          </a:ln>
+        </p:spPr>
+        <p:style>
+          <a:lnRef idx="1">
+            <a:schemeClr val="dk1"/>
+          </a:lnRef>
+          <a:fillRef idx="0">
+            <a:schemeClr val="dk1"/>
+          </a:fillRef>
+          <a:effectRef idx="0">
+            <a:schemeClr val="dk1"/>
+          </a:effectRef>
+          <a:fontRef idx="minor">
+            <a:schemeClr val="tx1"/>
+          </a:fontRef>
+        </p:style>
+      </p:cxnSp>
+      <p:cxnSp>
+        <p:nvCxnSpPr>
+          <p:cNvPr id="112" name="Connector: Elbow 111">
+            <a:extLst>
+              <a:ext uri="{FF2B5EF4-FFF2-40B4-BE49-F238E27FC236}">
+                <a16:creationId xmlns:a16="http://schemas.microsoft.com/office/drawing/2014/main" id="{4EC9B0E7-5EFE-4318-A966-FF0456955546}"/>
+              </a:ext>
+            </a:extLst>
+          </p:cNvPr>
+          <p:cNvCxnSpPr>
+            <a:cxnSpLocks/>
+            <a:stCxn id="103" idx="2"/>
+            <a:endCxn id="122" idx="0"/>
+          </p:cNvCxnSpPr>
+          <p:nvPr/>
+        </p:nvCxnSpPr>
+        <p:spPr>
+          <a:xfrm rot="5400000">
+            <a:off x="4281381" y="2609504"/>
+            <a:ext cx="2243880" cy="2713252"/>
+          </a:xfrm>
+          <a:prstGeom prst="bentConnector3">
+            <a:avLst>
+              <a:gd name="adj1" fmla="val 89000"/>
+            </a:avLst>
+          </a:prstGeom>
+          <a:ln w="28575">
+            <a:tailEnd type="triangle"/>
+          </a:ln>
+        </p:spPr>
+        <p:style>
+          <a:lnRef idx="1">
+            <a:schemeClr val="dk1"/>
+          </a:lnRef>
+          <a:fillRef idx="0">
+            <a:schemeClr val="dk1"/>
+          </a:fillRef>
+          <a:effectRef idx="0">
+            <a:schemeClr val="dk1"/>
+          </a:effectRef>
+          <a:fontRef idx="minor">
+            <a:schemeClr val="tx1"/>
+          </a:fontRef>
+        </p:style>
+      </p:cxnSp>
+      <p:sp>
+        <p:nvSpPr>
+          <p:cNvPr id="113" name="Rectangle 112">
+            <a:extLst>
+              <a:ext uri="{FF2B5EF4-FFF2-40B4-BE49-F238E27FC236}">
+                <a16:creationId xmlns:a16="http://schemas.microsoft.com/office/drawing/2014/main" id="{5BE584A7-24FC-4DE7-B5AA-B55ACD8DE3C0}"/>
+              </a:ext>
+            </a:extLst>
+          </p:cNvPr>
+          <p:cNvSpPr/>
+          <p:nvPr/>
+        </p:nvSpPr>
+        <p:spPr>
+          <a:xfrm>
+            <a:off x="7166607" y="5085383"/>
+            <a:ext cx="935545" cy="583726"/>
+          </a:xfrm>
+          <a:prstGeom prst="rect">
+            <a:avLst/>
+          </a:prstGeom>
+          <a:solidFill>
+            <a:schemeClr val="accent4">
+              <a:lumMod val="75000"/>
+              <a:alpha val="41176"/>
+            </a:schemeClr>
+          </a:solidFill>
+          <a:ln w="9525" cap="flat" cmpd="sng" algn="ctr">
+            <a:solidFill>
+              <a:schemeClr val="bg1"/>
+            </a:solidFill>
+            <a:prstDash val="solid"/>
+            <a:round/>
+            <a:headEnd type="none" w="med" len="med"/>
+            <a:tailEnd type="none" w="med" len="med"/>
+          </a:ln>
+        </p:spPr>
+        <p:style>
+          <a:lnRef idx="0">
+            <a:scrgbClr r="0" g="0" b="0"/>
+          </a:lnRef>
+          <a:fillRef idx="0">
+            <a:scrgbClr r="0" g="0" b="0"/>
+          </a:fillRef>
+          <a:effectRef idx="0">
+            <a:scrgbClr r="0" g="0" b="0"/>
+          </a:effectRef>
+          <a:fontRef idx="minor">
+            <a:schemeClr val="dk1"/>
+          </a:fontRef>
+        </p:style>
+        <p:txBody>
+          <a:bodyPr rot="0" spcFirstLastPara="0" vertOverflow="overflow" horzOverflow="overflow" vert="horz" wrap="square" lIns="68580" tIns="34290" rIns="68580" bIns="34290" numCol="1" spcCol="0" rtlCol="0" fromWordArt="0" anchor="ctr" anchorCtr="0" forceAA="0" compatLnSpc="1">
+            <a:prstTxWarp prst="textNoShape">
+              <a:avLst/>
+            </a:prstTxWarp>
+            <a:noAutofit/>
+          </a:bodyPr>
+          <a:lstStyle/>
+          <a:p>
+            <a:pPr algn="ctr"/>
+            <a:r>
+              <a:rPr lang="en-CA" sz="1200" dirty="0"/>
+              <a:t>Network spatial interactions</a:t>
+            </a:r>
+          </a:p>
+        </p:txBody>
+      </p:sp>
+      <p:cxnSp>
+        <p:nvCxnSpPr>
+          <p:cNvPr id="114" name="Connector: Elbow 113">
+            <a:extLst>
+              <a:ext uri="{FF2B5EF4-FFF2-40B4-BE49-F238E27FC236}">
+                <a16:creationId xmlns:a16="http://schemas.microsoft.com/office/drawing/2014/main" id="{0E13844E-2A89-4E6E-A704-4EB0AE6D8BA6}"/>
+              </a:ext>
+            </a:extLst>
+          </p:cNvPr>
+          <p:cNvCxnSpPr>
+            <a:cxnSpLocks/>
+            <a:stCxn id="103" idx="2"/>
+            <a:endCxn id="113" idx="1"/>
+          </p:cNvCxnSpPr>
+          <p:nvPr/>
+        </p:nvCxnSpPr>
+        <p:spPr>
+          <a:xfrm rot="16200000" flipH="1">
+            <a:off x="5696749" y="3907388"/>
+            <a:ext cx="2533056" cy="406660"/>
+          </a:xfrm>
+          <a:prstGeom prst="bentConnector2">
+            <a:avLst/>
+          </a:prstGeom>
+          <a:ln w="28575">
+            <a:tailEnd type="triangle"/>
+          </a:ln>
+        </p:spPr>
+        <p:style>
+          <a:lnRef idx="1">
+            <a:schemeClr val="dk1"/>
+          </a:lnRef>
+          <a:fillRef idx="0">
+            <a:schemeClr val="dk1"/>
+          </a:fillRef>
+          <a:effectRef idx="0">
+            <a:schemeClr val="dk1"/>
+          </a:effectRef>
+          <a:fontRef idx="minor">
+            <a:schemeClr val="tx1"/>
+          </a:fontRef>
+        </p:style>
+      </p:cxnSp>
+      <p:cxnSp>
+        <p:nvCxnSpPr>
+          <p:cNvPr id="115" name="Connector: Elbow 114">
+            <a:extLst>
+              <a:ext uri="{FF2B5EF4-FFF2-40B4-BE49-F238E27FC236}">
+                <a16:creationId xmlns:a16="http://schemas.microsoft.com/office/drawing/2014/main" id="{105BE76C-7531-4567-8378-A8B9973A4A0C}"/>
+              </a:ext>
+            </a:extLst>
+          </p:cNvPr>
+          <p:cNvCxnSpPr>
+            <a:cxnSpLocks/>
+            <a:endCxn id="106" idx="3"/>
+          </p:cNvCxnSpPr>
+          <p:nvPr/>
+        </p:nvCxnSpPr>
+        <p:spPr>
+          <a:xfrm rot="5400000">
+            <a:off x="3274924" y="3762637"/>
+            <a:ext cx="664345" cy="701114"/>
+          </a:xfrm>
+          <a:prstGeom prst="bentConnector2">
+            <a:avLst/>
+          </a:prstGeom>
+          <a:ln w="28575">
+            <a:tailEnd type="triangle"/>
+          </a:ln>
+        </p:spPr>
+        <p:style>
+          <a:lnRef idx="1">
+            <a:schemeClr val="dk1"/>
+          </a:lnRef>
+          <a:fillRef idx="0">
+            <a:schemeClr val="dk1"/>
+          </a:fillRef>
+          <a:effectRef idx="0">
+            <a:schemeClr val="dk1"/>
+          </a:effectRef>
+          <a:fontRef idx="minor">
+            <a:schemeClr val="tx1"/>
+          </a:fontRef>
+        </p:style>
+      </p:cxnSp>
+      <p:cxnSp>
+        <p:nvCxnSpPr>
+          <p:cNvPr id="118" name="Connector: Elbow 117">
+            <a:extLst>
+              <a:ext uri="{FF2B5EF4-FFF2-40B4-BE49-F238E27FC236}">
+                <a16:creationId xmlns:a16="http://schemas.microsoft.com/office/drawing/2014/main" id="{7AB97673-7C09-4FBD-AF9A-59B953328AB4}"/>
+              </a:ext>
+            </a:extLst>
+          </p:cNvPr>
+          <p:cNvCxnSpPr>
+            <a:cxnSpLocks/>
+            <a:endCxn id="107" idx="1"/>
+          </p:cNvCxnSpPr>
+          <p:nvPr/>
+        </p:nvCxnSpPr>
+        <p:spPr>
+          <a:xfrm rot="16200000" flipH="1">
+            <a:off x="3947382" y="3791292"/>
+            <a:ext cx="668436" cy="647895"/>
+          </a:xfrm>
+          <a:prstGeom prst="bentConnector2">
+            <a:avLst/>
+          </a:prstGeom>
+          <a:ln w="28575">
+            <a:tailEnd type="triangle"/>
+          </a:ln>
+        </p:spPr>
+        <p:style>
+          <a:lnRef idx="1">
+            <a:schemeClr val="dk1"/>
+          </a:lnRef>
+          <a:fillRef idx="0">
+            <a:schemeClr val="dk1"/>
+          </a:fillRef>
+          <a:effectRef idx="0">
+            <a:schemeClr val="dk1"/>
+          </a:effectRef>
+          <a:fontRef idx="minor">
+            <a:schemeClr val="tx1"/>
+          </a:fontRef>
+        </p:style>
+      </p:cxnSp>
+      <p:sp>
+        <p:nvSpPr>
+          <p:cNvPr id="119" name="Rectangle 118">
+            <a:extLst>
+              <a:ext uri="{FF2B5EF4-FFF2-40B4-BE49-F238E27FC236}">
+                <a16:creationId xmlns:a16="http://schemas.microsoft.com/office/drawing/2014/main" id="{8678CBDC-C7CD-49CA-B29C-262F87739020}"/>
+              </a:ext>
+            </a:extLst>
+          </p:cNvPr>
+          <p:cNvSpPr/>
+          <p:nvPr/>
+        </p:nvSpPr>
+        <p:spPr>
+          <a:xfrm>
+            <a:off x="3377523" y="3197296"/>
+            <a:ext cx="1160259" cy="583726"/>
           </a:xfrm>
           <a:prstGeom prst="rect">
             <a:avLst/>
@@ -5275,18 +5931,18 @@
           <a:p>
             <a:pPr algn="ctr"/>
             <a:r>
-              <a:rPr lang="en-CA" sz="900" dirty="0"/>
-              <a:t>Multivariate time-series forecasting (LSTM)</a:t>
-            </a:r>
-          </a:p>
-        </p:txBody>
-      </p:sp>
-      <p:sp>
-        <p:nvSpPr>
-          <p:cNvPr id="182" name="Rectangle 181">
+              <a:rPr lang="en-CA" sz="1200" dirty="0"/>
+              <a:t>Correlated time series analysis</a:t>
+            </a:r>
+          </a:p>
+        </p:txBody>
+      </p:sp>
+      <p:sp>
+        <p:nvSpPr>
+          <p:cNvPr id="120" name="Rectangle 119">
             <a:extLst>
               <a:ext uri="{FF2B5EF4-FFF2-40B4-BE49-F238E27FC236}">
-                <a16:creationId xmlns:a16="http://schemas.microsoft.com/office/drawing/2014/main" id="{7BA8E2B7-3EB0-496C-A5D5-11340AAE8FA8}"/>
+                <a16:creationId xmlns:a16="http://schemas.microsoft.com/office/drawing/2014/main" id="{048177DD-C998-45C7-A046-D800B5ABC960}"/>
               </a:ext>
             </a:extLst>
           </p:cNvPr>
@@ -5295,14 +5951,14 @@
         </p:nvSpPr>
         <p:spPr>
           <a:xfrm>
-            <a:off x="6421626" y="2110293"/>
-            <a:ext cx="1030599" cy="583726"/>
+            <a:off x="4606473" y="3189859"/>
+            <a:ext cx="786314" cy="583726"/>
           </a:xfrm>
           <a:prstGeom prst="rect">
             <a:avLst/>
           </a:prstGeom>
           <a:solidFill>
-            <a:schemeClr val="accent4">
+            <a:schemeClr val="accent5">
               <a:lumMod val="20000"/>
               <a:lumOff val="80000"/>
             </a:schemeClr>
@@ -5342,36 +5998,36 @@
           <a:p>
             <a:pPr algn="ctr"/>
             <a:r>
-              <a:rPr lang="en-CA" sz="1200" dirty="0"/>
-              <a:t>Geo-located social network</a:t>
+              <a:rPr lang="en-CA" sz="900" dirty="0"/>
+              <a:t>Granger causality + cointegration</a:t>
             </a:r>
           </a:p>
         </p:txBody>
       </p:sp>
       <p:cxnSp>
         <p:nvCxnSpPr>
-          <p:cNvPr id="187" name="Connector: Elbow 186">
+          <p:cNvPr id="121" name="Connector: Elbow 120">
             <a:extLst>
               <a:ext uri="{FF2B5EF4-FFF2-40B4-BE49-F238E27FC236}">
-                <a16:creationId xmlns:a16="http://schemas.microsoft.com/office/drawing/2014/main" id="{D3FFCC75-B0ED-478E-9122-5C6DAC115169}"/>
+                <a16:creationId xmlns:a16="http://schemas.microsoft.com/office/drawing/2014/main" id="{9BDBFF1D-55E6-4C05-A921-2292988E3E47}"/>
               </a:ext>
             </a:extLst>
           </p:cNvPr>
           <p:cNvCxnSpPr>
             <a:cxnSpLocks/>
-            <a:stCxn id="9" idx="2"/>
-            <a:endCxn id="182" idx="0"/>
+            <a:stCxn id="119" idx="2"/>
+            <a:endCxn id="120" idx="2"/>
           </p:cNvCxnSpPr>
           <p:nvPr/>
         </p:nvCxnSpPr>
         <p:spPr>
-          <a:xfrm rot="16200000" flipH="1">
-            <a:off x="5703872" y="877239"/>
-            <a:ext cx="365914" cy="2100194"/>
+          <a:xfrm rot="5400000" flipH="1" flipV="1">
+            <a:off x="4474922" y="3256315"/>
+            <a:ext cx="7437" cy="1041977"/>
           </a:xfrm>
           <a:prstGeom prst="bentConnector3">
             <a:avLst>
-              <a:gd name="adj1" fmla="val 50000"/>
+              <a:gd name="adj1" fmla="val -1489767"/>
             </a:avLst>
           </a:prstGeom>
           <a:ln w="28575">
@@ -5393,101 +6049,12 @@
           </a:fontRef>
         </p:style>
       </p:cxnSp>
-      <p:cxnSp>
-        <p:nvCxnSpPr>
-          <p:cNvPr id="211" name="Connector: Elbow 210">
+      <p:sp>
+        <p:nvSpPr>
+          <p:cNvPr id="122" name="Rectangle 121">
             <a:extLst>
               <a:ext uri="{FF2B5EF4-FFF2-40B4-BE49-F238E27FC236}">
-                <a16:creationId xmlns:a16="http://schemas.microsoft.com/office/drawing/2014/main" id="{F9440102-1C61-431A-AFE6-9E1CF4D8D1E8}"/>
-              </a:ext>
-            </a:extLst>
-          </p:cNvPr>
-          <p:cNvCxnSpPr>
-            <a:cxnSpLocks/>
-            <a:endCxn id="148" idx="0"/>
-          </p:cNvCxnSpPr>
-          <p:nvPr/>
-        </p:nvCxnSpPr>
-        <p:spPr>
-          <a:xfrm rot="5400000">
-            <a:off x="5083280" y="2797228"/>
-            <a:ext cx="335789" cy="149130"/>
-          </a:xfrm>
-          <a:prstGeom prst="bentConnector3">
-            <a:avLst>
-              <a:gd name="adj1" fmla="val 50000"/>
-            </a:avLst>
-          </a:prstGeom>
-          <a:ln w="28575">
-            <a:tailEnd type="triangle"/>
-          </a:ln>
-        </p:spPr>
-        <p:style>
-          <a:lnRef idx="1">
-            <a:schemeClr val="dk1"/>
-          </a:lnRef>
-          <a:fillRef idx="0">
-            <a:schemeClr val="dk1"/>
-          </a:fillRef>
-          <a:effectRef idx="0">
-            <a:schemeClr val="dk1"/>
-          </a:effectRef>
-          <a:fontRef idx="minor">
-            <a:schemeClr val="tx1"/>
-          </a:fontRef>
-        </p:style>
-      </p:cxnSp>
-      <p:cxnSp>
-        <p:nvCxnSpPr>
-          <p:cNvPr id="216" name="Connector: Elbow 215">
-            <a:extLst>
-              <a:ext uri="{FF2B5EF4-FFF2-40B4-BE49-F238E27FC236}">
-                <a16:creationId xmlns:a16="http://schemas.microsoft.com/office/drawing/2014/main" id="{52CEA1C2-C02C-44DA-9A56-7623159FBC61}"/>
-              </a:ext>
-            </a:extLst>
-          </p:cNvPr>
-          <p:cNvCxnSpPr>
-            <a:cxnSpLocks/>
-            <a:stCxn id="71" idx="2"/>
-            <a:endCxn id="149" idx="0"/>
-          </p:cNvCxnSpPr>
-          <p:nvPr/>
-        </p:nvCxnSpPr>
-        <p:spPr>
-          <a:xfrm rot="16200000" flipH="1">
-            <a:off x="5765561" y="2643313"/>
-            <a:ext cx="370141" cy="422607"/>
-          </a:xfrm>
-          <a:prstGeom prst="bentConnector3">
-            <a:avLst>
-              <a:gd name="adj1" fmla="val 50000"/>
-            </a:avLst>
-          </a:prstGeom>
-          <a:ln w="28575">
-            <a:tailEnd type="triangle"/>
-          </a:ln>
-        </p:spPr>
-        <p:style>
-          <a:lnRef idx="1">
-            <a:schemeClr val="dk1"/>
-          </a:lnRef>
-          <a:fillRef idx="0">
-            <a:schemeClr val="dk1"/>
-          </a:fillRef>
-          <a:effectRef idx="0">
-            <a:schemeClr val="dk1"/>
-          </a:effectRef>
-          <a:fontRef idx="minor">
-            <a:schemeClr val="tx1"/>
-          </a:fontRef>
-        </p:style>
-      </p:cxnSp>
-      <p:sp>
-        <p:nvSpPr>
-          <p:cNvPr id="222" name="Rectangle 221">
-            <a:extLst>
-              <a:ext uri="{FF2B5EF4-FFF2-40B4-BE49-F238E27FC236}">
-                <a16:creationId xmlns:a16="http://schemas.microsoft.com/office/drawing/2014/main" id="{ECE9A374-1BD7-473E-B6EF-3ACC30BD95E6}"/>
+                <a16:creationId xmlns:a16="http://schemas.microsoft.com/office/drawing/2014/main" id="{0B3018D0-D683-4F27-A6AA-590F0CADF56A}"/>
               </a:ext>
             </a:extLst>
           </p:cNvPr>
@@ -5496,319 +6063,8 @@
         </p:nvSpPr>
         <p:spPr>
           <a:xfrm>
-            <a:off x="2045531" y="4003333"/>
-            <a:ext cx="1518577" cy="583726"/>
-          </a:xfrm>
-          <a:prstGeom prst="rect">
-            <a:avLst/>
-          </a:prstGeom>
-          <a:solidFill>
-            <a:srgbClr val="FF0000">
-              <a:alpha val="41176"/>
-            </a:srgbClr>
-          </a:solidFill>
-          <a:ln w="9525" cap="flat" cmpd="sng" algn="ctr">
-            <a:solidFill>
-              <a:schemeClr val="bg1"/>
-            </a:solidFill>
-            <a:prstDash val="solid"/>
-            <a:round/>
-            <a:headEnd type="none" w="med" len="med"/>
-            <a:tailEnd type="none" w="med" len="med"/>
-          </a:ln>
-        </p:spPr>
-        <p:style>
-          <a:lnRef idx="0">
-            <a:scrgbClr r="0" g="0" b="0"/>
-          </a:lnRef>
-          <a:fillRef idx="0">
-            <a:scrgbClr r="0" g="0" b="0"/>
-          </a:fillRef>
-          <a:effectRef idx="0">
-            <a:scrgbClr r="0" g="0" b="0"/>
-          </a:effectRef>
-          <a:fontRef idx="minor">
-            <a:schemeClr val="dk1"/>
-          </a:fontRef>
-        </p:style>
-        <p:txBody>
-          <a:bodyPr rot="0" spcFirstLastPara="0" vertOverflow="overflow" horzOverflow="overflow" vert="horz" wrap="square" lIns="68580" tIns="34290" rIns="68580" bIns="34290" numCol="1" spcCol="0" rtlCol="0" fromWordArt="0" anchor="ctr" anchorCtr="0" forceAA="0" compatLnSpc="1">
-            <a:prstTxWarp prst="textNoShape">
-              <a:avLst/>
-            </a:prstTxWarp>
-            <a:noAutofit/>
-          </a:bodyPr>
-          <a:lstStyle/>
-          <a:p>
-            <a:pPr algn="ctr"/>
-            <a:r>
-              <a:rPr lang="en-CA" sz="1200" dirty="0"/>
-              <a:t>tweets vs. physical protests</a:t>
-            </a:r>
-          </a:p>
-        </p:txBody>
-      </p:sp>
-      <p:sp>
-        <p:nvSpPr>
-          <p:cNvPr id="223" name="Rectangle 222">
-            <a:extLst>
-              <a:ext uri="{FF2B5EF4-FFF2-40B4-BE49-F238E27FC236}">
-                <a16:creationId xmlns:a16="http://schemas.microsoft.com/office/drawing/2014/main" id="{0A7A1898-7C0D-4E72-832B-DD36354B6BD4}"/>
-              </a:ext>
-            </a:extLst>
-          </p:cNvPr>
-          <p:cNvSpPr/>
-          <p:nvPr/>
-        </p:nvSpPr>
-        <p:spPr>
-          <a:xfrm>
-            <a:off x="3753842" y="4007424"/>
-            <a:ext cx="1518577" cy="583726"/>
-          </a:xfrm>
-          <a:prstGeom prst="rect">
-            <a:avLst/>
-          </a:prstGeom>
-          <a:solidFill>
-            <a:srgbClr val="FF0000">
-              <a:alpha val="41176"/>
-            </a:srgbClr>
-          </a:solidFill>
-          <a:ln w="9525" cap="flat" cmpd="sng" algn="ctr">
-            <a:solidFill>
-              <a:schemeClr val="bg1"/>
-            </a:solidFill>
-            <a:prstDash val="solid"/>
-            <a:round/>
-            <a:headEnd type="none" w="med" len="med"/>
-            <a:tailEnd type="none" w="med" len="med"/>
-          </a:ln>
-        </p:spPr>
-        <p:style>
-          <a:lnRef idx="0">
-            <a:scrgbClr r="0" g="0" b="0"/>
-          </a:lnRef>
-          <a:fillRef idx="0">
-            <a:scrgbClr r="0" g="0" b="0"/>
-          </a:fillRef>
-          <a:effectRef idx="0">
-            <a:scrgbClr r="0" g="0" b="0"/>
-          </a:effectRef>
-          <a:fontRef idx="minor">
-            <a:schemeClr val="dk1"/>
-          </a:fontRef>
-        </p:style>
-        <p:txBody>
-          <a:bodyPr rot="0" spcFirstLastPara="0" vertOverflow="overflow" horzOverflow="overflow" vert="horz" wrap="square" lIns="68580" tIns="34290" rIns="68580" bIns="34290" numCol="1" spcCol="0" rtlCol="0" fromWordArt="0" anchor="ctr" anchorCtr="0" forceAA="0" compatLnSpc="1">
-            <a:prstTxWarp prst="textNoShape">
-              <a:avLst/>
-            </a:prstTxWarp>
-            <a:noAutofit/>
-          </a:bodyPr>
-          <a:lstStyle/>
-          <a:p>
-            <a:pPr algn="ctr"/>
-            <a:r>
-              <a:rPr lang="en-CA" sz="1200" dirty="0"/>
-              <a:t>tweets vs. legislation count</a:t>
-            </a:r>
-          </a:p>
-        </p:txBody>
-      </p:sp>
-      <p:cxnSp>
-        <p:nvCxnSpPr>
-          <p:cNvPr id="228" name="Connector: Elbow 227">
-            <a:extLst>
-              <a:ext uri="{FF2B5EF4-FFF2-40B4-BE49-F238E27FC236}">
-                <a16:creationId xmlns:a16="http://schemas.microsoft.com/office/drawing/2014/main" id="{87E3D03C-DF79-4319-ADF8-91FD7C20D8F7}"/>
-              </a:ext>
-            </a:extLst>
-          </p:cNvPr>
-          <p:cNvCxnSpPr>
-            <a:cxnSpLocks/>
-            <a:stCxn id="30" idx="2"/>
-            <a:endCxn id="48" idx="3"/>
-          </p:cNvCxnSpPr>
-          <p:nvPr/>
-        </p:nvCxnSpPr>
-        <p:spPr>
-          <a:xfrm rot="16200000" flipH="1">
-            <a:off x="7613409" y="3245640"/>
-            <a:ext cx="1605268" cy="514345"/>
-          </a:xfrm>
-          <a:prstGeom prst="bentConnector4">
-            <a:avLst>
-              <a:gd name="adj1" fmla="val 40909"/>
-              <a:gd name="adj2" fmla="val 154247"/>
-            </a:avLst>
-          </a:prstGeom>
-          <a:ln w="28575">
-            <a:tailEnd type="triangle"/>
-          </a:ln>
-        </p:spPr>
-        <p:style>
-          <a:lnRef idx="1">
-            <a:schemeClr val="dk1"/>
-          </a:lnRef>
-          <a:fillRef idx="0">
-            <a:schemeClr val="dk1"/>
-          </a:fillRef>
-          <a:effectRef idx="0">
-            <a:schemeClr val="dk1"/>
-          </a:effectRef>
-          <a:fontRef idx="minor">
-            <a:schemeClr val="tx1"/>
-          </a:fontRef>
-        </p:style>
-      </p:cxnSp>
-      <p:cxnSp>
-        <p:nvCxnSpPr>
-          <p:cNvPr id="291" name="Connector: Elbow 290">
-            <a:extLst>
-              <a:ext uri="{FF2B5EF4-FFF2-40B4-BE49-F238E27FC236}">
-                <a16:creationId xmlns:a16="http://schemas.microsoft.com/office/drawing/2014/main" id="{AA7C5B09-3096-431D-A885-12CB5783D1A9}"/>
-              </a:ext>
-            </a:extLst>
-          </p:cNvPr>
-          <p:cNvCxnSpPr>
-            <a:cxnSpLocks/>
-            <a:stCxn id="9" idx="2"/>
-            <a:endCxn id="30" idx="0"/>
-          </p:cNvCxnSpPr>
-          <p:nvPr/>
-        </p:nvCxnSpPr>
-        <p:spPr>
-          <a:xfrm rot="16200000" flipH="1">
-            <a:off x="6313077" y="268033"/>
-            <a:ext cx="369448" cy="3322139"/>
-          </a:xfrm>
-          <a:prstGeom prst="bentConnector3">
-            <a:avLst>
-              <a:gd name="adj1" fmla="val 50000"/>
-            </a:avLst>
-          </a:prstGeom>
-          <a:ln w="28575">
-            <a:tailEnd type="triangle"/>
-          </a:ln>
-        </p:spPr>
-        <p:style>
-          <a:lnRef idx="1">
-            <a:schemeClr val="dk1"/>
-          </a:lnRef>
-          <a:fillRef idx="0">
-            <a:schemeClr val="dk1"/>
-          </a:fillRef>
-          <a:effectRef idx="0">
-            <a:schemeClr val="dk1"/>
-          </a:effectRef>
-          <a:fontRef idx="minor">
-            <a:schemeClr val="tx1"/>
-          </a:fontRef>
-        </p:style>
-      </p:cxnSp>
-      <p:cxnSp>
-        <p:nvCxnSpPr>
-          <p:cNvPr id="318" name="Connector: Elbow 317">
-            <a:extLst>
-              <a:ext uri="{FF2B5EF4-FFF2-40B4-BE49-F238E27FC236}">
-                <a16:creationId xmlns:a16="http://schemas.microsoft.com/office/drawing/2014/main" id="{750DDEC5-A01A-440F-AFE2-E05FFD802DFE}"/>
-              </a:ext>
-            </a:extLst>
-          </p:cNvPr>
-          <p:cNvCxnSpPr>
-            <a:cxnSpLocks/>
-            <a:stCxn id="30" idx="2"/>
-            <a:endCxn id="223" idx="0"/>
-          </p:cNvCxnSpPr>
-          <p:nvPr/>
-        </p:nvCxnSpPr>
-        <p:spPr>
-          <a:xfrm rot="5400000">
-            <a:off x="5682379" y="1530931"/>
-            <a:ext cx="1307245" cy="3645740"/>
-          </a:xfrm>
-          <a:prstGeom prst="bentConnector3">
-            <a:avLst>
-              <a:gd name="adj1" fmla="val 86992"/>
-            </a:avLst>
-          </a:prstGeom>
-          <a:ln w="28575">
-            <a:tailEnd type="triangle"/>
-          </a:ln>
-        </p:spPr>
-        <p:style>
-          <a:lnRef idx="1">
-            <a:schemeClr val="dk1"/>
-          </a:lnRef>
-          <a:fillRef idx="0">
-            <a:schemeClr val="dk1"/>
-          </a:fillRef>
-          <a:effectRef idx="0">
-            <a:schemeClr val="dk1"/>
-          </a:effectRef>
-          <a:fontRef idx="minor">
-            <a:schemeClr val="tx1"/>
-          </a:fontRef>
-        </p:style>
-      </p:cxnSp>
-      <p:cxnSp>
-        <p:nvCxnSpPr>
-          <p:cNvPr id="324" name="Connector: Elbow 323">
-            <a:extLst>
-              <a:ext uri="{FF2B5EF4-FFF2-40B4-BE49-F238E27FC236}">
-                <a16:creationId xmlns:a16="http://schemas.microsoft.com/office/drawing/2014/main" id="{AB7EBAB6-C330-4715-9EA9-90FA0816DCC6}"/>
-              </a:ext>
-            </a:extLst>
-          </p:cNvPr>
-          <p:cNvCxnSpPr>
-            <a:cxnSpLocks/>
-            <a:stCxn id="182" idx="2"/>
-            <a:endCxn id="117" idx="3"/>
-          </p:cNvCxnSpPr>
-          <p:nvPr/>
-        </p:nvCxnSpPr>
-        <p:spPr>
-          <a:xfrm rot="5400000">
-            <a:off x="5162745" y="3452894"/>
-            <a:ext cx="2533056" cy="1015306"/>
-          </a:xfrm>
-          <a:prstGeom prst="bentConnector2">
-            <a:avLst/>
-          </a:prstGeom>
-          <a:ln w="28575">
-            <a:tailEnd type="triangle"/>
-          </a:ln>
-        </p:spPr>
-        <p:style>
-          <a:lnRef idx="1">
-            <a:schemeClr val="dk1"/>
-          </a:lnRef>
-          <a:fillRef idx="0">
-            <a:schemeClr val="dk1"/>
-          </a:fillRef>
-          <a:effectRef idx="0">
-            <a:schemeClr val="dk1"/>
-          </a:effectRef>
-          <a:fontRef idx="minor">
-            <a:schemeClr val="tx1"/>
-          </a:fontRef>
-        </p:style>
-      </p:cxnSp>
-      <p:sp>
-        <p:nvSpPr>
-          <p:cNvPr id="333" name="Rectangle 332">
-            <a:extLst>
-              <a:ext uri="{FF2B5EF4-FFF2-40B4-BE49-F238E27FC236}">
-                <a16:creationId xmlns:a16="http://schemas.microsoft.com/office/drawing/2014/main" id="{EB03B8D1-02EC-42B1-966B-2A80E9AA90EE}"/>
-              </a:ext>
-            </a:extLst>
-          </p:cNvPr>
-          <p:cNvSpPr/>
-          <p:nvPr/>
-        </p:nvSpPr>
-        <p:spPr>
-          <a:xfrm>
-            <a:off x="7343586" y="4935212"/>
-            <a:ext cx="935545" cy="583726"/>
+            <a:off x="3555608" y="5088070"/>
+            <a:ext cx="982174" cy="583726"/>
           </a:xfrm>
           <a:prstGeom prst="rect">
             <a:avLst/>
@@ -5855,34 +6111,36 @@
             <a:pPr algn="ctr"/>
             <a:r>
               <a:rPr lang="en-CA" sz="1200" dirty="0"/>
-              <a:t>Network spatial interactions</a:t>
+              <a:t>Centrality metrics</a:t>
             </a:r>
           </a:p>
         </p:txBody>
       </p:sp>
       <p:cxnSp>
         <p:nvCxnSpPr>
-          <p:cNvPr id="343" name="Connector: Elbow 342">
+          <p:cNvPr id="123" name="Connector: Elbow 122">
             <a:extLst>
               <a:ext uri="{FF2B5EF4-FFF2-40B4-BE49-F238E27FC236}">
-                <a16:creationId xmlns:a16="http://schemas.microsoft.com/office/drawing/2014/main" id="{E29D7E8D-7AC0-42F9-9E4F-D68E8E7AD498}"/>
+                <a16:creationId xmlns:a16="http://schemas.microsoft.com/office/drawing/2014/main" id="{2F81D852-EAFC-468F-84D4-5BDFCD4B360F}"/>
               </a:ext>
             </a:extLst>
           </p:cNvPr>
           <p:cNvCxnSpPr>
             <a:cxnSpLocks/>
-            <a:stCxn id="182" idx="2"/>
-            <a:endCxn id="333" idx="1"/>
+            <a:stCxn id="103" idx="2"/>
+            <a:endCxn id="81" idx="0"/>
           </p:cNvCxnSpPr>
           <p:nvPr/>
         </p:nvCxnSpPr>
         <p:spPr>
-          <a:xfrm rot="16200000" flipH="1">
-            <a:off x="5873728" y="3757217"/>
-            <a:ext cx="2533056" cy="406660"/>
-          </a:xfrm>
-          <a:prstGeom prst="bentConnector2">
-            <a:avLst/>
+          <a:xfrm rot="5400000">
+            <a:off x="4900103" y="3225538"/>
+            <a:ext cx="2241193" cy="1478497"/>
+          </a:xfrm>
+          <a:prstGeom prst="bentConnector3">
+            <a:avLst>
+              <a:gd name="adj1" fmla="val 89298"/>
+            </a:avLst>
           </a:prstGeom>
           <a:ln w="28575">
             <a:tailEnd type="triangle"/>

</xml_diff>

<commit_message>
more changes for thesis figures
</commit_message>
<xml_diff>
--- a/reports/Workflows.pptx
+++ b/reports/Workflows.pptx
@@ -243,7 +243,7 @@
           <a:p>
             <a:fld id="{A3B5D608-C030-4241-9E24-B3771303628F}" type="datetimeFigureOut">
               <a:rPr lang="en-CA" smtClean="0"/>
-              <a:t>2021-05-28</a:t>
+              <a:t>2021-06-09</a:t>
             </a:fld>
             <a:endParaRPr lang="en-CA"/>
           </a:p>
@@ -413,7 +413,7 @@
           <a:p>
             <a:fld id="{A3B5D608-C030-4241-9E24-B3771303628F}" type="datetimeFigureOut">
               <a:rPr lang="en-CA" smtClean="0"/>
-              <a:t>2021-05-28</a:t>
+              <a:t>2021-06-09</a:t>
             </a:fld>
             <a:endParaRPr lang="en-CA"/>
           </a:p>
@@ -593,7 +593,7 @@
           <a:p>
             <a:fld id="{A3B5D608-C030-4241-9E24-B3771303628F}" type="datetimeFigureOut">
               <a:rPr lang="en-CA" smtClean="0"/>
-              <a:t>2021-05-28</a:t>
+              <a:t>2021-06-09</a:t>
             </a:fld>
             <a:endParaRPr lang="en-CA"/>
           </a:p>
@@ -763,7 +763,7 @@
           <a:p>
             <a:fld id="{A3B5D608-C030-4241-9E24-B3771303628F}" type="datetimeFigureOut">
               <a:rPr lang="en-CA" smtClean="0"/>
-              <a:t>2021-05-28</a:t>
+              <a:t>2021-06-09</a:t>
             </a:fld>
             <a:endParaRPr lang="en-CA"/>
           </a:p>
@@ -1007,7 +1007,7 @@
           <a:p>
             <a:fld id="{A3B5D608-C030-4241-9E24-B3771303628F}" type="datetimeFigureOut">
               <a:rPr lang="en-CA" smtClean="0"/>
-              <a:t>2021-05-28</a:t>
+              <a:t>2021-06-09</a:t>
             </a:fld>
             <a:endParaRPr lang="en-CA"/>
           </a:p>
@@ -1239,7 +1239,7 @@
           <a:p>
             <a:fld id="{A3B5D608-C030-4241-9E24-B3771303628F}" type="datetimeFigureOut">
               <a:rPr lang="en-CA" smtClean="0"/>
-              <a:t>2021-05-28</a:t>
+              <a:t>2021-06-09</a:t>
             </a:fld>
             <a:endParaRPr lang="en-CA"/>
           </a:p>
@@ -1606,7 +1606,7 @@
           <a:p>
             <a:fld id="{A3B5D608-C030-4241-9E24-B3771303628F}" type="datetimeFigureOut">
               <a:rPr lang="en-CA" smtClean="0"/>
-              <a:t>2021-05-28</a:t>
+              <a:t>2021-06-09</a:t>
             </a:fld>
             <a:endParaRPr lang="en-CA"/>
           </a:p>
@@ -1724,7 +1724,7 @@
           <a:p>
             <a:fld id="{A3B5D608-C030-4241-9E24-B3771303628F}" type="datetimeFigureOut">
               <a:rPr lang="en-CA" smtClean="0"/>
-              <a:t>2021-05-28</a:t>
+              <a:t>2021-06-09</a:t>
             </a:fld>
             <a:endParaRPr lang="en-CA"/>
           </a:p>
@@ -1819,7 +1819,7 @@
           <a:p>
             <a:fld id="{A3B5D608-C030-4241-9E24-B3771303628F}" type="datetimeFigureOut">
               <a:rPr lang="en-CA" smtClean="0"/>
-              <a:t>2021-05-28</a:t>
+              <a:t>2021-06-09</a:t>
             </a:fld>
             <a:endParaRPr lang="en-CA"/>
           </a:p>
@@ -2096,7 +2096,7 @@
           <a:p>
             <a:fld id="{A3B5D608-C030-4241-9E24-B3771303628F}" type="datetimeFigureOut">
               <a:rPr lang="en-CA" smtClean="0"/>
-              <a:t>2021-05-28</a:t>
+              <a:t>2021-06-09</a:t>
             </a:fld>
             <a:endParaRPr lang="en-CA"/>
           </a:p>
@@ -2353,7 +2353,7 @@
           <a:p>
             <a:fld id="{A3B5D608-C030-4241-9E24-B3771303628F}" type="datetimeFigureOut">
               <a:rPr lang="en-CA" smtClean="0"/>
-              <a:t>2021-05-28</a:t>
+              <a:t>2021-06-09</a:t>
             </a:fld>
             <a:endParaRPr lang="en-CA"/>
           </a:p>
@@ -2566,7 +2566,7 @@
           <a:p>
             <a:fld id="{A3B5D608-C030-4241-9E24-B3771303628F}" type="datetimeFigureOut">
               <a:rPr lang="en-CA" smtClean="0"/>
-              <a:t>2021-05-28</a:t>
+              <a:t>2021-06-09</a:t>
             </a:fld>
             <a:endParaRPr lang="en-CA"/>
           </a:p>
@@ -6161,6 +6161,251 @@
           </a:fontRef>
         </p:style>
       </p:cxnSp>
+      <p:pic>
+        <p:nvPicPr>
+          <p:cNvPr id="63" name="Picture 62" descr="Icon&#10;&#10;Description automatically generated">
+            <a:extLst>
+              <a:ext uri="{FF2B5EF4-FFF2-40B4-BE49-F238E27FC236}">
+                <a16:creationId xmlns:a16="http://schemas.microsoft.com/office/drawing/2014/main" id="{5D5373B3-305B-48AA-B9DA-1B9BD141BF43}"/>
+              </a:ext>
+            </a:extLst>
+          </p:cNvPr>
+          <p:cNvPicPr>
+            <a:picLocks noChangeAspect="1"/>
+          </p:cNvPicPr>
+          <p:nvPr/>
+        </p:nvPicPr>
+        <p:blipFill>
+          <a:blip r:embed="rId2">
+            <a:extLst>
+              <a:ext uri="{28A0092B-C50C-407E-A947-70E740481C1C}">
+                <a14:useLocalDpi xmlns:a14="http://schemas.microsoft.com/office/drawing/2010/main" val="0"/>
+              </a:ext>
+            </a:extLst>
+          </a:blip>
+          <a:stretch>
+            <a:fillRect/>
+          </a:stretch>
+        </p:blipFill>
+        <p:spPr>
+          <a:xfrm>
+            <a:off x="191687" y="2422471"/>
+            <a:ext cx="241427" cy="241427"/>
+          </a:xfrm>
+          <a:prstGeom prst="rect">
+            <a:avLst/>
+          </a:prstGeom>
+        </p:spPr>
+      </p:pic>
+      <p:pic>
+        <p:nvPicPr>
+          <p:cNvPr id="67" name="Picture 66" descr="Icon&#10;&#10;Description automatically generated">
+            <a:extLst>
+              <a:ext uri="{FF2B5EF4-FFF2-40B4-BE49-F238E27FC236}">
+                <a16:creationId xmlns:a16="http://schemas.microsoft.com/office/drawing/2014/main" id="{2211E549-44AF-4BCD-8E27-6055438AAB38}"/>
+              </a:ext>
+            </a:extLst>
+          </p:cNvPr>
+          <p:cNvPicPr>
+            <a:picLocks noChangeAspect="1"/>
+          </p:cNvPicPr>
+          <p:nvPr/>
+        </p:nvPicPr>
+        <p:blipFill>
+          <a:blip r:embed="rId2">
+            <a:extLst>
+              <a:ext uri="{28A0092B-C50C-407E-A947-70E740481C1C}">
+                <a14:useLocalDpi xmlns:a14="http://schemas.microsoft.com/office/drawing/2010/main" val="0"/>
+              </a:ext>
+            </a:extLst>
+          </a:blip>
+          <a:stretch>
+            <a:fillRect/>
+          </a:stretch>
+        </p:blipFill>
+        <p:spPr>
+          <a:xfrm>
+            <a:off x="188756" y="3344099"/>
+            <a:ext cx="241427" cy="241427"/>
+          </a:xfrm>
+          <a:prstGeom prst="rect">
+            <a:avLst/>
+          </a:prstGeom>
+        </p:spPr>
+      </p:pic>
+      <p:pic>
+        <p:nvPicPr>
+          <p:cNvPr id="71" name="Picture 70" descr="Icon&#10;&#10;Description automatically generated">
+            <a:extLst>
+              <a:ext uri="{FF2B5EF4-FFF2-40B4-BE49-F238E27FC236}">
+                <a16:creationId xmlns:a16="http://schemas.microsoft.com/office/drawing/2014/main" id="{988DC0DF-466C-42EA-852F-D51024F0B0ED}"/>
+              </a:ext>
+            </a:extLst>
+          </p:cNvPr>
+          <p:cNvPicPr>
+            <a:picLocks noChangeAspect="1"/>
+          </p:cNvPicPr>
+          <p:nvPr/>
+        </p:nvPicPr>
+        <p:blipFill>
+          <a:blip r:embed="rId2">
+            <a:extLst>
+              <a:ext uri="{28A0092B-C50C-407E-A947-70E740481C1C}">
+                <a14:useLocalDpi xmlns:a14="http://schemas.microsoft.com/office/drawing/2010/main" val="0"/>
+              </a:ext>
+            </a:extLst>
+          </a:blip>
+          <a:stretch>
+            <a:fillRect/>
+          </a:stretch>
+        </p:blipFill>
+        <p:spPr>
+          <a:xfrm>
+            <a:off x="185036" y="4317995"/>
+            <a:ext cx="241427" cy="241427"/>
+          </a:xfrm>
+          <a:prstGeom prst="rect">
+            <a:avLst/>
+          </a:prstGeom>
+        </p:spPr>
+      </p:pic>
+      <p:pic>
+        <p:nvPicPr>
+          <p:cNvPr id="82" name="Picture 81" descr="Icon&#10;&#10;Description automatically generated">
+            <a:extLst>
+              <a:ext uri="{FF2B5EF4-FFF2-40B4-BE49-F238E27FC236}">
+                <a16:creationId xmlns:a16="http://schemas.microsoft.com/office/drawing/2014/main" id="{488C596F-8F4F-4A47-A1E5-E623ADA0FDC4}"/>
+              </a:ext>
+            </a:extLst>
+          </p:cNvPr>
+          <p:cNvPicPr>
+            <a:picLocks noChangeAspect="1"/>
+          </p:cNvPicPr>
+          <p:nvPr/>
+        </p:nvPicPr>
+        <p:blipFill>
+          <a:blip r:embed="rId2">
+            <a:extLst>
+              <a:ext uri="{28A0092B-C50C-407E-A947-70E740481C1C}">
+                <a14:useLocalDpi xmlns:a14="http://schemas.microsoft.com/office/drawing/2010/main" val="0"/>
+              </a:ext>
+            </a:extLst>
+          </a:blip>
+          <a:stretch>
+            <a:fillRect/>
+          </a:stretch>
+        </p:blipFill>
+        <p:spPr>
+          <a:xfrm>
+            <a:off x="179864" y="5239623"/>
+            <a:ext cx="241427" cy="241427"/>
+          </a:xfrm>
+          <a:prstGeom prst="rect">
+            <a:avLst/>
+          </a:prstGeom>
+        </p:spPr>
+      </p:pic>
+      <p:pic>
+        <p:nvPicPr>
+          <p:cNvPr id="91" name="Picture 90" descr="Icon&#10;&#10;Description automatically generated">
+            <a:extLst>
+              <a:ext uri="{FF2B5EF4-FFF2-40B4-BE49-F238E27FC236}">
+                <a16:creationId xmlns:a16="http://schemas.microsoft.com/office/drawing/2014/main" id="{658473FF-AA5E-45AD-884B-FED892052841}"/>
+              </a:ext>
+            </a:extLst>
+          </p:cNvPr>
+          <p:cNvPicPr>
+            <a:picLocks noChangeAspect="1"/>
+          </p:cNvPicPr>
+          <p:nvPr/>
+        </p:nvPicPr>
+        <p:blipFill>
+          <a:blip r:embed="rId2">
+            <a:extLst>
+              <a:ext uri="{28A0092B-C50C-407E-A947-70E740481C1C}">
+                <a14:useLocalDpi xmlns:a14="http://schemas.microsoft.com/office/drawing/2010/main" val="0"/>
+              </a:ext>
+            </a:extLst>
+          </a:blip>
+          <a:stretch>
+            <a:fillRect/>
+          </a:stretch>
+        </p:blipFill>
+        <p:spPr>
+          <a:xfrm>
+            <a:off x="7222039" y="6023591"/>
+            <a:ext cx="241427" cy="241427"/>
+          </a:xfrm>
+          <a:prstGeom prst="rect">
+            <a:avLst/>
+          </a:prstGeom>
+        </p:spPr>
+      </p:pic>
+      <p:sp>
+        <p:nvSpPr>
+          <p:cNvPr id="3" name="TextBox 2">
+            <a:extLst>
+              <a:ext uri="{FF2B5EF4-FFF2-40B4-BE49-F238E27FC236}">
+                <a16:creationId xmlns:a16="http://schemas.microsoft.com/office/drawing/2014/main" id="{28B032CD-EC5A-482E-B3AD-CC8F543CA39B}"/>
+              </a:ext>
+            </a:extLst>
+          </p:cNvPr>
+          <p:cNvSpPr txBox="1"/>
+          <p:nvPr/>
+        </p:nvSpPr>
+        <p:spPr>
+          <a:xfrm>
+            <a:off x="7345684" y="6005804"/>
+            <a:ext cx="1621293" cy="276999"/>
+          </a:xfrm>
+          <a:prstGeom prst="rect">
+            <a:avLst/>
+          </a:prstGeom>
+          <a:noFill/>
+        </p:spPr>
+        <p:txBody>
+          <a:bodyPr wrap="square" rtlCol="0">
+            <a:spAutoFit/>
+          </a:bodyPr>
+          <a:lstStyle/>
+          <a:p>
+            <a:pPr marL="0" marR="0" lvl="0" indent="0" algn="ctr" defTabSz="457200" rtl="0" eaLnBrk="1" fontAlgn="auto" latinLnBrk="0" hangingPunct="1">
+              <a:lnSpc>
+                <a:spcPct val="100000"/>
+              </a:lnSpc>
+              <a:spcBef>
+                <a:spcPts val="0"/>
+              </a:spcBef>
+              <a:spcAft>
+                <a:spcPts val="0"/>
+              </a:spcAft>
+              <a:buClrTx/>
+              <a:buSzTx/>
+              <a:buFontTx/>
+              <a:buNone/>
+              <a:tabLst/>
+              <a:defRPr/>
+            </a:pPr>
+            <a:r>
+              <a:rPr kumimoji="0" lang="en-CA" sz="1200" b="1" i="0" u="none" strike="noStrike" kern="1200" cap="none" spc="0" normalizeH="0" baseline="0" noProof="0" dirty="0">
+                <a:ln>
+                  <a:noFill/>
+                </a:ln>
+                <a:solidFill>
+                  <a:prstClr val="black"/>
+                </a:solidFill>
+                <a:effectLst/>
+                <a:uLnTx/>
+                <a:uFillTx/>
+                <a:latin typeface="Calibri" panose="020F0502020204030204"/>
+                <a:ea typeface="+mn-ea"/>
+                <a:cs typeface="+mn-cs"/>
+              </a:rPr>
+              <a:t>= Geospatial Analysis</a:t>
+            </a:r>
+          </a:p>
+        </p:txBody>
+      </p:sp>
     </p:spTree>
     <p:extLst>
       <p:ext uri="{BB962C8B-B14F-4D97-AF65-F5344CB8AC3E}">

</xml_diff>

<commit_message>
tlcc analysis for legislation
</commit_message>
<xml_diff>
--- a/reports/Workflows.pptx
+++ b/reports/Workflows.pptx
@@ -2,12 +2,13 @@
 <file path=ppt/presentation.xml><?xml version="1.0" encoding="utf-8"?>
 <p:presentation xmlns:a="http://schemas.openxmlformats.org/drawingml/2006/main" xmlns:r="http://schemas.openxmlformats.org/officeDocument/2006/relationships" xmlns:p="http://schemas.openxmlformats.org/presentationml/2006/main" saveSubsetFonts="1">
   <p:sldMasterIdLst>
-    <p:sldMasterId id="2147483660" r:id="rId1"/>
+    <p:sldMasterId id="2147483672" r:id="rId1"/>
   </p:sldMasterIdLst>
   <p:sldIdLst>
     <p:sldId id="256" r:id="rId2"/>
+    <p:sldId id="257" r:id="rId3"/>
   </p:sldIdLst>
-  <p:sldSz cx="9144000" cy="6858000" type="screen4x3"/>
+  <p:sldSz cx="12192000" cy="6858000"/>
   <p:notesSz cx="6858000" cy="9144000"/>
   <p:defaultTextStyle>
     <a:defPPr>
@@ -141,8 +142,8 @@
         </p:nvSpPr>
         <p:spPr>
           <a:xfrm>
-            <a:off x="685800" y="1122363"/>
-            <a:ext cx="7772400" cy="2387600"/>
+            <a:off x="1524000" y="1122363"/>
+            <a:ext cx="9144000" cy="2387600"/>
           </a:xfrm>
         </p:spPr>
         <p:txBody>
@@ -173,8 +174,8 @@
         </p:nvSpPr>
         <p:spPr>
           <a:xfrm>
-            <a:off x="1143000" y="3602038"/>
-            <a:ext cx="6858000" cy="1655762"/>
+            <a:off x="1524000" y="3602038"/>
+            <a:ext cx="9144000" cy="1655762"/>
           </a:xfrm>
         </p:spPr>
         <p:txBody>
@@ -243,7 +244,7 @@
           <a:p>
             <a:fld id="{A3B5D608-C030-4241-9E24-B3771303628F}" type="datetimeFigureOut">
               <a:rPr lang="en-CA" smtClean="0"/>
-              <a:t>2021-06-09</a:t>
+              <a:t>2021-06-23</a:t>
             </a:fld>
             <a:endParaRPr lang="en-CA"/>
           </a:p>
@@ -294,7 +295,7 @@
     </p:spTree>
     <p:extLst>
       <p:ext uri="{BB962C8B-B14F-4D97-AF65-F5344CB8AC3E}">
-        <p14:creationId xmlns:p14="http://schemas.microsoft.com/office/powerpoint/2010/main" val="325344154"/>
+        <p14:creationId xmlns:p14="http://schemas.microsoft.com/office/powerpoint/2010/main" val="3708430915"/>
       </p:ext>
     </p:extLst>
   </p:cSld>
@@ -413,7 +414,7 @@
           <a:p>
             <a:fld id="{A3B5D608-C030-4241-9E24-B3771303628F}" type="datetimeFigureOut">
               <a:rPr lang="en-CA" smtClean="0"/>
-              <a:t>2021-06-09</a:t>
+              <a:t>2021-06-23</a:t>
             </a:fld>
             <a:endParaRPr lang="en-CA"/>
           </a:p>
@@ -464,7 +465,7 @@
     </p:spTree>
     <p:extLst>
       <p:ext uri="{BB962C8B-B14F-4D97-AF65-F5344CB8AC3E}">
-        <p14:creationId xmlns:p14="http://schemas.microsoft.com/office/powerpoint/2010/main" val="3595013517"/>
+        <p14:creationId xmlns:p14="http://schemas.microsoft.com/office/powerpoint/2010/main" val="3319957644"/>
       </p:ext>
     </p:extLst>
   </p:cSld>
@@ -503,8 +504,8 @@
         </p:nvSpPr>
         <p:spPr>
           <a:xfrm>
-            <a:off x="6543675" y="365125"/>
-            <a:ext cx="1971675" cy="5811838"/>
+            <a:off x="8724900" y="365125"/>
+            <a:ext cx="2628900" cy="5811838"/>
           </a:xfrm>
         </p:spPr>
         <p:txBody>
@@ -531,8 +532,8 @@
         </p:nvSpPr>
         <p:spPr>
           <a:xfrm>
-            <a:off x="628650" y="365125"/>
-            <a:ext cx="5800725" cy="5811838"/>
+            <a:off x="838200" y="365125"/>
+            <a:ext cx="7734300" cy="5811838"/>
           </a:xfrm>
         </p:spPr>
         <p:txBody>
@@ -593,7 +594,7 @@
           <a:p>
             <a:fld id="{A3B5D608-C030-4241-9E24-B3771303628F}" type="datetimeFigureOut">
               <a:rPr lang="en-CA" smtClean="0"/>
-              <a:t>2021-06-09</a:t>
+              <a:t>2021-06-23</a:t>
             </a:fld>
             <a:endParaRPr lang="en-CA"/>
           </a:p>
@@ -644,7 +645,7 @@
     </p:spTree>
     <p:extLst>
       <p:ext uri="{BB962C8B-B14F-4D97-AF65-F5344CB8AC3E}">
-        <p14:creationId xmlns:p14="http://schemas.microsoft.com/office/powerpoint/2010/main" val="816825615"/>
+        <p14:creationId xmlns:p14="http://schemas.microsoft.com/office/powerpoint/2010/main" val="992860396"/>
       </p:ext>
     </p:extLst>
   </p:cSld>
@@ -763,7 +764,7 @@
           <a:p>
             <a:fld id="{A3B5D608-C030-4241-9E24-B3771303628F}" type="datetimeFigureOut">
               <a:rPr lang="en-CA" smtClean="0"/>
-              <a:t>2021-06-09</a:t>
+              <a:t>2021-06-23</a:t>
             </a:fld>
             <a:endParaRPr lang="en-CA"/>
           </a:p>
@@ -814,7 +815,7 @@
     </p:spTree>
     <p:extLst>
       <p:ext uri="{BB962C8B-B14F-4D97-AF65-F5344CB8AC3E}">
-        <p14:creationId xmlns:p14="http://schemas.microsoft.com/office/powerpoint/2010/main" val="746144429"/>
+        <p14:creationId xmlns:p14="http://schemas.microsoft.com/office/powerpoint/2010/main" val="1781759869"/>
       </p:ext>
     </p:extLst>
   </p:cSld>
@@ -853,8 +854,8 @@
         </p:nvSpPr>
         <p:spPr>
           <a:xfrm>
-            <a:off x="623888" y="1709739"/>
-            <a:ext cx="7886700" cy="2852737"/>
+            <a:off x="831850" y="1709738"/>
+            <a:ext cx="10515600" cy="2852737"/>
           </a:xfrm>
         </p:spPr>
         <p:txBody>
@@ -885,8 +886,8 @@
         </p:nvSpPr>
         <p:spPr>
           <a:xfrm>
-            <a:off x="623888" y="4589464"/>
-            <a:ext cx="7886700" cy="1500187"/>
+            <a:off x="831850" y="4589463"/>
+            <a:ext cx="10515600" cy="1500187"/>
           </a:xfrm>
         </p:spPr>
         <p:txBody>
@@ -896,7 +897,9 @@
               <a:buNone/>
               <a:defRPr sz="2400">
                 <a:solidFill>
-                  <a:schemeClr val="tx1"/>
+                  <a:schemeClr val="tx1">
+                    <a:tint val="75000"/>
+                  </a:schemeClr>
                 </a:solidFill>
               </a:defRPr>
             </a:lvl1pPr>
@@ -1007,7 +1010,7 @@
           <a:p>
             <a:fld id="{A3B5D608-C030-4241-9E24-B3771303628F}" type="datetimeFigureOut">
               <a:rPr lang="en-CA" smtClean="0"/>
-              <a:t>2021-06-09</a:t>
+              <a:t>2021-06-23</a:t>
             </a:fld>
             <a:endParaRPr lang="en-CA"/>
           </a:p>
@@ -1058,7 +1061,7 @@
     </p:spTree>
     <p:extLst>
       <p:ext uri="{BB962C8B-B14F-4D97-AF65-F5344CB8AC3E}">
-        <p14:creationId xmlns:p14="http://schemas.microsoft.com/office/powerpoint/2010/main" val="479663184"/>
+        <p14:creationId xmlns:p14="http://schemas.microsoft.com/office/powerpoint/2010/main" val="2866186730"/>
       </p:ext>
     </p:extLst>
   </p:cSld>
@@ -1120,8 +1123,8 @@
         </p:nvSpPr>
         <p:spPr>
           <a:xfrm>
-            <a:off x="628650" y="1825625"/>
-            <a:ext cx="3886200" cy="4351338"/>
+            <a:off x="838200" y="1825625"/>
+            <a:ext cx="5181600" cy="4351338"/>
           </a:xfrm>
         </p:spPr>
         <p:txBody>
@@ -1177,8 +1180,8 @@
         </p:nvSpPr>
         <p:spPr>
           <a:xfrm>
-            <a:off x="4629150" y="1825625"/>
-            <a:ext cx="3886200" cy="4351338"/>
+            <a:off x="6172200" y="1825625"/>
+            <a:ext cx="5181600" cy="4351338"/>
           </a:xfrm>
         </p:spPr>
         <p:txBody>
@@ -1239,7 +1242,7 @@
           <a:p>
             <a:fld id="{A3B5D608-C030-4241-9E24-B3771303628F}" type="datetimeFigureOut">
               <a:rPr lang="en-CA" smtClean="0"/>
-              <a:t>2021-06-09</a:t>
+              <a:t>2021-06-23</a:t>
             </a:fld>
             <a:endParaRPr lang="en-CA"/>
           </a:p>
@@ -1290,7 +1293,7 @@
     </p:spTree>
     <p:extLst>
       <p:ext uri="{BB962C8B-B14F-4D97-AF65-F5344CB8AC3E}">
-        <p14:creationId xmlns:p14="http://schemas.microsoft.com/office/powerpoint/2010/main" val="1991650513"/>
+        <p14:creationId xmlns:p14="http://schemas.microsoft.com/office/powerpoint/2010/main" val="245577070"/>
       </p:ext>
     </p:extLst>
   </p:cSld>
@@ -1329,8 +1332,8 @@
         </p:nvSpPr>
         <p:spPr>
           <a:xfrm>
-            <a:off x="629841" y="365126"/>
-            <a:ext cx="7886700" cy="1325563"/>
+            <a:off x="839788" y="365125"/>
+            <a:ext cx="10515600" cy="1325563"/>
           </a:xfrm>
         </p:spPr>
         <p:txBody>
@@ -1357,8 +1360,8 @@
         </p:nvSpPr>
         <p:spPr>
           <a:xfrm>
-            <a:off x="629842" y="1681163"/>
-            <a:ext cx="3868340" cy="823912"/>
+            <a:off x="839788" y="1681163"/>
+            <a:ext cx="5157787" cy="823912"/>
           </a:xfrm>
         </p:spPr>
         <p:txBody>
@@ -1422,8 +1425,8 @@
         </p:nvSpPr>
         <p:spPr>
           <a:xfrm>
-            <a:off x="629842" y="2505075"/>
-            <a:ext cx="3868340" cy="3684588"/>
+            <a:off x="839788" y="2505075"/>
+            <a:ext cx="5157787" cy="3684588"/>
           </a:xfrm>
         </p:spPr>
         <p:txBody>
@@ -1479,8 +1482,8 @@
         </p:nvSpPr>
         <p:spPr>
           <a:xfrm>
-            <a:off x="4629150" y="1681163"/>
-            <a:ext cx="3887391" cy="823912"/>
+            <a:off x="6172200" y="1681163"/>
+            <a:ext cx="5183188" cy="823912"/>
           </a:xfrm>
         </p:spPr>
         <p:txBody>
@@ -1544,8 +1547,8 @@
         </p:nvSpPr>
         <p:spPr>
           <a:xfrm>
-            <a:off x="4629150" y="2505075"/>
-            <a:ext cx="3887391" cy="3684588"/>
+            <a:off x="6172200" y="2505075"/>
+            <a:ext cx="5183188" cy="3684588"/>
           </a:xfrm>
         </p:spPr>
         <p:txBody>
@@ -1606,7 +1609,7 @@
           <a:p>
             <a:fld id="{A3B5D608-C030-4241-9E24-B3771303628F}" type="datetimeFigureOut">
               <a:rPr lang="en-CA" smtClean="0"/>
-              <a:t>2021-06-09</a:t>
+              <a:t>2021-06-23</a:t>
             </a:fld>
             <a:endParaRPr lang="en-CA"/>
           </a:p>
@@ -1657,7 +1660,7 @@
     </p:spTree>
     <p:extLst>
       <p:ext uri="{BB962C8B-B14F-4D97-AF65-F5344CB8AC3E}">
-        <p14:creationId xmlns:p14="http://schemas.microsoft.com/office/powerpoint/2010/main" val="3346647392"/>
+        <p14:creationId xmlns:p14="http://schemas.microsoft.com/office/powerpoint/2010/main" val="3268275201"/>
       </p:ext>
     </p:extLst>
   </p:cSld>
@@ -1724,7 +1727,7 @@
           <a:p>
             <a:fld id="{A3B5D608-C030-4241-9E24-B3771303628F}" type="datetimeFigureOut">
               <a:rPr lang="en-CA" smtClean="0"/>
-              <a:t>2021-06-09</a:t>
+              <a:t>2021-06-23</a:t>
             </a:fld>
             <a:endParaRPr lang="en-CA"/>
           </a:p>
@@ -1775,7 +1778,7 @@
     </p:spTree>
     <p:extLst>
       <p:ext uri="{BB962C8B-B14F-4D97-AF65-F5344CB8AC3E}">
-        <p14:creationId xmlns:p14="http://schemas.microsoft.com/office/powerpoint/2010/main" val="1176060825"/>
+        <p14:creationId xmlns:p14="http://schemas.microsoft.com/office/powerpoint/2010/main" val="3443801959"/>
       </p:ext>
     </p:extLst>
   </p:cSld>
@@ -1819,7 +1822,7 @@
           <a:p>
             <a:fld id="{A3B5D608-C030-4241-9E24-B3771303628F}" type="datetimeFigureOut">
               <a:rPr lang="en-CA" smtClean="0"/>
-              <a:t>2021-06-09</a:t>
+              <a:t>2021-06-23</a:t>
             </a:fld>
             <a:endParaRPr lang="en-CA"/>
           </a:p>
@@ -1870,7 +1873,7 @@
     </p:spTree>
     <p:extLst>
       <p:ext uri="{BB962C8B-B14F-4D97-AF65-F5344CB8AC3E}">
-        <p14:creationId xmlns:p14="http://schemas.microsoft.com/office/powerpoint/2010/main" val="2235681657"/>
+        <p14:creationId xmlns:p14="http://schemas.microsoft.com/office/powerpoint/2010/main" val="1460510868"/>
       </p:ext>
     </p:extLst>
   </p:cSld>
@@ -1909,8 +1912,8 @@
         </p:nvSpPr>
         <p:spPr>
           <a:xfrm>
-            <a:off x="629841" y="457200"/>
-            <a:ext cx="2949178" cy="1600200"/>
+            <a:off x="839788" y="457200"/>
+            <a:ext cx="3932237" cy="1600200"/>
           </a:xfrm>
         </p:spPr>
         <p:txBody>
@@ -1941,8 +1944,8 @@
         </p:nvSpPr>
         <p:spPr>
           <a:xfrm>
-            <a:off x="3887391" y="987426"/>
-            <a:ext cx="4629150" cy="4873625"/>
+            <a:off x="5183188" y="987425"/>
+            <a:ext cx="6172200" cy="4873625"/>
           </a:xfrm>
         </p:spPr>
         <p:txBody>
@@ -2026,8 +2029,8 @@
         </p:nvSpPr>
         <p:spPr>
           <a:xfrm>
-            <a:off x="629841" y="2057400"/>
-            <a:ext cx="2949178" cy="3811588"/>
+            <a:off x="839788" y="2057400"/>
+            <a:ext cx="3932237" cy="3811588"/>
           </a:xfrm>
         </p:spPr>
         <p:txBody>
@@ -2096,7 +2099,7 @@
           <a:p>
             <a:fld id="{A3B5D608-C030-4241-9E24-B3771303628F}" type="datetimeFigureOut">
               <a:rPr lang="en-CA" smtClean="0"/>
-              <a:t>2021-06-09</a:t>
+              <a:t>2021-06-23</a:t>
             </a:fld>
             <a:endParaRPr lang="en-CA"/>
           </a:p>
@@ -2147,7 +2150,7 @@
     </p:spTree>
     <p:extLst>
       <p:ext uri="{BB962C8B-B14F-4D97-AF65-F5344CB8AC3E}">
-        <p14:creationId xmlns:p14="http://schemas.microsoft.com/office/powerpoint/2010/main" val="3661097034"/>
+        <p14:creationId xmlns:p14="http://schemas.microsoft.com/office/powerpoint/2010/main" val="2686609851"/>
       </p:ext>
     </p:extLst>
   </p:cSld>
@@ -2186,8 +2189,8 @@
         </p:nvSpPr>
         <p:spPr>
           <a:xfrm>
-            <a:off x="629841" y="457200"/>
-            <a:ext cx="2949178" cy="1600200"/>
+            <a:off x="839788" y="457200"/>
+            <a:ext cx="3932237" cy="1600200"/>
           </a:xfrm>
         </p:spPr>
         <p:txBody>
@@ -2218,8 +2221,8 @@
         </p:nvSpPr>
         <p:spPr>
           <a:xfrm>
-            <a:off x="3887391" y="987426"/>
-            <a:ext cx="4629150" cy="4873625"/>
+            <a:off x="5183188" y="987425"/>
+            <a:ext cx="6172200" cy="4873625"/>
           </a:xfrm>
         </p:spPr>
         <p:txBody>
@@ -2283,8 +2286,8 @@
         </p:nvSpPr>
         <p:spPr>
           <a:xfrm>
-            <a:off x="629841" y="2057400"/>
-            <a:ext cx="2949178" cy="3811588"/>
+            <a:off x="839788" y="2057400"/>
+            <a:ext cx="3932237" cy="3811588"/>
           </a:xfrm>
         </p:spPr>
         <p:txBody>
@@ -2353,7 +2356,7 @@
           <a:p>
             <a:fld id="{A3B5D608-C030-4241-9E24-B3771303628F}" type="datetimeFigureOut">
               <a:rPr lang="en-CA" smtClean="0"/>
-              <a:t>2021-06-09</a:t>
+              <a:t>2021-06-23</a:t>
             </a:fld>
             <a:endParaRPr lang="en-CA"/>
           </a:p>
@@ -2404,7 +2407,7 @@
     </p:spTree>
     <p:extLst>
       <p:ext uri="{BB962C8B-B14F-4D97-AF65-F5344CB8AC3E}">
-        <p14:creationId xmlns:p14="http://schemas.microsoft.com/office/powerpoint/2010/main" val="3959715919"/>
+        <p14:creationId xmlns:p14="http://schemas.microsoft.com/office/powerpoint/2010/main" val="4135861200"/>
       </p:ext>
     </p:extLst>
   </p:cSld>
@@ -2448,8 +2451,8 @@
         </p:nvSpPr>
         <p:spPr>
           <a:xfrm>
-            <a:off x="628650" y="365126"/>
-            <a:ext cx="7886700" cy="1325563"/>
+            <a:off x="838200" y="365125"/>
+            <a:ext cx="10515600" cy="1325563"/>
           </a:xfrm>
           <a:prstGeom prst="rect">
             <a:avLst/>
@@ -2481,8 +2484,8 @@
         </p:nvSpPr>
         <p:spPr>
           <a:xfrm>
-            <a:off x="628650" y="1825625"/>
-            <a:ext cx="7886700" cy="4351338"/>
+            <a:off x="838200" y="1825625"/>
+            <a:ext cx="10515600" cy="4351338"/>
           </a:xfrm>
           <a:prstGeom prst="rect">
             <a:avLst/>
@@ -2543,8 +2546,8 @@
         </p:nvSpPr>
         <p:spPr>
           <a:xfrm>
-            <a:off x="628650" y="6356351"/>
-            <a:ext cx="2057400" cy="365125"/>
+            <a:off x="838200" y="6356350"/>
+            <a:ext cx="2743200" cy="365125"/>
           </a:xfrm>
           <a:prstGeom prst="rect">
             <a:avLst/>
@@ -2566,7 +2569,7 @@
           <a:p>
             <a:fld id="{A3B5D608-C030-4241-9E24-B3771303628F}" type="datetimeFigureOut">
               <a:rPr lang="en-CA" smtClean="0"/>
-              <a:t>2021-06-09</a:t>
+              <a:t>2021-06-23</a:t>
             </a:fld>
             <a:endParaRPr lang="en-CA"/>
           </a:p>
@@ -2584,8 +2587,8 @@
         </p:nvSpPr>
         <p:spPr>
           <a:xfrm>
-            <a:off x="3028950" y="6356351"/>
-            <a:ext cx="3086100" cy="365125"/>
+            <a:off x="4038600" y="6356350"/>
+            <a:ext cx="4114800" cy="365125"/>
           </a:xfrm>
           <a:prstGeom prst="rect">
             <a:avLst/>
@@ -2621,8 +2624,8 @@
         </p:nvSpPr>
         <p:spPr>
           <a:xfrm>
-            <a:off x="6457950" y="6356351"/>
-            <a:ext cx="2057400" cy="365125"/>
+            <a:off x="8610600" y="6356350"/>
+            <a:ext cx="2743200" cy="365125"/>
           </a:xfrm>
           <a:prstGeom prst="rect">
             <a:avLst/>
@@ -2653,23 +2656,23 @@
     </p:spTree>
     <p:extLst>
       <p:ext uri="{BB962C8B-B14F-4D97-AF65-F5344CB8AC3E}">
-        <p14:creationId xmlns:p14="http://schemas.microsoft.com/office/powerpoint/2010/main" val="405265342"/>
+        <p14:creationId xmlns:p14="http://schemas.microsoft.com/office/powerpoint/2010/main" val="948185250"/>
       </p:ext>
     </p:extLst>
   </p:cSld>
   <p:clrMap bg1="lt1" tx1="dk1" bg2="lt2" tx2="dk2" accent1="accent1" accent2="accent2" accent3="accent3" accent4="accent4" accent5="accent5" accent6="accent6" hlink="hlink" folHlink="folHlink"/>
   <p:sldLayoutIdLst>
-    <p:sldLayoutId id="2147483661" r:id="rId1"/>
-    <p:sldLayoutId id="2147483662" r:id="rId2"/>
-    <p:sldLayoutId id="2147483663" r:id="rId3"/>
-    <p:sldLayoutId id="2147483664" r:id="rId4"/>
-    <p:sldLayoutId id="2147483665" r:id="rId5"/>
-    <p:sldLayoutId id="2147483666" r:id="rId6"/>
-    <p:sldLayoutId id="2147483667" r:id="rId7"/>
-    <p:sldLayoutId id="2147483668" r:id="rId8"/>
-    <p:sldLayoutId id="2147483669" r:id="rId9"/>
-    <p:sldLayoutId id="2147483670" r:id="rId10"/>
-    <p:sldLayoutId id="2147483671" r:id="rId11"/>
+    <p:sldLayoutId id="2147483673" r:id="rId1"/>
+    <p:sldLayoutId id="2147483674" r:id="rId2"/>
+    <p:sldLayoutId id="2147483675" r:id="rId3"/>
+    <p:sldLayoutId id="2147483676" r:id="rId4"/>
+    <p:sldLayoutId id="2147483677" r:id="rId5"/>
+    <p:sldLayoutId id="2147483678" r:id="rId6"/>
+    <p:sldLayoutId id="2147483679" r:id="rId7"/>
+    <p:sldLayoutId id="2147483680" r:id="rId8"/>
+    <p:sldLayoutId id="2147483681" r:id="rId9"/>
+    <p:sldLayoutId id="2147483682" r:id="rId10"/>
+    <p:sldLayoutId id="2147483683" r:id="rId11"/>
   </p:sldLayoutIdLst>
   <p:txStyles>
     <p:titleStyle>
@@ -2987,7 +2990,7 @@
         </p:nvCxnSpPr>
         <p:spPr>
           <a:xfrm>
-            <a:off x="3556789" y="4225642"/>
+            <a:off x="5080789" y="4225643"/>
             <a:ext cx="0" cy="2074985"/>
           </a:xfrm>
           <a:prstGeom prst="line">
@@ -3026,7 +3029,7 @@
         </p:nvCxnSpPr>
         <p:spPr>
           <a:xfrm>
-            <a:off x="3552393" y="6418363"/>
+            <a:off x="5076393" y="6418363"/>
             <a:ext cx="5114336" cy="0"/>
           </a:xfrm>
           <a:prstGeom prst="line">
@@ -3067,7 +3070,7 @@
         </p:nvCxnSpPr>
         <p:spPr>
           <a:xfrm flipH="1">
-            <a:off x="1909610" y="-418246"/>
+            <a:off x="3433610" y="-418246"/>
             <a:ext cx="328032" cy="0"/>
           </a:xfrm>
           <a:prstGeom prst="line">
@@ -3106,7 +3109,7 @@
         </p:nvSpPr>
         <p:spPr>
           <a:xfrm>
-            <a:off x="-635612" y="3983284"/>
+            <a:off x="888389" y="3983284"/>
             <a:ext cx="5991227" cy="1976436"/>
           </a:xfrm>
           <a:prstGeom prst="ellipse">
@@ -3166,7 +3169,7 @@
         </p:nvSpPr>
         <p:spPr>
           <a:xfrm>
-            <a:off x="2029024" y="376097"/>
+            <a:off x="3553024" y="376097"/>
             <a:ext cx="1199708" cy="583726"/>
           </a:xfrm>
           <a:prstGeom prst="rect">
@@ -3233,7 +3236,7 @@
         </p:nvSpPr>
         <p:spPr>
           <a:xfrm>
-            <a:off x="470755" y="377296"/>
+            <a:off x="1994756" y="377296"/>
             <a:ext cx="1044785" cy="583726"/>
           </a:xfrm>
           <a:prstGeom prst="rect">
@@ -3305,7 +3308,7 @@
         </p:nvSpPr>
         <p:spPr>
           <a:xfrm>
-            <a:off x="4928902" y="408285"/>
+            <a:off x="6452902" y="408285"/>
             <a:ext cx="1266896" cy="583726"/>
           </a:xfrm>
           <a:prstGeom prst="rect">
@@ -3372,7 +3375,7 @@
         </p:nvSpPr>
         <p:spPr>
           <a:xfrm>
-            <a:off x="470756" y="1308955"/>
+            <a:off x="1994757" y="1308955"/>
             <a:ext cx="1044785" cy="583726"/>
           </a:xfrm>
           <a:prstGeom prst="rect">
@@ -3441,7 +3444,7 @@
         </p:nvSpPr>
         <p:spPr>
           <a:xfrm>
-            <a:off x="2027987" y="1308957"/>
+            <a:off x="3551987" y="1308957"/>
             <a:ext cx="1199708" cy="583726"/>
           </a:xfrm>
           <a:prstGeom prst="rect">
@@ -3508,7 +3511,7 @@
         </p:nvSpPr>
         <p:spPr>
           <a:xfrm>
-            <a:off x="3796508" y="1310824"/>
+            <a:off x="5320509" y="1310824"/>
             <a:ext cx="1726489" cy="583726"/>
           </a:xfrm>
           <a:prstGeom prst="rect">
@@ -3575,7 +3578,7 @@
         </p:nvSpPr>
         <p:spPr>
           <a:xfrm>
-            <a:off x="8017868" y="374482"/>
+            <a:off x="9541869" y="374482"/>
             <a:ext cx="825357" cy="583726"/>
           </a:xfrm>
           <a:prstGeom prst="rect">
@@ -3643,7 +3646,7 @@
         </p:nvCxnSpPr>
         <p:spPr>
           <a:xfrm rot="10800000" flipV="1">
-            <a:off x="7675552" y="666345"/>
+            <a:off x="9199553" y="666345"/>
             <a:ext cx="342317" cy="888"/>
           </a:xfrm>
           <a:prstGeom prst="bentConnector3">
@@ -3688,7 +3691,7 @@
         </p:nvCxnSpPr>
         <p:spPr>
           <a:xfrm rot="5400000">
-            <a:off x="2453793" y="1133872"/>
+            <a:off x="3977793" y="1133873"/>
             <a:ext cx="349134" cy="1037"/>
           </a:xfrm>
           <a:prstGeom prst="bentConnector3">
@@ -3729,7 +3732,7 @@
         </p:nvSpPr>
         <p:spPr>
           <a:xfrm>
-            <a:off x="470756" y="2263191"/>
+            <a:off x="1994757" y="2263191"/>
             <a:ext cx="1044785" cy="583726"/>
           </a:xfrm>
           <a:prstGeom prst="rect">
@@ -3798,7 +3801,7 @@
         </p:nvSpPr>
         <p:spPr>
           <a:xfrm>
-            <a:off x="1672138" y="2246593"/>
+            <a:off x="3196139" y="2246594"/>
             <a:ext cx="1904725" cy="619587"/>
           </a:xfrm>
           <a:prstGeom prst="rect">
@@ -3865,7 +3868,7 @@
         </p:nvSpPr>
         <p:spPr>
           <a:xfrm>
-            <a:off x="7417128" y="2263998"/>
+            <a:off x="8941129" y="2263998"/>
             <a:ext cx="1129527" cy="586352"/>
           </a:xfrm>
           <a:prstGeom prst="rect">
@@ -3932,7 +3935,7 @@
         </p:nvSpPr>
         <p:spPr>
           <a:xfrm>
-            <a:off x="470756" y="3194280"/>
+            <a:off x="1994757" y="3194280"/>
             <a:ext cx="1044785" cy="583726"/>
           </a:xfrm>
           <a:prstGeom prst="rect">
@@ -4001,7 +4004,7 @@
         </p:nvSpPr>
         <p:spPr>
           <a:xfrm>
-            <a:off x="468269" y="4156141"/>
+            <a:off x="1992270" y="4156141"/>
             <a:ext cx="1044785" cy="583726"/>
           </a:xfrm>
           <a:prstGeom prst="rect">
@@ -4070,7 +4073,7 @@
         </p:nvSpPr>
         <p:spPr>
           <a:xfrm>
-            <a:off x="6977660" y="4163755"/>
+            <a:off x="8501661" y="4163755"/>
             <a:ext cx="1518577" cy="583726"/>
           </a:xfrm>
           <a:prstGeom prst="rect">
@@ -4140,7 +4143,7 @@
         </p:nvCxnSpPr>
         <p:spPr>
           <a:xfrm>
-            <a:off x="2624501" y="2866180"/>
+            <a:off x="4148501" y="2866180"/>
             <a:ext cx="1670" cy="1287324"/>
           </a:xfrm>
           <a:prstGeom prst="straightConnector1">
@@ -4179,7 +4182,7 @@
         </p:nvSpPr>
         <p:spPr>
           <a:xfrm>
-            <a:off x="4790363" y="5085383"/>
+            <a:off x="6314363" y="5085383"/>
             <a:ext cx="982174" cy="583726"/>
           </a:xfrm>
           <a:prstGeom prst="rect">
@@ -4250,7 +4253,7 @@
         </p:nvCxnSpPr>
         <p:spPr>
           <a:xfrm flipH="1">
-            <a:off x="2624501" y="1892683"/>
+            <a:off x="4148501" y="1892683"/>
             <a:ext cx="3340" cy="353910"/>
           </a:xfrm>
           <a:prstGeom prst="straightConnector1">
@@ -4289,7 +4292,7 @@
         </p:nvSpPr>
         <p:spPr>
           <a:xfrm>
-            <a:off x="477060" y="5088263"/>
+            <a:off x="2001061" y="5088263"/>
             <a:ext cx="1044785" cy="583726"/>
           </a:xfrm>
           <a:prstGeom prst="rect">
@@ -4358,7 +4361,7 @@
         </p:nvSpPr>
         <p:spPr>
           <a:xfrm>
-            <a:off x="6475843" y="375370"/>
+            <a:off x="7999843" y="375370"/>
             <a:ext cx="1199708" cy="583726"/>
           </a:xfrm>
           <a:prstGeom prst="rect">
@@ -4427,7 +4430,7 @@
         </p:nvCxnSpPr>
         <p:spPr>
           <a:xfrm>
-            <a:off x="5308168" y="234552"/>
+            <a:off x="6832168" y="234553"/>
             <a:ext cx="0" cy="3587261"/>
           </a:xfrm>
           <a:prstGeom prst="line">
@@ -4468,7 +4471,7 @@
         </p:nvCxnSpPr>
         <p:spPr>
           <a:xfrm flipH="1">
-            <a:off x="3366623" y="4584902"/>
+            <a:off x="4890624" y="4584902"/>
             <a:ext cx="1939059" cy="0"/>
           </a:xfrm>
           <a:prstGeom prst="line">
@@ -4509,7 +4512,7 @@
         </p:nvCxnSpPr>
         <p:spPr>
           <a:xfrm flipV="1">
-            <a:off x="8474652" y="234552"/>
+            <a:off x="9998652" y="234552"/>
             <a:ext cx="0" cy="5653454"/>
           </a:xfrm>
           <a:prstGeom prst="line">
@@ -4550,7 +4553,7 @@
         </p:nvCxnSpPr>
         <p:spPr>
           <a:xfrm flipH="1">
-            <a:off x="5308169" y="234552"/>
+            <a:off x="6832170" y="234552"/>
             <a:ext cx="3175275" cy="0"/>
           </a:xfrm>
           <a:prstGeom prst="line">
@@ -4589,7 +4592,7 @@
         </p:nvSpPr>
         <p:spPr>
           <a:xfrm>
-            <a:off x="1744140" y="234552"/>
+            <a:off x="3268141" y="234553"/>
             <a:ext cx="3447943" cy="3121269"/>
           </a:xfrm>
           <a:prstGeom prst="rect">
@@ -4643,7 +4646,7 @@
         </p:nvSpPr>
         <p:spPr>
           <a:xfrm>
-            <a:off x="3493972" y="383647"/>
+            <a:off x="5017972" y="383647"/>
             <a:ext cx="1199708" cy="583726"/>
           </a:xfrm>
           <a:prstGeom prst="rect">
@@ -4714,7 +4717,7 @@
         </p:nvCxnSpPr>
         <p:spPr>
           <a:xfrm rot="5400000">
-            <a:off x="4951646" y="700119"/>
+            <a:off x="6475647" y="700120"/>
             <a:ext cx="318813" cy="902597"/>
           </a:xfrm>
           <a:prstGeom prst="bentConnector3">
@@ -4755,7 +4758,7 @@
         </p:nvSpPr>
         <p:spPr>
           <a:xfrm>
-            <a:off x="6417676" y="1323078"/>
+            <a:off x="7941677" y="1323078"/>
             <a:ext cx="1319273" cy="583726"/>
           </a:xfrm>
           <a:prstGeom prst="rect">
@@ -4826,7 +4829,7 @@
         </p:nvCxnSpPr>
         <p:spPr>
           <a:xfrm rot="16200000" flipH="1">
-            <a:off x="6894514" y="1140279"/>
+            <a:off x="8418514" y="1140279"/>
             <a:ext cx="363982" cy="1616"/>
           </a:xfrm>
           <a:prstGeom prst="bentConnector3">
@@ -4871,7 +4874,7 @@
         </p:nvCxnSpPr>
         <p:spPr>
           <a:xfrm rot="16200000" flipH="1">
-            <a:off x="4205064" y="856134"/>
+            <a:off x="5729065" y="856135"/>
             <a:ext cx="343451" cy="565927"/>
           </a:xfrm>
           <a:prstGeom prst="bentConnector3">
@@ -4912,7 +4915,7 @@
         </p:nvSpPr>
         <p:spPr>
           <a:xfrm>
-            <a:off x="5014404" y="2235992"/>
+            <a:off x="6538405" y="2235992"/>
             <a:ext cx="1095889" cy="583726"/>
           </a:xfrm>
           <a:prstGeom prst="rect">
@@ -4983,7 +4986,7 @@
         </p:nvCxnSpPr>
         <p:spPr>
           <a:xfrm rot="10800000" flipV="1">
-            <a:off x="3576864" y="1602687"/>
+            <a:off x="5100865" y="1602687"/>
             <a:ext cx="219645" cy="953700"/>
           </a:xfrm>
           <a:prstGeom prst="bentConnector3">
@@ -5027,7 +5030,7 @@
         </p:nvCxnSpPr>
         <p:spPr>
           <a:xfrm rot="16200000" flipH="1">
-            <a:off x="4428757" y="1942207"/>
+            <a:off x="5952758" y="1942207"/>
             <a:ext cx="642501" cy="528794"/>
           </a:xfrm>
           <a:prstGeom prst="bentConnector2">
@@ -5070,7 +5073,7 @@
         </p:nvCxnSpPr>
         <p:spPr>
           <a:xfrm rot="16200000" flipH="1">
-            <a:off x="7486799" y="1497318"/>
+            <a:off x="9010799" y="1497318"/>
             <a:ext cx="650370" cy="1469342"/>
           </a:xfrm>
           <a:prstGeom prst="bentConnector4">
@@ -5114,7 +5117,7 @@
         </p:nvCxnSpPr>
         <p:spPr>
           <a:xfrm rot="10800000" flipV="1">
-            <a:off x="3957654" y="2751554"/>
+            <a:off x="5481655" y="2751554"/>
             <a:ext cx="1055913" cy="445742"/>
           </a:xfrm>
           <a:prstGeom prst="bentConnector2">
@@ -5153,7 +5156,7 @@
         </p:nvSpPr>
         <p:spPr>
           <a:xfrm>
-            <a:off x="5469656" y="3189859"/>
+            <a:off x="6993657" y="3189859"/>
             <a:ext cx="1030599" cy="583726"/>
           </a:xfrm>
           <a:prstGeom prst="rect">
@@ -5220,7 +5223,7 @@
         </p:nvSpPr>
         <p:spPr>
           <a:xfrm>
-            <a:off x="6244647" y="2260464"/>
+            <a:off x="7768648" y="2260464"/>
             <a:ext cx="1030599" cy="583726"/>
           </a:xfrm>
           <a:prstGeom prst="rect">
@@ -5291,7 +5294,7 @@
         </p:nvCxnSpPr>
         <p:spPr>
           <a:xfrm rot="16200000" flipH="1">
-            <a:off x="5526893" y="1027410"/>
+            <a:off x="7050893" y="1027410"/>
             <a:ext cx="365914" cy="2100194"/>
           </a:xfrm>
           <a:prstGeom prst="bentConnector3">
@@ -5336,7 +5339,7 @@
         </p:nvCxnSpPr>
         <p:spPr>
           <a:xfrm rot="16200000" flipH="1">
-            <a:off x="5588582" y="2793484"/>
+            <a:off x="7112583" y="2793485"/>
             <a:ext cx="370141" cy="422607"/>
           </a:xfrm>
           <a:prstGeom prst="bentConnector3">
@@ -5377,7 +5380,7 @@
         </p:nvSpPr>
         <p:spPr>
           <a:xfrm>
-            <a:off x="1995802" y="4153504"/>
+            <a:off x="3519803" y="4153504"/>
             <a:ext cx="1260737" cy="583726"/>
           </a:xfrm>
           <a:prstGeom prst="rect">
@@ -5443,7 +5446,7 @@
         </p:nvSpPr>
         <p:spPr>
           <a:xfrm>
-            <a:off x="4605548" y="4157595"/>
+            <a:off x="6129549" y="4157595"/>
             <a:ext cx="1518577" cy="583726"/>
           </a:xfrm>
           <a:prstGeom prst="rect">
@@ -5513,7 +5516,7 @@
         </p:nvCxnSpPr>
         <p:spPr>
           <a:xfrm rot="16200000" flipH="1">
-            <a:off x="7436430" y="3395811"/>
+            <a:off x="8960430" y="3395812"/>
             <a:ext cx="1605268" cy="514345"/>
           </a:xfrm>
           <a:prstGeom prst="bentConnector4">
@@ -5559,7 +5562,7 @@
         </p:nvCxnSpPr>
         <p:spPr>
           <a:xfrm rot="16200000" flipH="1">
-            <a:off x="6136098" y="418204"/>
+            <a:off x="7660098" y="418205"/>
             <a:ext cx="369448" cy="3322139"/>
           </a:xfrm>
           <a:prstGeom prst="bentConnector3">
@@ -5604,7 +5607,7 @@
         </p:nvCxnSpPr>
         <p:spPr>
           <a:xfrm rot="5400000">
-            <a:off x="6019743" y="2195445"/>
+            <a:off x="7543744" y="2195446"/>
             <a:ext cx="1307245" cy="2617055"/>
           </a:xfrm>
           <a:prstGeom prst="bentConnector3">
@@ -5649,7 +5652,7 @@
         </p:nvCxnSpPr>
         <p:spPr>
           <a:xfrm rot="5400000">
-            <a:off x="4281381" y="2609504"/>
+            <a:off x="5805381" y="2609504"/>
             <a:ext cx="2243880" cy="2713252"/>
           </a:xfrm>
           <a:prstGeom prst="bentConnector3">
@@ -5690,7 +5693,7 @@
         </p:nvSpPr>
         <p:spPr>
           <a:xfrm>
-            <a:off x="7166607" y="5085383"/>
+            <a:off x="8690608" y="5085383"/>
             <a:ext cx="935545" cy="583726"/>
           </a:xfrm>
           <a:prstGeom prst="rect">
@@ -5761,7 +5764,7 @@
         </p:nvCxnSpPr>
         <p:spPr>
           <a:xfrm rot="16200000" flipH="1">
-            <a:off x="5696749" y="3907388"/>
+            <a:off x="7220749" y="3907388"/>
             <a:ext cx="2533056" cy="406660"/>
           </a:xfrm>
           <a:prstGeom prst="bentConnector2">
@@ -5803,7 +5806,7 @@
         </p:nvCxnSpPr>
         <p:spPr>
           <a:xfrm rot="5400000">
-            <a:off x="3274924" y="3762637"/>
+            <a:off x="4798925" y="3762637"/>
             <a:ext cx="664345" cy="701114"/>
           </a:xfrm>
           <a:prstGeom prst="bentConnector2">
@@ -5845,7 +5848,7 @@
         </p:nvCxnSpPr>
         <p:spPr>
           <a:xfrm rot="16200000" flipH="1">
-            <a:off x="3947382" y="3791292"/>
+            <a:off x="5471382" y="3791293"/>
             <a:ext cx="668436" cy="647895"/>
           </a:xfrm>
           <a:prstGeom prst="bentConnector2">
@@ -5884,7 +5887,7 @@
         </p:nvSpPr>
         <p:spPr>
           <a:xfrm>
-            <a:off x="3377523" y="3197296"/>
+            <a:off x="4901524" y="3197296"/>
             <a:ext cx="1160259" cy="583726"/>
           </a:xfrm>
           <a:prstGeom prst="rect">
@@ -5951,7 +5954,7 @@
         </p:nvSpPr>
         <p:spPr>
           <a:xfrm>
-            <a:off x="4606473" y="3189859"/>
+            <a:off x="6129548" y="3189859"/>
             <a:ext cx="786314" cy="583726"/>
           </a:xfrm>
           <a:prstGeom prst="rect">
@@ -5999,7 +6002,7 @@
             <a:pPr algn="ctr"/>
             <a:r>
               <a:rPr lang="en-CA" sz="900" dirty="0"/>
-              <a:t>Granger causality + cointegration</a:t>
+              <a:t>TLCC + Granger causality</a:t>
             </a:r>
           </a:p>
         </p:txBody>
@@ -6022,12 +6025,12 @@
         </p:nvCxnSpPr>
         <p:spPr>
           <a:xfrm rot="5400000" flipH="1" flipV="1">
-            <a:off x="4474922" y="3256315"/>
-            <a:ext cx="7437" cy="1041977"/>
+            <a:off x="5998461" y="3256778"/>
+            <a:ext cx="7437" cy="1041052"/>
           </a:xfrm>
           <a:prstGeom prst="bentConnector3">
             <a:avLst>
-              <a:gd name="adj1" fmla="val -1489767"/>
+              <a:gd name="adj1" fmla="val -3073820"/>
             </a:avLst>
           </a:prstGeom>
           <a:ln w="28575">
@@ -6063,7 +6066,7 @@
         </p:nvSpPr>
         <p:spPr>
           <a:xfrm>
-            <a:off x="3555608" y="5088070"/>
+            <a:off x="5079608" y="5088070"/>
             <a:ext cx="982174" cy="583726"/>
           </a:xfrm>
           <a:prstGeom prst="rect">
@@ -6134,7 +6137,7 @@
         </p:nvCxnSpPr>
         <p:spPr>
           <a:xfrm rot="5400000">
-            <a:off x="4900103" y="3225538"/>
+            <a:off x="6424104" y="3225539"/>
             <a:ext cx="2241193" cy="1478497"/>
           </a:xfrm>
           <a:prstGeom prst="bentConnector3">
@@ -6189,7 +6192,7 @@
         </p:blipFill>
         <p:spPr>
           <a:xfrm>
-            <a:off x="191687" y="2422471"/>
+            <a:off x="1715688" y="2422472"/>
             <a:ext cx="241427" cy="241427"/>
           </a:xfrm>
           <a:prstGeom prst="rect">
@@ -6225,7 +6228,7 @@
         </p:blipFill>
         <p:spPr>
           <a:xfrm>
-            <a:off x="188756" y="3344099"/>
+            <a:off x="1712757" y="3344100"/>
             <a:ext cx="241427" cy="241427"/>
           </a:xfrm>
           <a:prstGeom prst="rect">
@@ -6261,7 +6264,7 @@
         </p:blipFill>
         <p:spPr>
           <a:xfrm>
-            <a:off x="185036" y="4317995"/>
+            <a:off x="1709037" y="4317996"/>
             <a:ext cx="241427" cy="241427"/>
           </a:xfrm>
           <a:prstGeom prst="rect">
@@ -6297,7 +6300,7 @@
         </p:blipFill>
         <p:spPr>
           <a:xfrm>
-            <a:off x="179864" y="5239623"/>
+            <a:off x="1703865" y="5239624"/>
             <a:ext cx="241427" cy="241427"/>
           </a:xfrm>
           <a:prstGeom prst="rect">
@@ -6333,7 +6336,7 @@
         </p:blipFill>
         <p:spPr>
           <a:xfrm>
-            <a:off x="7222039" y="6023591"/>
+            <a:off x="8746040" y="6023592"/>
             <a:ext cx="241427" cy="241427"/>
           </a:xfrm>
           <a:prstGeom prst="rect">
@@ -6355,7 +6358,7 @@
         </p:nvSpPr>
         <p:spPr>
           <a:xfrm>
-            <a:off x="7345684" y="6005804"/>
+            <a:off x="8869685" y="6005805"/>
             <a:ext cx="1621293" cy="276999"/>
           </a:xfrm>
           <a:prstGeom prst="rect">
@@ -6369,37 +6372,15 @@
           </a:bodyPr>
           <a:lstStyle/>
           <a:p>
-            <a:pPr marL="0" marR="0" lvl="0" indent="0" algn="ctr" defTabSz="457200" rtl="0" eaLnBrk="1" fontAlgn="auto" latinLnBrk="0" hangingPunct="1">
-              <a:lnSpc>
-                <a:spcPct val="100000"/>
-              </a:lnSpc>
-              <a:spcBef>
-                <a:spcPts val="0"/>
-              </a:spcBef>
-              <a:spcAft>
-                <a:spcPts val="0"/>
-              </a:spcAft>
-              <a:buClrTx/>
-              <a:buSzTx/>
-              <a:buFontTx/>
-              <a:buNone/>
-              <a:tabLst/>
+            <a:pPr algn="ctr">
               <a:defRPr/>
             </a:pPr>
             <a:r>
-              <a:rPr kumimoji="0" lang="en-CA" sz="1200" b="1" i="0" u="none" strike="noStrike" kern="1200" cap="none" spc="0" normalizeH="0" baseline="0" noProof="0" dirty="0">
-                <a:ln>
-                  <a:noFill/>
-                </a:ln>
+              <a:rPr lang="en-CA" sz="1200" b="1" dirty="0">
                 <a:solidFill>
                   <a:prstClr val="black"/>
                 </a:solidFill>
-                <a:effectLst/>
-                <a:uLnTx/>
-                <a:uFillTx/>
                 <a:latin typeface="Calibri" panose="020F0502020204030204"/>
-                <a:ea typeface="+mn-ea"/>
-                <a:cs typeface="+mn-cs"/>
               </a:rPr>
               <a:t>= Geospatial Analysis</a:t>
             </a:r>
@@ -6410,6 +6391,3251 @@
     <p:extLst>
       <p:ext uri="{BB962C8B-B14F-4D97-AF65-F5344CB8AC3E}">
         <p14:creationId xmlns:p14="http://schemas.microsoft.com/office/powerpoint/2010/main" val="3412129037"/>
+      </p:ext>
+    </p:extLst>
+  </p:cSld>
+  <p:clrMapOvr>
+    <a:masterClrMapping/>
+  </p:clrMapOvr>
+</p:sld>
+</file>
+
+<file path=ppt/slides/slide2.xml><?xml version="1.0" encoding="utf-8"?>
+<p:sld xmlns:a="http://schemas.openxmlformats.org/drawingml/2006/main" xmlns:r="http://schemas.openxmlformats.org/officeDocument/2006/relationships" xmlns:p="http://schemas.openxmlformats.org/presentationml/2006/main">
+  <p:cSld>
+    <p:spTree>
+      <p:nvGrpSpPr>
+        <p:cNvPr id="1" name=""/>
+        <p:cNvGrpSpPr/>
+        <p:nvPr/>
+      </p:nvGrpSpPr>
+      <p:grpSpPr>
+        <a:xfrm>
+          <a:off x="0" y="0"/>
+          <a:ext cx="0" cy="0"/>
+          <a:chOff x="0" y="0"/>
+          <a:chExt cx="0" cy="0"/>
+        </a:xfrm>
+      </p:grpSpPr>
+      <p:cxnSp>
+        <p:nvCxnSpPr>
+          <p:cNvPr id="125" name="Straight Arrow Connector 124">
+            <a:extLst>
+              <a:ext uri="{FF2B5EF4-FFF2-40B4-BE49-F238E27FC236}">
+                <a16:creationId xmlns:a16="http://schemas.microsoft.com/office/drawing/2014/main" id="{287B3A30-8699-48F3-89E1-C9D1DD87C500}"/>
+              </a:ext>
+            </a:extLst>
+          </p:cNvPr>
+          <p:cNvCxnSpPr>
+            <a:cxnSpLocks/>
+          </p:cNvCxnSpPr>
+          <p:nvPr/>
+        </p:nvCxnSpPr>
+        <p:spPr>
+          <a:xfrm>
+            <a:off x="11028318" y="3305788"/>
+            <a:ext cx="0" cy="884784"/>
+          </a:xfrm>
+          <a:prstGeom prst="straightConnector1">
+            <a:avLst/>
+          </a:prstGeom>
+          <a:ln w="127000">
+            <a:solidFill>
+              <a:srgbClr val="DAE3F3"/>
+            </a:solidFill>
+            <a:prstDash val="solid"/>
+            <a:tailEnd type="triangle"/>
+          </a:ln>
+        </p:spPr>
+        <p:style>
+          <a:lnRef idx="1">
+            <a:schemeClr val="dk1"/>
+          </a:lnRef>
+          <a:fillRef idx="0">
+            <a:schemeClr val="dk1"/>
+          </a:fillRef>
+          <a:effectRef idx="0">
+            <a:schemeClr val="dk1"/>
+          </a:effectRef>
+          <a:fontRef idx="minor">
+            <a:schemeClr val="tx1"/>
+          </a:fontRef>
+        </p:style>
+      </p:cxnSp>
+      <p:sp>
+        <p:nvSpPr>
+          <p:cNvPr id="109" name="Rectangle 108">
+            <a:extLst>
+              <a:ext uri="{FF2B5EF4-FFF2-40B4-BE49-F238E27FC236}">
+                <a16:creationId xmlns:a16="http://schemas.microsoft.com/office/drawing/2014/main" id="{3BB899CB-7D58-42D3-AA5C-90EF596CC9C1}"/>
+              </a:ext>
+            </a:extLst>
+          </p:cNvPr>
+          <p:cNvSpPr/>
+          <p:nvPr/>
+        </p:nvSpPr>
+        <p:spPr>
+          <a:xfrm>
+            <a:off x="1734148" y="4383234"/>
+            <a:ext cx="8765930" cy="1087643"/>
+          </a:xfrm>
+          <a:prstGeom prst="rect">
+            <a:avLst/>
+          </a:prstGeom>
+          <a:solidFill>
+            <a:srgbClr val="F2B8BE"/>
+          </a:solidFill>
+          <a:ln>
+            <a:noFill/>
+          </a:ln>
+        </p:spPr>
+        <p:style>
+          <a:lnRef idx="2">
+            <a:schemeClr val="accent1">
+              <a:shade val="50000"/>
+            </a:schemeClr>
+          </a:lnRef>
+          <a:fillRef idx="1">
+            <a:schemeClr val="accent1"/>
+          </a:fillRef>
+          <a:effectRef idx="0">
+            <a:schemeClr val="accent1"/>
+          </a:effectRef>
+          <a:fontRef idx="minor">
+            <a:schemeClr val="lt1"/>
+          </a:fontRef>
+        </p:style>
+        <p:txBody>
+          <a:bodyPr rtlCol="0" anchor="ctr"/>
+          <a:lstStyle/>
+          <a:p>
+            <a:pPr algn="ctr"/>
+            <a:endParaRPr lang="en-CA"/>
+          </a:p>
+        </p:txBody>
+      </p:sp>
+      <p:sp>
+        <p:nvSpPr>
+          <p:cNvPr id="12" name="Rectangle 11">
+            <a:extLst>
+              <a:ext uri="{FF2B5EF4-FFF2-40B4-BE49-F238E27FC236}">
+                <a16:creationId xmlns:a16="http://schemas.microsoft.com/office/drawing/2014/main" id="{F9A746EB-7120-4CFF-9583-844F80256407}"/>
+              </a:ext>
+            </a:extLst>
+          </p:cNvPr>
+          <p:cNvSpPr/>
+          <p:nvPr/>
+        </p:nvSpPr>
+        <p:spPr>
+          <a:xfrm>
+            <a:off x="1712755" y="3086115"/>
+            <a:ext cx="8787321" cy="1087643"/>
+          </a:xfrm>
+          <a:prstGeom prst="rect">
+            <a:avLst/>
+          </a:prstGeom>
+          <a:solidFill>
+            <a:schemeClr val="accent1">
+              <a:lumMod val="20000"/>
+              <a:lumOff val="80000"/>
+            </a:schemeClr>
+          </a:solidFill>
+          <a:ln>
+            <a:noFill/>
+          </a:ln>
+        </p:spPr>
+        <p:style>
+          <a:lnRef idx="2">
+            <a:schemeClr val="accent1">
+              <a:shade val="50000"/>
+            </a:schemeClr>
+          </a:lnRef>
+          <a:fillRef idx="1">
+            <a:schemeClr val="accent1"/>
+          </a:fillRef>
+          <a:effectRef idx="0">
+            <a:schemeClr val="accent1"/>
+          </a:effectRef>
+          <a:fontRef idx="minor">
+            <a:schemeClr val="lt1"/>
+          </a:fontRef>
+        </p:style>
+        <p:txBody>
+          <a:bodyPr rtlCol="0" anchor="ctr"/>
+          <a:lstStyle/>
+          <a:p>
+            <a:pPr algn="ctr"/>
+            <a:endParaRPr lang="en-CA"/>
+          </a:p>
+        </p:txBody>
+      </p:sp>
+      <p:cxnSp>
+        <p:nvCxnSpPr>
+          <p:cNvPr id="19" name="Straight Connector 18">
+            <a:extLst>
+              <a:ext uri="{FF2B5EF4-FFF2-40B4-BE49-F238E27FC236}">
+                <a16:creationId xmlns:a16="http://schemas.microsoft.com/office/drawing/2014/main" id="{00FB9664-9449-4D18-8C47-EA910B89A5B6}"/>
+              </a:ext>
+            </a:extLst>
+          </p:cNvPr>
+          <p:cNvCxnSpPr>
+            <a:cxnSpLocks/>
+          </p:cNvCxnSpPr>
+          <p:nvPr/>
+        </p:nvCxnSpPr>
+        <p:spPr>
+          <a:xfrm>
+            <a:off x="5080789" y="4225643"/>
+            <a:ext cx="0" cy="2074985"/>
+          </a:xfrm>
+          <a:prstGeom prst="line">
+            <a:avLst/>
+          </a:prstGeom>
+          <a:ln w="38100">
+            <a:noFill/>
+          </a:ln>
+        </p:spPr>
+        <p:style>
+          <a:lnRef idx="1">
+            <a:schemeClr val="accent1"/>
+          </a:lnRef>
+          <a:fillRef idx="0">
+            <a:schemeClr val="accent1"/>
+          </a:fillRef>
+          <a:effectRef idx="0">
+            <a:schemeClr val="accent1"/>
+          </a:effectRef>
+          <a:fontRef idx="minor">
+            <a:schemeClr val="tx1"/>
+          </a:fontRef>
+        </p:style>
+      </p:cxnSp>
+      <p:cxnSp>
+        <p:nvCxnSpPr>
+          <p:cNvPr id="22" name="Straight Connector 21">
+            <a:extLst>
+              <a:ext uri="{FF2B5EF4-FFF2-40B4-BE49-F238E27FC236}">
+                <a16:creationId xmlns:a16="http://schemas.microsoft.com/office/drawing/2014/main" id="{02313B6D-2D9E-41D3-9704-2010A221BF8C}"/>
+              </a:ext>
+            </a:extLst>
+          </p:cNvPr>
+          <p:cNvCxnSpPr/>
+          <p:nvPr/>
+        </p:nvCxnSpPr>
+        <p:spPr>
+          <a:xfrm>
+            <a:off x="5076393" y="6418363"/>
+            <a:ext cx="5114336" cy="0"/>
+          </a:xfrm>
+          <a:prstGeom prst="line">
+            <a:avLst/>
+          </a:prstGeom>
+          <a:ln w="38100">
+            <a:noFill/>
+          </a:ln>
+        </p:spPr>
+        <p:style>
+          <a:lnRef idx="1">
+            <a:schemeClr val="accent1"/>
+          </a:lnRef>
+          <a:fillRef idx="0">
+            <a:schemeClr val="accent1"/>
+          </a:fillRef>
+          <a:effectRef idx="0">
+            <a:schemeClr val="accent1"/>
+          </a:effectRef>
+          <a:fontRef idx="minor">
+            <a:schemeClr val="tx1"/>
+          </a:fontRef>
+        </p:style>
+      </p:cxnSp>
+      <p:cxnSp>
+        <p:nvCxnSpPr>
+          <p:cNvPr id="65" name="Straight Connector 64">
+            <a:extLst>
+              <a:ext uri="{FF2B5EF4-FFF2-40B4-BE49-F238E27FC236}">
+                <a16:creationId xmlns:a16="http://schemas.microsoft.com/office/drawing/2014/main" id="{04EC87F6-F8D2-4663-89A5-38F80093A65F}"/>
+              </a:ext>
+            </a:extLst>
+          </p:cNvPr>
+          <p:cNvCxnSpPr>
+            <a:cxnSpLocks/>
+          </p:cNvCxnSpPr>
+          <p:nvPr/>
+        </p:nvCxnSpPr>
+        <p:spPr>
+          <a:xfrm flipH="1">
+            <a:off x="3433610" y="-418246"/>
+            <a:ext cx="328032" cy="0"/>
+          </a:xfrm>
+          <a:prstGeom prst="line">
+            <a:avLst/>
+          </a:prstGeom>
+          <a:ln w="38100">
+            <a:noFill/>
+          </a:ln>
+        </p:spPr>
+        <p:style>
+          <a:lnRef idx="1">
+            <a:schemeClr val="accent1"/>
+          </a:lnRef>
+          <a:fillRef idx="0">
+            <a:schemeClr val="accent1"/>
+          </a:fillRef>
+          <a:effectRef idx="0">
+            <a:schemeClr val="accent1"/>
+          </a:effectRef>
+          <a:fontRef idx="minor">
+            <a:schemeClr val="tx1"/>
+          </a:fontRef>
+        </p:style>
+      </p:cxnSp>
+      <p:sp>
+        <p:nvSpPr>
+          <p:cNvPr id="59" name="Oval 58">
+            <a:extLst>
+              <a:ext uri="{FF2B5EF4-FFF2-40B4-BE49-F238E27FC236}">
+                <a16:creationId xmlns:a16="http://schemas.microsoft.com/office/drawing/2014/main" id="{79459F1D-3589-4609-BD4E-58D3FA3B94A2}"/>
+              </a:ext>
+            </a:extLst>
+          </p:cNvPr>
+          <p:cNvSpPr/>
+          <p:nvPr/>
+        </p:nvSpPr>
+        <p:spPr>
+          <a:xfrm>
+            <a:off x="888389" y="3983284"/>
+            <a:ext cx="5991227" cy="1976436"/>
+          </a:xfrm>
+          <a:prstGeom prst="ellipse">
+            <a:avLst/>
+          </a:prstGeom>
+          <a:noFill/>
+          <a:ln>
+            <a:solidFill>
+              <a:srgbClr val="E7E6E6">
+                <a:alpha val="0"/>
+              </a:srgbClr>
+            </a:solidFill>
+          </a:ln>
+        </p:spPr>
+        <p:style>
+          <a:lnRef idx="2">
+            <a:schemeClr val="accent1">
+              <a:shade val="50000"/>
+            </a:schemeClr>
+          </a:lnRef>
+          <a:fillRef idx="1">
+            <a:schemeClr val="accent1"/>
+          </a:fillRef>
+          <a:effectRef idx="0">
+            <a:schemeClr val="accent1"/>
+          </a:effectRef>
+          <a:fontRef idx="minor">
+            <a:schemeClr val="lt1"/>
+          </a:fontRef>
+        </p:style>
+        <p:txBody>
+          <a:bodyPr rtlCol="0" anchor="ctr"/>
+          <a:lstStyle/>
+          <a:p>
+            <a:pPr algn="ctr"/>
+            <a:endParaRPr lang="en-CA" dirty="0">
+              <a:solidFill>
+                <a:schemeClr val="bg2"/>
+              </a:solidFill>
+              <a:latin typeface="Arial" panose="020B0604020202020204" pitchFamily="34" charset="0"/>
+              <a:cs typeface="Arial" panose="020B0604020202020204" pitchFamily="34" charset="0"/>
+            </a:endParaRPr>
+          </a:p>
+        </p:txBody>
+      </p:sp>
+      <p:sp>
+        <p:nvSpPr>
+          <p:cNvPr id="61" name="Rectangle 60">
+            <a:extLst>
+              <a:ext uri="{FF2B5EF4-FFF2-40B4-BE49-F238E27FC236}">
+                <a16:creationId xmlns:a16="http://schemas.microsoft.com/office/drawing/2014/main" id="{086CD284-5F1E-4DAA-AC87-5BB20DCE06C1}"/>
+              </a:ext>
+            </a:extLst>
+          </p:cNvPr>
+          <p:cNvSpPr/>
+          <p:nvPr/>
+        </p:nvSpPr>
+        <p:spPr>
+          <a:xfrm>
+            <a:off x="3553024" y="376097"/>
+            <a:ext cx="1199708" cy="583726"/>
+          </a:xfrm>
+          <a:prstGeom prst="rect">
+            <a:avLst/>
+          </a:prstGeom>
+          <a:solidFill>
+            <a:schemeClr val="accent6">
+              <a:lumMod val="20000"/>
+              <a:lumOff val="80000"/>
+            </a:schemeClr>
+          </a:solidFill>
+          <a:ln w="9525" cap="flat" cmpd="sng" algn="ctr">
+            <a:solidFill>
+              <a:schemeClr val="bg1"/>
+            </a:solidFill>
+            <a:prstDash val="solid"/>
+            <a:round/>
+            <a:headEnd type="none" w="med" len="med"/>
+            <a:tailEnd type="none" w="med" len="med"/>
+          </a:ln>
+        </p:spPr>
+        <p:style>
+          <a:lnRef idx="0">
+            <a:scrgbClr r="0" g="0" b="0"/>
+          </a:lnRef>
+          <a:fillRef idx="0">
+            <a:scrgbClr r="0" g="0" b="0"/>
+          </a:fillRef>
+          <a:effectRef idx="0">
+            <a:scrgbClr r="0" g="0" b="0"/>
+          </a:effectRef>
+          <a:fontRef idx="minor">
+            <a:schemeClr val="dk1"/>
+          </a:fontRef>
+        </p:style>
+        <p:txBody>
+          <a:bodyPr rot="0" spcFirstLastPara="0" vertOverflow="overflow" horzOverflow="overflow" vert="horz" wrap="square" lIns="68580" tIns="34290" rIns="68580" bIns="34290" numCol="1" spcCol="0" rtlCol="0" fromWordArt="0" anchor="ctr" anchorCtr="0" forceAA="0" compatLnSpc="1">
+            <a:prstTxWarp prst="textNoShape">
+              <a:avLst/>
+            </a:prstTxWarp>
+            <a:noAutofit/>
+          </a:bodyPr>
+          <a:lstStyle/>
+          <a:p>
+            <a:pPr algn="ctr"/>
+            <a:r>
+              <a:rPr lang="en-CA" sz="1200" dirty="0"/>
+              <a:t>US Census Bureau</a:t>
+            </a:r>
+          </a:p>
+        </p:txBody>
+      </p:sp>
+      <p:sp>
+        <p:nvSpPr>
+          <p:cNvPr id="62" name="Rectangle 61">
+            <a:extLst>
+              <a:ext uri="{FF2B5EF4-FFF2-40B4-BE49-F238E27FC236}">
+                <a16:creationId xmlns:a16="http://schemas.microsoft.com/office/drawing/2014/main" id="{38AE0771-1ABA-4BD0-9C82-7E3D095E778A}"/>
+              </a:ext>
+            </a:extLst>
+          </p:cNvPr>
+          <p:cNvSpPr/>
+          <p:nvPr/>
+        </p:nvSpPr>
+        <p:spPr>
+          <a:xfrm>
+            <a:off x="1994756" y="377296"/>
+            <a:ext cx="1044785" cy="583726"/>
+          </a:xfrm>
+          <a:prstGeom prst="rect">
+            <a:avLst/>
+          </a:prstGeom>
+          <a:pattFill prst="wdUpDiag">
+            <a:fgClr>
+              <a:schemeClr val="accent6">
+                <a:lumMod val="40000"/>
+                <a:lumOff val="60000"/>
+              </a:schemeClr>
+            </a:fgClr>
+            <a:bgClr>
+              <a:schemeClr val="bg1"/>
+            </a:bgClr>
+          </a:pattFill>
+          <a:ln w="9525" cap="flat" cmpd="sng" algn="ctr">
+            <a:solidFill>
+              <a:schemeClr val="bg1"/>
+            </a:solidFill>
+            <a:prstDash val="solid"/>
+            <a:round/>
+            <a:headEnd type="none" w="med" len="med"/>
+            <a:tailEnd type="none" w="med" len="med"/>
+          </a:ln>
+        </p:spPr>
+        <p:style>
+          <a:lnRef idx="0">
+            <a:scrgbClr r="0" g="0" b="0"/>
+          </a:lnRef>
+          <a:fillRef idx="0">
+            <a:scrgbClr r="0" g="0" b="0"/>
+          </a:fillRef>
+          <a:effectRef idx="0">
+            <a:scrgbClr r="0" g="0" b="0"/>
+          </a:effectRef>
+          <a:fontRef idx="minor">
+            <a:schemeClr val="dk1"/>
+          </a:fontRef>
+        </p:style>
+        <p:txBody>
+          <a:bodyPr rot="0" spcFirstLastPara="0" vertOverflow="overflow" horzOverflow="overflow" vert="horz" wrap="square" lIns="68580" tIns="34290" rIns="68580" bIns="34290" numCol="1" spcCol="0" rtlCol="0" fromWordArt="0" anchor="ctr" anchorCtr="0" forceAA="0" compatLnSpc="1">
+            <a:prstTxWarp prst="textNoShape">
+              <a:avLst/>
+            </a:prstTxWarp>
+            <a:noAutofit/>
+          </a:bodyPr>
+          <a:lstStyle/>
+          <a:p>
+            <a:pPr algn="ctr"/>
+            <a:r>
+              <a:rPr lang="en-CA" sz="1200" b="1" dirty="0"/>
+              <a:t>Data Sources</a:t>
+            </a:r>
+          </a:p>
+        </p:txBody>
+      </p:sp>
+      <p:sp>
+        <p:nvSpPr>
+          <p:cNvPr id="64" name="Rectangle 63">
+            <a:extLst>
+              <a:ext uri="{FF2B5EF4-FFF2-40B4-BE49-F238E27FC236}">
+                <a16:creationId xmlns:a16="http://schemas.microsoft.com/office/drawing/2014/main" id="{2DF38B91-C1AA-4370-9F05-4E8C0D9E14A6}"/>
+              </a:ext>
+            </a:extLst>
+          </p:cNvPr>
+          <p:cNvSpPr/>
+          <p:nvPr/>
+        </p:nvSpPr>
+        <p:spPr>
+          <a:xfrm>
+            <a:off x="6452902" y="408285"/>
+            <a:ext cx="1266896" cy="583726"/>
+          </a:xfrm>
+          <a:prstGeom prst="rect">
+            <a:avLst/>
+          </a:prstGeom>
+          <a:solidFill>
+            <a:schemeClr val="accent6">
+              <a:lumMod val="20000"/>
+              <a:lumOff val="80000"/>
+            </a:schemeClr>
+          </a:solidFill>
+          <a:ln w="9525" cap="flat" cmpd="sng" algn="ctr">
+            <a:solidFill>
+              <a:schemeClr val="bg1"/>
+            </a:solidFill>
+            <a:prstDash val="solid"/>
+            <a:round/>
+            <a:headEnd type="none" w="med" len="med"/>
+            <a:tailEnd type="none" w="med" len="med"/>
+          </a:ln>
+        </p:spPr>
+        <p:style>
+          <a:lnRef idx="0">
+            <a:scrgbClr r="0" g="0" b="0"/>
+          </a:lnRef>
+          <a:fillRef idx="0">
+            <a:scrgbClr r="0" g="0" b="0"/>
+          </a:fillRef>
+          <a:effectRef idx="0">
+            <a:scrgbClr r="0" g="0" b="0"/>
+          </a:effectRef>
+          <a:fontRef idx="minor">
+            <a:schemeClr val="dk1"/>
+          </a:fontRef>
+        </p:style>
+        <p:txBody>
+          <a:bodyPr rot="0" spcFirstLastPara="0" vertOverflow="overflow" horzOverflow="overflow" vert="horz" wrap="square" lIns="68580" tIns="34290" rIns="68580" bIns="34290" numCol="1" spcCol="0" rtlCol="0" fromWordArt="0" anchor="ctr" anchorCtr="0" forceAA="0" compatLnSpc="1">
+            <a:prstTxWarp prst="textNoShape">
+              <a:avLst/>
+            </a:prstTxWarp>
+            <a:noAutofit/>
+          </a:bodyPr>
+          <a:lstStyle/>
+          <a:p>
+            <a:pPr algn="ctr"/>
+            <a:r>
+              <a:rPr lang="en-CA" sz="1200" dirty="0"/>
+              <a:t>Twitter API v2</a:t>
+            </a:r>
+          </a:p>
+        </p:txBody>
+      </p:sp>
+      <p:sp>
+        <p:nvSpPr>
+          <p:cNvPr id="66" name="Rectangle 65">
+            <a:extLst>
+              <a:ext uri="{FF2B5EF4-FFF2-40B4-BE49-F238E27FC236}">
+                <a16:creationId xmlns:a16="http://schemas.microsoft.com/office/drawing/2014/main" id="{12D7600A-F20A-4EBC-B230-B2EC70F400C4}"/>
+              </a:ext>
+            </a:extLst>
+          </p:cNvPr>
+          <p:cNvSpPr/>
+          <p:nvPr/>
+        </p:nvSpPr>
+        <p:spPr>
+          <a:xfrm>
+            <a:off x="1994757" y="1308955"/>
+            <a:ext cx="1044785" cy="583726"/>
+          </a:xfrm>
+          <a:prstGeom prst="rect">
+            <a:avLst/>
+          </a:prstGeom>
+          <a:pattFill prst="wdUpDiag">
+            <a:fgClr>
+              <a:srgbClr val="FBE5D6"/>
+            </a:fgClr>
+            <a:bgClr>
+              <a:schemeClr val="bg1"/>
+            </a:bgClr>
+          </a:pattFill>
+          <a:ln w="9525" cap="flat" cmpd="sng" algn="ctr">
+            <a:solidFill>
+              <a:schemeClr val="bg1"/>
+            </a:solidFill>
+            <a:prstDash val="solid"/>
+            <a:round/>
+            <a:headEnd type="none" w="med" len="med"/>
+            <a:tailEnd type="none" w="med" len="med"/>
+          </a:ln>
+        </p:spPr>
+        <p:style>
+          <a:lnRef idx="0">
+            <a:scrgbClr r="0" g="0" b="0"/>
+          </a:lnRef>
+          <a:fillRef idx="0">
+            <a:scrgbClr r="0" g="0" b="0"/>
+          </a:fillRef>
+          <a:effectRef idx="0">
+            <a:scrgbClr r="0" g="0" b="0"/>
+          </a:effectRef>
+          <a:fontRef idx="minor">
+            <a:schemeClr val="dk1"/>
+          </a:fontRef>
+        </p:style>
+        <p:txBody>
+          <a:bodyPr rot="0" spcFirstLastPara="0" vertOverflow="overflow" horzOverflow="overflow" vert="horz" wrap="square" lIns="68580" tIns="34290" rIns="68580" bIns="34290" numCol="1" spcCol="0" rtlCol="0" fromWordArt="0" anchor="ctr" anchorCtr="0" forceAA="0" compatLnSpc="1">
+            <a:prstTxWarp prst="textNoShape">
+              <a:avLst/>
+            </a:prstTxWarp>
+            <a:noAutofit/>
+          </a:bodyPr>
+          <a:lstStyle/>
+          <a:p>
+            <a:pPr algn="ctr"/>
+            <a:r>
+              <a:rPr lang="en-CA" sz="1200" b="1" dirty="0"/>
+              <a:t>Data Collection</a:t>
+            </a:r>
+          </a:p>
+        </p:txBody>
+      </p:sp>
+      <p:sp>
+        <p:nvSpPr>
+          <p:cNvPr id="68" name="Rectangle 67">
+            <a:extLst>
+              <a:ext uri="{FF2B5EF4-FFF2-40B4-BE49-F238E27FC236}">
+                <a16:creationId xmlns:a16="http://schemas.microsoft.com/office/drawing/2014/main" id="{22641AE3-4F9C-4DFB-96EF-310D7EB438B4}"/>
+              </a:ext>
+            </a:extLst>
+          </p:cNvPr>
+          <p:cNvSpPr/>
+          <p:nvPr/>
+        </p:nvSpPr>
+        <p:spPr>
+          <a:xfrm>
+            <a:off x="3551987" y="1308957"/>
+            <a:ext cx="1199708" cy="583726"/>
+          </a:xfrm>
+          <a:prstGeom prst="rect">
+            <a:avLst/>
+          </a:prstGeom>
+          <a:solidFill>
+            <a:schemeClr val="accent2">
+              <a:lumMod val="20000"/>
+              <a:lumOff val="80000"/>
+            </a:schemeClr>
+          </a:solidFill>
+          <a:ln w="9525" cap="flat" cmpd="sng" algn="ctr">
+            <a:solidFill>
+              <a:schemeClr val="bg1"/>
+            </a:solidFill>
+            <a:prstDash val="solid"/>
+            <a:round/>
+            <a:headEnd type="none" w="med" len="med"/>
+            <a:tailEnd type="none" w="med" len="med"/>
+          </a:ln>
+        </p:spPr>
+        <p:style>
+          <a:lnRef idx="0">
+            <a:scrgbClr r="0" g="0" b="0"/>
+          </a:lnRef>
+          <a:fillRef idx="0">
+            <a:scrgbClr r="0" g="0" b="0"/>
+          </a:fillRef>
+          <a:effectRef idx="0">
+            <a:scrgbClr r="0" g="0" b="0"/>
+          </a:effectRef>
+          <a:fontRef idx="minor">
+            <a:schemeClr val="dk1"/>
+          </a:fontRef>
+        </p:style>
+        <p:txBody>
+          <a:bodyPr rot="0" spcFirstLastPara="0" vertOverflow="overflow" horzOverflow="overflow" vert="horz" wrap="square" lIns="68580" tIns="34290" rIns="68580" bIns="34290" numCol="1" spcCol="0" rtlCol="0" fromWordArt="0" anchor="ctr" anchorCtr="0" forceAA="0" compatLnSpc="1">
+            <a:prstTxWarp prst="textNoShape">
+              <a:avLst/>
+            </a:prstTxWarp>
+            <a:noAutofit/>
+          </a:bodyPr>
+          <a:lstStyle/>
+          <a:p>
+            <a:pPr algn="ctr"/>
+            <a:r>
+              <a:rPr lang="en-CA" sz="1200" dirty="0"/>
+              <a:t>2016 county shapes and demographics</a:t>
+            </a:r>
+          </a:p>
+        </p:txBody>
+      </p:sp>
+      <p:sp>
+        <p:nvSpPr>
+          <p:cNvPr id="69" name="Rectangle 68">
+            <a:extLst>
+              <a:ext uri="{FF2B5EF4-FFF2-40B4-BE49-F238E27FC236}">
+                <a16:creationId xmlns:a16="http://schemas.microsoft.com/office/drawing/2014/main" id="{260518C3-6AB5-4741-83D0-E312113CA6ED}"/>
+              </a:ext>
+            </a:extLst>
+          </p:cNvPr>
+          <p:cNvSpPr/>
+          <p:nvPr/>
+        </p:nvSpPr>
+        <p:spPr>
+          <a:xfrm>
+            <a:off x="5320509" y="1310824"/>
+            <a:ext cx="1726489" cy="583726"/>
+          </a:xfrm>
+          <a:prstGeom prst="rect">
+            <a:avLst/>
+          </a:prstGeom>
+          <a:solidFill>
+            <a:schemeClr val="accent2">
+              <a:lumMod val="20000"/>
+              <a:lumOff val="80000"/>
+            </a:schemeClr>
+          </a:solidFill>
+          <a:ln w="9525" cap="flat" cmpd="sng" algn="ctr">
+            <a:solidFill>
+              <a:schemeClr val="bg1"/>
+            </a:solidFill>
+            <a:prstDash val="solid"/>
+            <a:round/>
+            <a:headEnd type="none" w="med" len="med"/>
+            <a:tailEnd type="none" w="med" len="med"/>
+          </a:ln>
+        </p:spPr>
+        <p:style>
+          <a:lnRef idx="0">
+            <a:scrgbClr r="0" g="0" b="0"/>
+          </a:lnRef>
+          <a:fillRef idx="0">
+            <a:scrgbClr r="0" g="0" b="0"/>
+          </a:fillRef>
+          <a:effectRef idx="0">
+            <a:scrgbClr r="0" g="0" b="0"/>
+          </a:effectRef>
+          <a:fontRef idx="minor">
+            <a:schemeClr val="dk1"/>
+          </a:fontRef>
+        </p:style>
+        <p:txBody>
+          <a:bodyPr rot="0" spcFirstLastPara="0" vertOverflow="overflow" horzOverflow="overflow" vert="horz" wrap="square" lIns="68580" tIns="34290" rIns="68580" bIns="34290" numCol="1" spcCol="0" rtlCol="0" fromWordArt="0" anchor="ctr" anchorCtr="0" forceAA="0" compatLnSpc="1">
+            <a:prstTxWarp prst="textNoShape">
+              <a:avLst/>
+            </a:prstTxWarp>
+            <a:noAutofit/>
+          </a:bodyPr>
+          <a:lstStyle/>
+          <a:p>
+            <a:pPr algn="ctr"/>
+            <a:r>
+              <a:rPr lang="en-CA" sz="1200" dirty="0"/>
+              <a:t>Geo-located social media posts and geo-located physical protests</a:t>
+            </a:r>
+          </a:p>
+        </p:txBody>
+      </p:sp>
+      <p:sp>
+        <p:nvSpPr>
+          <p:cNvPr id="70" name="Rectangle 69">
+            <a:extLst>
+              <a:ext uri="{FF2B5EF4-FFF2-40B4-BE49-F238E27FC236}">
+                <a16:creationId xmlns:a16="http://schemas.microsoft.com/office/drawing/2014/main" id="{278A88D8-5B72-4895-B3E8-88C18C030065}"/>
+              </a:ext>
+            </a:extLst>
+          </p:cNvPr>
+          <p:cNvSpPr/>
+          <p:nvPr/>
+        </p:nvSpPr>
+        <p:spPr>
+          <a:xfrm>
+            <a:off x="9541869" y="374482"/>
+            <a:ext cx="825357" cy="583726"/>
+          </a:xfrm>
+          <a:prstGeom prst="rect">
+            <a:avLst/>
+          </a:prstGeom>
+          <a:solidFill>
+            <a:schemeClr val="bg2"/>
+          </a:solidFill>
+          <a:ln w="9525" cap="flat" cmpd="sng" algn="ctr">
+            <a:solidFill>
+              <a:schemeClr val="bg1"/>
+            </a:solidFill>
+            <a:prstDash val="solid"/>
+            <a:round/>
+            <a:headEnd type="none" w="med" len="med"/>
+            <a:tailEnd type="none" w="med" len="med"/>
+          </a:ln>
+        </p:spPr>
+        <p:style>
+          <a:lnRef idx="0">
+            <a:scrgbClr r="0" g="0" b="0"/>
+          </a:lnRef>
+          <a:fillRef idx="0">
+            <a:scrgbClr r="0" g="0" b="0"/>
+          </a:fillRef>
+          <a:effectRef idx="0">
+            <a:scrgbClr r="0" g="0" b="0"/>
+          </a:effectRef>
+          <a:fontRef idx="minor">
+            <a:schemeClr val="dk1"/>
+          </a:fontRef>
+        </p:style>
+        <p:txBody>
+          <a:bodyPr rot="0" spcFirstLastPara="0" vertOverflow="overflow" horzOverflow="overflow" vert="horz" wrap="square" lIns="68580" tIns="34290" rIns="68580" bIns="34290" numCol="1" spcCol="0" rtlCol="0" fromWordArt="0" anchor="ctr" anchorCtr="0" forceAA="0" compatLnSpc="1">
+            <a:prstTxWarp prst="textNoShape">
+              <a:avLst/>
+            </a:prstTxWarp>
+            <a:noAutofit/>
+          </a:bodyPr>
+          <a:lstStyle/>
+          <a:p>
+            <a:pPr algn="ctr"/>
+            <a:r>
+              <a:rPr lang="en-CA" sz="1200" dirty="0"/>
+              <a:t>Web scraping</a:t>
+            </a:r>
+          </a:p>
+        </p:txBody>
+      </p:sp>
+      <p:cxnSp>
+        <p:nvCxnSpPr>
+          <p:cNvPr id="72" name="Connector: Elbow 71">
+            <a:extLst>
+              <a:ext uri="{FF2B5EF4-FFF2-40B4-BE49-F238E27FC236}">
+                <a16:creationId xmlns:a16="http://schemas.microsoft.com/office/drawing/2014/main" id="{06337F0A-DDB1-48FC-AF97-DBA80E9F060D}"/>
+              </a:ext>
+            </a:extLst>
+          </p:cNvPr>
+          <p:cNvCxnSpPr>
+            <a:cxnSpLocks/>
+            <a:stCxn id="70" idx="1"/>
+            <a:endCxn id="85" idx="3"/>
+          </p:cNvCxnSpPr>
+          <p:nvPr/>
+        </p:nvCxnSpPr>
+        <p:spPr>
+          <a:xfrm rot="10800000" flipV="1">
+            <a:off x="9199553" y="666345"/>
+            <a:ext cx="342317" cy="888"/>
+          </a:xfrm>
+          <a:prstGeom prst="bentConnector3">
+            <a:avLst>
+              <a:gd name="adj1" fmla="val 50000"/>
+            </a:avLst>
+          </a:prstGeom>
+          <a:ln w="28575">
+            <a:tailEnd type="triangle"/>
+          </a:ln>
+        </p:spPr>
+        <p:style>
+          <a:lnRef idx="1">
+            <a:schemeClr val="dk1"/>
+          </a:lnRef>
+          <a:fillRef idx="0">
+            <a:schemeClr val="dk1"/>
+          </a:fillRef>
+          <a:effectRef idx="0">
+            <a:schemeClr val="dk1"/>
+          </a:effectRef>
+          <a:fontRef idx="minor">
+            <a:schemeClr val="tx1"/>
+          </a:fontRef>
+        </p:style>
+      </p:cxnSp>
+      <p:cxnSp>
+        <p:nvCxnSpPr>
+          <p:cNvPr id="73" name="Connector: Elbow 72">
+            <a:extLst>
+              <a:ext uri="{FF2B5EF4-FFF2-40B4-BE49-F238E27FC236}">
+                <a16:creationId xmlns:a16="http://schemas.microsoft.com/office/drawing/2014/main" id="{CA903898-E51E-4118-B285-0E9F8BFF5270}"/>
+              </a:ext>
+            </a:extLst>
+          </p:cNvPr>
+          <p:cNvCxnSpPr>
+            <a:cxnSpLocks/>
+            <a:stCxn id="61" idx="2"/>
+            <a:endCxn id="68" idx="0"/>
+          </p:cNvCxnSpPr>
+          <p:nvPr/>
+        </p:nvCxnSpPr>
+        <p:spPr>
+          <a:xfrm rot="5400000">
+            <a:off x="3977793" y="1133873"/>
+            <a:ext cx="349134" cy="1037"/>
+          </a:xfrm>
+          <a:prstGeom prst="bentConnector3">
+            <a:avLst>
+              <a:gd name="adj1" fmla="val 50000"/>
+            </a:avLst>
+          </a:prstGeom>
+          <a:ln w="28575">
+            <a:tailEnd type="triangle"/>
+          </a:ln>
+        </p:spPr>
+        <p:style>
+          <a:lnRef idx="1">
+            <a:schemeClr val="dk1"/>
+          </a:lnRef>
+          <a:fillRef idx="0">
+            <a:schemeClr val="dk1"/>
+          </a:fillRef>
+          <a:effectRef idx="0">
+            <a:schemeClr val="dk1"/>
+          </a:effectRef>
+          <a:fontRef idx="minor">
+            <a:schemeClr val="tx1"/>
+          </a:fontRef>
+        </p:style>
+      </p:cxnSp>
+      <p:sp>
+        <p:nvSpPr>
+          <p:cNvPr id="74" name="Rectangle 73">
+            <a:extLst>
+              <a:ext uri="{FF2B5EF4-FFF2-40B4-BE49-F238E27FC236}">
+                <a16:creationId xmlns:a16="http://schemas.microsoft.com/office/drawing/2014/main" id="{9C53526B-A6E4-4E21-98BF-BEC3862988DF}"/>
+              </a:ext>
+            </a:extLst>
+          </p:cNvPr>
+          <p:cNvSpPr/>
+          <p:nvPr/>
+        </p:nvSpPr>
+        <p:spPr>
+          <a:xfrm>
+            <a:off x="1994757" y="2263191"/>
+            <a:ext cx="1044785" cy="583726"/>
+          </a:xfrm>
+          <a:prstGeom prst="rect">
+            <a:avLst/>
+          </a:prstGeom>
+          <a:pattFill prst="wdUpDiag">
+            <a:fgClr>
+              <a:srgbClr val="FFF2CC"/>
+            </a:fgClr>
+            <a:bgClr>
+              <a:schemeClr val="bg1"/>
+            </a:bgClr>
+          </a:pattFill>
+          <a:ln w="9525" cap="flat" cmpd="sng" algn="ctr">
+            <a:solidFill>
+              <a:schemeClr val="bg1"/>
+            </a:solidFill>
+            <a:prstDash val="solid"/>
+            <a:round/>
+            <a:headEnd type="none" w="med" len="med"/>
+            <a:tailEnd type="none" w="med" len="med"/>
+          </a:ln>
+        </p:spPr>
+        <p:style>
+          <a:lnRef idx="0">
+            <a:scrgbClr r="0" g="0" b="0"/>
+          </a:lnRef>
+          <a:fillRef idx="0">
+            <a:scrgbClr r="0" g="0" b="0"/>
+          </a:fillRef>
+          <a:effectRef idx="0">
+            <a:scrgbClr r="0" g="0" b="0"/>
+          </a:effectRef>
+          <a:fontRef idx="minor">
+            <a:schemeClr val="dk1"/>
+          </a:fontRef>
+        </p:style>
+        <p:txBody>
+          <a:bodyPr rot="0" spcFirstLastPara="0" vertOverflow="overflow" horzOverflow="overflow" vert="horz" wrap="square" lIns="68580" tIns="34290" rIns="68580" bIns="34290" numCol="1" spcCol="0" rtlCol="0" fromWordArt="0" anchor="ctr" anchorCtr="0" forceAA="0" compatLnSpc="1">
+            <a:prstTxWarp prst="textNoShape">
+              <a:avLst/>
+            </a:prstTxWarp>
+            <a:noAutofit/>
+          </a:bodyPr>
+          <a:lstStyle/>
+          <a:p>
+            <a:pPr algn="ctr"/>
+            <a:r>
+              <a:rPr lang="en-CA" sz="1200" b="1" dirty="0"/>
+              <a:t>Data Preprocessing</a:t>
+            </a:r>
+          </a:p>
+        </p:txBody>
+      </p:sp>
+      <p:sp>
+        <p:nvSpPr>
+          <p:cNvPr id="75" name="Rectangle 74">
+            <a:extLst>
+              <a:ext uri="{FF2B5EF4-FFF2-40B4-BE49-F238E27FC236}">
+                <a16:creationId xmlns:a16="http://schemas.microsoft.com/office/drawing/2014/main" id="{D73E4E48-34B3-48C5-A81B-AED07E8C3785}"/>
+              </a:ext>
+            </a:extLst>
+          </p:cNvPr>
+          <p:cNvSpPr/>
+          <p:nvPr/>
+        </p:nvSpPr>
+        <p:spPr>
+          <a:xfrm>
+            <a:off x="3196139" y="2246594"/>
+            <a:ext cx="1904725" cy="619587"/>
+          </a:xfrm>
+          <a:prstGeom prst="rect">
+            <a:avLst/>
+          </a:prstGeom>
+          <a:solidFill>
+            <a:schemeClr val="accent4">
+              <a:lumMod val="20000"/>
+              <a:lumOff val="80000"/>
+            </a:schemeClr>
+          </a:solidFill>
+          <a:ln w="9525" cap="flat" cmpd="sng" algn="ctr">
+            <a:solidFill>
+              <a:schemeClr val="bg1"/>
+            </a:solidFill>
+            <a:prstDash val="solid"/>
+            <a:round/>
+            <a:headEnd type="none" w="med" len="med"/>
+            <a:tailEnd type="none" w="med" len="med"/>
+          </a:ln>
+        </p:spPr>
+        <p:style>
+          <a:lnRef idx="0">
+            <a:scrgbClr r="0" g="0" b="0"/>
+          </a:lnRef>
+          <a:fillRef idx="0">
+            <a:scrgbClr r="0" g="0" b="0"/>
+          </a:fillRef>
+          <a:effectRef idx="0">
+            <a:scrgbClr r="0" g="0" b="0"/>
+          </a:effectRef>
+          <a:fontRef idx="minor">
+            <a:schemeClr val="dk1"/>
+          </a:fontRef>
+        </p:style>
+        <p:txBody>
+          <a:bodyPr rot="0" spcFirstLastPara="0" vertOverflow="overflow" horzOverflow="overflow" vert="horz" wrap="square" lIns="68580" tIns="34290" rIns="68580" bIns="34290" numCol="1" spcCol="0" rtlCol="0" fromWordArt="0" anchor="ctr" anchorCtr="0" forceAA="0" compatLnSpc="1">
+            <a:prstTxWarp prst="textNoShape">
+              <a:avLst/>
+            </a:prstTxWarp>
+            <a:noAutofit/>
+          </a:bodyPr>
+          <a:lstStyle/>
+          <a:p>
+            <a:pPr algn="ctr"/>
+            <a:r>
+              <a:rPr lang="en-CA" sz="1050" dirty="0"/>
+              <a:t>Data aggregated by county (raw count, population normalized count, network weighted count)</a:t>
+            </a:r>
+          </a:p>
+        </p:txBody>
+      </p:sp>
+      <p:sp>
+        <p:nvSpPr>
+          <p:cNvPr id="76" name="Rectangle 75">
+            <a:extLst>
+              <a:ext uri="{FF2B5EF4-FFF2-40B4-BE49-F238E27FC236}">
+                <a16:creationId xmlns:a16="http://schemas.microsoft.com/office/drawing/2014/main" id="{52B0C14E-77B5-4FA2-926E-1A6FDE7E2F12}"/>
+              </a:ext>
+            </a:extLst>
+          </p:cNvPr>
+          <p:cNvSpPr/>
+          <p:nvPr/>
+        </p:nvSpPr>
+        <p:spPr>
+          <a:xfrm>
+            <a:off x="8941129" y="2263998"/>
+            <a:ext cx="1129527" cy="586352"/>
+          </a:xfrm>
+          <a:prstGeom prst="rect">
+            <a:avLst/>
+          </a:prstGeom>
+          <a:solidFill>
+            <a:schemeClr val="accent4">
+              <a:lumMod val="20000"/>
+              <a:lumOff val="80000"/>
+            </a:schemeClr>
+          </a:solidFill>
+          <a:ln w="9525" cap="flat" cmpd="sng" algn="ctr">
+            <a:solidFill>
+              <a:schemeClr val="bg1"/>
+            </a:solidFill>
+            <a:prstDash val="solid"/>
+            <a:round/>
+            <a:headEnd type="none" w="med" len="med"/>
+            <a:tailEnd type="none" w="med" len="med"/>
+          </a:ln>
+        </p:spPr>
+        <p:style>
+          <a:lnRef idx="0">
+            <a:scrgbClr r="0" g="0" b="0"/>
+          </a:lnRef>
+          <a:fillRef idx="0">
+            <a:scrgbClr r="0" g="0" b="0"/>
+          </a:fillRef>
+          <a:effectRef idx="0">
+            <a:scrgbClr r="0" g="0" b="0"/>
+          </a:effectRef>
+          <a:fontRef idx="minor">
+            <a:schemeClr val="dk1"/>
+          </a:fontRef>
+        </p:style>
+        <p:txBody>
+          <a:bodyPr rot="0" spcFirstLastPara="0" vertOverflow="overflow" horzOverflow="overflow" vert="horz" wrap="square" lIns="68580" tIns="34290" rIns="68580" bIns="34290" numCol="1" spcCol="0" rtlCol="0" fromWordArt="0" anchor="ctr" anchorCtr="0" forceAA="0" compatLnSpc="1">
+            <a:prstTxWarp prst="textNoShape">
+              <a:avLst/>
+            </a:prstTxWarp>
+            <a:noAutofit/>
+          </a:bodyPr>
+          <a:lstStyle/>
+          <a:p>
+            <a:pPr algn="ctr"/>
+            <a:r>
+              <a:rPr lang="en-CA" sz="1050" dirty="0"/>
+              <a:t>Data aggregated by state (number of legislative responses)</a:t>
+            </a:r>
+          </a:p>
+        </p:txBody>
+      </p:sp>
+      <p:sp>
+        <p:nvSpPr>
+          <p:cNvPr id="77" name="Rectangle 76">
+            <a:extLst>
+              <a:ext uri="{FF2B5EF4-FFF2-40B4-BE49-F238E27FC236}">
+                <a16:creationId xmlns:a16="http://schemas.microsoft.com/office/drawing/2014/main" id="{2A942097-6503-44E9-8D4A-5FD8C24E20A4}"/>
+              </a:ext>
+            </a:extLst>
+          </p:cNvPr>
+          <p:cNvSpPr/>
+          <p:nvPr/>
+        </p:nvSpPr>
+        <p:spPr>
+          <a:xfrm>
+            <a:off x="1994757" y="3356933"/>
+            <a:ext cx="1044785" cy="583726"/>
+          </a:xfrm>
+          <a:prstGeom prst="rect">
+            <a:avLst/>
+          </a:prstGeom>
+          <a:pattFill prst="wdUpDiag">
+            <a:fgClr>
+              <a:srgbClr val="DEEBF7"/>
+            </a:fgClr>
+            <a:bgClr>
+              <a:schemeClr val="bg1"/>
+            </a:bgClr>
+          </a:pattFill>
+          <a:ln w="9525" cap="flat" cmpd="sng" algn="ctr">
+            <a:solidFill>
+              <a:schemeClr val="bg1"/>
+            </a:solidFill>
+            <a:prstDash val="solid"/>
+            <a:round/>
+            <a:headEnd type="none" w="med" len="med"/>
+            <a:tailEnd type="none" w="med" len="med"/>
+          </a:ln>
+        </p:spPr>
+        <p:style>
+          <a:lnRef idx="0">
+            <a:scrgbClr r="0" g="0" b="0"/>
+          </a:lnRef>
+          <a:fillRef idx="0">
+            <a:scrgbClr r="0" g="0" b="0"/>
+          </a:fillRef>
+          <a:effectRef idx="0">
+            <a:scrgbClr r="0" g="0" b="0"/>
+          </a:effectRef>
+          <a:fontRef idx="minor">
+            <a:schemeClr val="dk1"/>
+          </a:fontRef>
+        </p:style>
+        <p:txBody>
+          <a:bodyPr rot="0" spcFirstLastPara="0" vertOverflow="overflow" horzOverflow="overflow" vert="horz" wrap="square" lIns="68580" tIns="34290" rIns="68580" bIns="34290" numCol="1" spcCol="0" rtlCol="0" fromWordArt="0" anchor="ctr" anchorCtr="0" forceAA="0" compatLnSpc="1">
+            <a:prstTxWarp prst="textNoShape">
+              <a:avLst/>
+            </a:prstTxWarp>
+            <a:noAutofit/>
+          </a:bodyPr>
+          <a:lstStyle/>
+          <a:p>
+            <a:pPr algn="ctr"/>
+            <a:r>
+              <a:rPr lang="en-CA" sz="1200" b="1" dirty="0"/>
+              <a:t>Time series modelling</a:t>
+            </a:r>
+          </a:p>
+        </p:txBody>
+      </p:sp>
+      <p:sp>
+        <p:nvSpPr>
+          <p:cNvPr id="78" name="Rectangle 77">
+            <a:extLst>
+              <a:ext uri="{FF2B5EF4-FFF2-40B4-BE49-F238E27FC236}">
+                <a16:creationId xmlns:a16="http://schemas.microsoft.com/office/drawing/2014/main" id="{BEEEF74C-4747-47F3-AD86-F185BCA51D5F}"/>
+              </a:ext>
+            </a:extLst>
+          </p:cNvPr>
+          <p:cNvSpPr/>
+          <p:nvPr/>
+        </p:nvSpPr>
+        <p:spPr>
+          <a:xfrm>
+            <a:off x="1995990" y="4635237"/>
+            <a:ext cx="1044785" cy="583726"/>
+          </a:xfrm>
+          <a:prstGeom prst="rect">
+            <a:avLst/>
+          </a:prstGeom>
+          <a:pattFill prst="wdUpDiag">
+            <a:fgClr>
+              <a:srgbClr val="FF9696"/>
+            </a:fgClr>
+            <a:bgClr>
+              <a:schemeClr val="bg1"/>
+            </a:bgClr>
+          </a:pattFill>
+          <a:ln w="9525" cap="flat" cmpd="sng" algn="ctr">
+            <a:solidFill>
+              <a:schemeClr val="bg1"/>
+            </a:solidFill>
+            <a:prstDash val="solid"/>
+            <a:round/>
+            <a:headEnd type="none" w="med" len="med"/>
+            <a:tailEnd type="none" w="med" len="med"/>
+          </a:ln>
+        </p:spPr>
+        <p:style>
+          <a:lnRef idx="0">
+            <a:scrgbClr r="0" g="0" b="0"/>
+          </a:lnRef>
+          <a:fillRef idx="0">
+            <a:scrgbClr r="0" g="0" b="0"/>
+          </a:fillRef>
+          <a:effectRef idx="0">
+            <a:scrgbClr r="0" g="0" b="0"/>
+          </a:effectRef>
+          <a:fontRef idx="minor">
+            <a:schemeClr val="dk1"/>
+          </a:fontRef>
+        </p:style>
+        <p:txBody>
+          <a:bodyPr rot="0" spcFirstLastPara="0" vertOverflow="overflow" horzOverflow="overflow" vert="horz" wrap="square" lIns="68580" tIns="34290" rIns="68580" bIns="34290" numCol="1" spcCol="0" rtlCol="0" fromWordArt="0" anchor="ctr" anchorCtr="0" forceAA="0" compatLnSpc="1">
+            <a:prstTxWarp prst="textNoShape">
+              <a:avLst/>
+            </a:prstTxWarp>
+            <a:noAutofit/>
+          </a:bodyPr>
+          <a:lstStyle/>
+          <a:p>
+            <a:pPr algn="ctr"/>
+            <a:r>
+              <a:rPr lang="en-CA" sz="1200" b="1" dirty="0"/>
+              <a:t>Regression Analysis</a:t>
+            </a:r>
+          </a:p>
+        </p:txBody>
+      </p:sp>
+      <p:sp>
+        <p:nvSpPr>
+          <p:cNvPr id="79" name="Rectangle 78">
+            <a:extLst>
+              <a:ext uri="{FF2B5EF4-FFF2-40B4-BE49-F238E27FC236}">
+                <a16:creationId xmlns:a16="http://schemas.microsoft.com/office/drawing/2014/main" id="{241ADCA2-C1C0-4D8E-B761-6EA21FDD6D9C}"/>
+              </a:ext>
+            </a:extLst>
+          </p:cNvPr>
+          <p:cNvSpPr/>
+          <p:nvPr/>
+        </p:nvSpPr>
+        <p:spPr>
+          <a:xfrm>
+            <a:off x="8505381" y="4642851"/>
+            <a:ext cx="1518577" cy="583726"/>
+          </a:xfrm>
+          <a:prstGeom prst="rect">
+            <a:avLst/>
+          </a:prstGeom>
+          <a:solidFill>
+            <a:srgbClr val="FF0000">
+              <a:alpha val="41176"/>
+            </a:srgbClr>
+          </a:solidFill>
+          <a:ln w="9525" cap="flat" cmpd="sng" algn="ctr">
+            <a:solidFill>
+              <a:schemeClr val="bg1"/>
+            </a:solidFill>
+            <a:prstDash val="solid"/>
+            <a:round/>
+            <a:headEnd type="none" w="med" len="med"/>
+            <a:tailEnd type="none" w="med" len="med"/>
+          </a:ln>
+        </p:spPr>
+        <p:style>
+          <a:lnRef idx="0">
+            <a:scrgbClr r="0" g="0" b="0"/>
+          </a:lnRef>
+          <a:fillRef idx="0">
+            <a:scrgbClr r="0" g="0" b="0"/>
+          </a:fillRef>
+          <a:effectRef idx="0">
+            <a:scrgbClr r="0" g="0" b="0"/>
+          </a:effectRef>
+          <a:fontRef idx="minor">
+            <a:schemeClr val="dk1"/>
+          </a:fontRef>
+        </p:style>
+        <p:txBody>
+          <a:bodyPr rot="0" spcFirstLastPara="0" vertOverflow="overflow" horzOverflow="overflow" vert="horz" wrap="square" lIns="68580" tIns="34290" rIns="68580" bIns="34290" numCol="1" spcCol="0" rtlCol="0" fromWordArt="0" anchor="ctr" anchorCtr="0" forceAA="0" compatLnSpc="1">
+            <a:prstTxWarp prst="textNoShape">
+              <a:avLst/>
+            </a:prstTxWarp>
+            <a:noAutofit/>
+          </a:bodyPr>
+          <a:lstStyle/>
+          <a:p>
+            <a:pPr algn="ctr"/>
+            <a:r>
+              <a:rPr lang="en-CA" sz="1200" dirty="0"/>
+              <a:t>Physical protest vs. legislation count</a:t>
+            </a:r>
+          </a:p>
+        </p:txBody>
+      </p:sp>
+      <p:cxnSp>
+        <p:nvCxnSpPr>
+          <p:cNvPr id="80" name="Straight Arrow Connector 79">
+            <a:extLst>
+              <a:ext uri="{FF2B5EF4-FFF2-40B4-BE49-F238E27FC236}">
+                <a16:creationId xmlns:a16="http://schemas.microsoft.com/office/drawing/2014/main" id="{E8DDC71E-D834-4259-9A6D-E662814EC3DC}"/>
+              </a:ext>
+            </a:extLst>
+          </p:cNvPr>
+          <p:cNvCxnSpPr>
+            <a:cxnSpLocks/>
+            <a:stCxn id="75" idx="2"/>
+            <a:endCxn id="106" idx="0"/>
+          </p:cNvCxnSpPr>
+          <p:nvPr/>
+        </p:nvCxnSpPr>
+        <p:spPr>
+          <a:xfrm>
+            <a:off x="4148501" y="2866180"/>
+            <a:ext cx="5390" cy="1766420"/>
+          </a:xfrm>
+          <a:prstGeom prst="straightConnector1">
+            <a:avLst/>
+          </a:prstGeom>
+          <a:ln w="28575">
+            <a:tailEnd type="triangle"/>
+          </a:ln>
+        </p:spPr>
+        <p:style>
+          <a:lnRef idx="1">
+            <a:schemeClr val="dk1"/>
+          </a:lnRef>
+          <a:fillRef idx="0">
+            <a:schemeClr val="dk1"/>
+          </a:fillRef>
+          <a:effectRef idx="0">
+            <a:schemeClr val="dk1"/>
+          </a:effectRef>
+          <a:fontRef idx="minor">
+            <a:schemeClr val="tx1"/>
+          </a:fontRef>
+        </p:style>
+      </p:cxnSp>
+      <p:cxnSp>
+        <p:nvCxnSpPr>
+          <p:cNvPr id="83" name="Straight Arrow Connector 82">
+            <a:extLst>
+              <a:ext uri="{FF2B5EF4-FFF2-40B4-BE49-F238E27FC236}">
+                <a16:creationId xmlns:a16="http://schemas.microsoft.com/office/drawing/2014/main" id="{62E273B8-828A-4130-8E58-8665061D1902}"/>
+              </a:ext>
+            </a:extLst>
+          </p:cNvPr>
+          <p:cNvCxnSpPr>
+            <a:cxnSpLocks/>
+            <a:stCxn id="68" idx="2"/>
+            <a:endCxn id="75" idx="0"/>
+          </p:cNvCxnSpPr>
+          <p:nvPr/>
+        </p:nvCxnSpPr>
+        <p:spPr>
+          <a:xfrm flipH="1">
+            <a:off x="4148501" y="1892683"/>
+            <a:ext cx="3340" cy="353910"/>
+          </a:xfrm>
+          <a:prstGeom prst="straightConnector1">
+            <a:avLst/>
+          </a:prstGeom>
+          <a:ln w="28575">
+            <a:tailEnd type="triangle"/>
+          </a:ln>
+        </p:spPr>
+        <p:style>
+          <a:lnRef idx="1">
+            <a:schemeClr val="dk1"/>
+          </a:lnRef>
+          <a:fillRef idx="0">
+            <a:schemeClr val="dk1"/>
+          </a:fillRef>
+          <a:effectRef idx="0">
+            <a:schemeClr val="dk1"/>
+          </a:effectRef>
+          <a:fontRef idx="minor">
+            <a:schemeClr val="tx1"/>
+          </a:fontRef>
+        </p:style>
+      </p:cxnSp>
+      <p:sp>
+        <p:nvSpPr>
+          <p:cNvPr id="85" name="Rectangle 84">
+            <a:extLst>
+              <a:ext uri="{FF2B5EF4-FFF2-40B4-BE49-F238E27FC236}">
+                <a16:creationId xmlns:a16="http://schemas.microsoft.com/office/drawing/2014/main" id="{E4D96BD7-8364-4532-8E58-8BBD68865274}"/>
+              </a:ext>
+            </a:extLst>
+          </p:cNvPr>
+          <p:cNvSpPr/>
+          <p:nvPr/>
+        </p:nvSpPr>
+        <p:spPr>
+          <a:xfrm>
+            <a:off x="7999843" y="375370"/>
+            <a:ext cx="1199708" cy="583726"/>
+          </a:xfrm>
+          <a:prstGeom prst="rect">
+            <a:avLst/>
+          </a:prstGeom>
+          <a:solidFill>
+            <a:schemeClr val="accent6">
+              <a:lumMod val="20000"/>
+              <a:lumOff val="80000"/>
+            </a:schemeClr>
+          </a:solidFill>
+          <a:ln w="9525" cap="flat" cmpd="sng" algn="ctr">
+            <a:solidFill>
+              <a:schemeClr val="bg1"/>
+            </a:solidFill>
+            <a:prstDash val="solid"/>
+            <a:round/>
+            <a:headEnd type="none" w="med" len="med"/>
+            <a:tailEnd type="none" w="med" len="med"/>
+          </a:ln>
+        </p:spPr>
+        <p:style>
+          <a:lnRef idx="0">
+            <a:scrgbClr r="0" g="0" b="0"/>
+          </a:lnRef>
+          <a:fillRef idx="0">
+            <a:scrgbClr r="0" g="0" b="0"/>
+          </a:fillRef>
+          <a:effectRef idx="0">
+            <a:scrgbClr r="0" g="0" b="0"/>
+          </a:effectRef>
+          <a:fontRef idx="minor">
+            <a:schemeClr val="dk1"/>
+          </a:fontRef>
+        </p:style>
+        <p:txBody>
+          <a:bodyPr rot="0" spcFirstLastPara="0" vertOverflow="overflow" horzOverflow="overflow" vert="horz" wrap="square" lIns="68580" tIns="34290" rIns="68580" bIns="34290" numCol="1" spcCol="0" rtlCol="0" fromWordArt="0" anchor="ctr" anchorCtr="0" forceAA="0" compatLnSpc="1">
+            <a:prstTxWarp prst="textNoShape">
+              <a:avLst/>
+            </a:prstTxWarp>
+            <a:noAutofit/>
+          </a:bodyPr>
+          <a:lstStyle/>
+          <a:p>
+            <a:pPr algn="ctr"/>
+            <a:r>
+              <a:rPr lang="en-CA" sz="1200" dirty="0"/>
+              <a:t>NCSL</a:t>
+            </a:r>
+          </a:p>
+        </p:txBody>
+      </p:sp>
+      <p:cxnSp>
+        <p:nvCxnSpPr>
+          <p:cNvPr id="86" name="Straight Connector 85">
+            <a:extLst>
+              <a:ext uri="{FF2B5EF4-FFF2-40B4-BE49-F238E27FC236}">
+                <a16:creationId xmlns:a16="http://schemas.microsoft.com/office/drawing/2014/main" id="{37253051-8F3F-46CF-932D-1DEE018AF49E}"/>
+              </a:ext>
+            </a:extLst>
+          </p:cNvPr>
+          <p:cNvCxnSpPr>
+            <a:cxnSpLocks/>
+          </p:cNvCxnSpPr>
+          <p:nvPr/>
+        </p:nvCxnSpPr>
+        <p:spPr>
+          <a:xfrm>
+            <a:off x="6832168" y="234553"/>
+            <a:ext cx="0" cy="3587261"/>
+          </a:xfrm>
+          <a:prstGeom prst="line">
+            <a:avLst/>
+          </a:prstGeom>
+          <a:ln w="38100">
+            <a:noFill/>
+          </a:ln>
+        </p:spPr>
+        <p:style>
+          <a:lnRef idx="1">
+            <a:schemeClr val="accent1"/>
+          </a:lnRef>
+          <a:fillRef idx="0">
+            <a:schemeClr val="accent1"/>
+          </a:fillRef>
+          <a:effectRef idx="0">
+            <a:schemeClr val="accent1"/>
+          </a:effectRef>
+          <a:fontRef idx="minor">
+            <a:schemeClr val="tx1"/>
+          </a:fontRef>
+        </p:style>
+      </p:cxnSp>
+      <p:cxnSp>
+        <p:nvCxnSpPr>
+          <p:cNvPr id="87" name="Straight Connector 86">
+            <a:extLst>
+              <a:ext uri="{FF2B5EF4-FFF2-40B4-BE49-F238E27FC236}">
+                <a16:creationId xmlns:a16="http://schemas.microsoft.com/office/drawing/2014/main" id="{09A45C7A-A09A-440A-900F-32DE2F63F7D2}"/>
+              </a:ext>
+            </a:extLst>
+          </p:cNvPr>
+          <p:cNvCxnSpPr>
+            <a:cxnSpLocks/>
+          </p:cNvCxnSpPr>
+          <p:nvPr/>
+        </p:nvCxnSpPr>
+        <p:spPr>
+          <a:xfrm flipH="1">
+            <a:off x="4894344" y="5063998"/>
+            <a:ext cx="1939059" cy="0"/>
+          </a:xfrm>
+          <a:prstGeom prst="line">
+            <a:avLst/>
+          </a:prstGeom>
+          <a:ln w="38100">
+            <a:noFill/>
+          </a:ln>
+        </p:spPr>
+        <p:style>
+          <a:lnRef idx="1">
+            <a:schemeClr val="accent1"/>
+          </a:lnRef>
+          <a:fillRef idx="0">
+            <a:schemeClr val="accent1"/>
+          </a:fillRef>
+          <a:effectRef idx="0">
+            <a:schemeClr val="accent1"/>
+          </a:effectRef>
+          <a:fontRef idx="minor">
+            <a:schemeClr val="tx1"/>
+          </a:fontRef>
+        </p:style>
+      </p:cxnSp>
+      <p:cxnSp>
+        <p:nvCxnSpPr>
+          <p:cNvPr id="88" name="Straight Connector 87">
+            <a:extLst>
+              <a:ext uri="{FF2B5EF4-FFF2-40B4-BE49-F238E27FC236}">
+                <a16:creationId xmlns:a16="http://schemas.microsoft.com/office/drawing/2014/main" id="{F32B52A0-7E10-4803-9BDC-C52440ABD528}"/>
+              </a:ext>
+            </a:extLst>
+          </p:cNvPr>
+          <p:cNvCxnSpPr>
+            <a:cxnSpLocks/>
+          </p:cNvCxnSpPr>
+          <p:nvPr/>
+        </p:nvCxnSpPr>
+        <p:spPr>
+          <a:xfrm flipV="1">
+            <a:off x="9998652" y="234552"/>
+            <a:ext cx="0" cy="5653454"/>
+          </a:xfrm>
+          <a:prstGeom prst="line">
+            <a:avLst/>
+          </a:prstGeom>
+          <a:ln w="38100">
+            <a:noFill/>
+          </a:ln>
+        </p:spPr>
+        <p:style>
+          <a:lnRef idx="1">
+            <a:schemeClr val="accent1"/>
+          </a:lnRef>
+          <a:fillRef idx="0">
+            <a:schemeClr val="accent1"/>
+          </a:fillRef>
+          <a:effectRef idx="0">
+            <a:schemeClr val="accent1"/>
+          </a:effectRef>
+          <a:fontRef idx="minor">
+            <a:schemeClr val="tx1"/>
+          </a:fontRef>
+        </p:style>
+      </p:cxnSp>
+      <p:cxnSp>
+        <p:nvCxnSpPr>
+          <p:cNvPr id="89" name="Straight Connector 88">
+            <a:extLst>
+              <a:ext uri="{FF2B5EF4-FFF2-40B4-BE49-F238E27FC236}">
+                <a16:creationId xmlns:a16="http://schemas.microsoft.com/office/drawing/2014/main" id="{2BB341DA-A652-4E65-96D0-B8AD2572E967}"/>
+              </a:ext>
+            </a:extLst>
+          </p:cNvPr>
+          <p:cNvCxnSpPr>
+            <a:cxnSpLocks/>
+          </p:cNvCxnSpPr>
+          <p:nvPr/>
+        </p:nvCxnSpPr>
+        <p:spPr>
+          <a:xfrm flipH="1">
+            <a:off x="6832170" y="234552"/>
+            <a:ext cx="3175275" cy="0"/>
+          </a:xfrm>
+          <a:prstGeom prst="line">
+            <a:avLst/>
+          </a:prstGeom>
+          <a:ln w="38100">
+            <a:noFill/>
+          </a:ln>
+        </p:spPr>
+        <p:style>
+          <a:lnRef idx="1">
+            <a:schemeClr val="accent1"/>
+          </a:lnRef>
+          <a:fillRef idx="0">
+            <a:schemeClr val="accent1"/>
+          </a:fillRef>
+          <a:effectRef idx="0">
+            <a:schemeClr val="accent1"/>
+          </a:effectRef>
+          <a:fontRef idx="minor">
+            <a:schemeClr val="tx1"/>
+          </a:fontRef>
+        </p:style>
+      </p:cxnSp>
+      <p:sp>
+        <p:nvSpPr>
+          <p:cNvPr id="90" name="Rectangle 89">
+            <a:extLst>
+              <a:ext uri="{FF2B5EF4-FFF2-40B4-BE49-F238E27FC236}">
+                <a16:creationId xmlns:a16="http://schemas.microsoft.com/office/drawing/2014/main" id="{6DF6ED2B-97E4-4050-AB49-474A4975FF93}"/>
+              </a:ext>
+            </a:extLst>
+          </p:cNvPr>
+          <p:cNvSpPr/>
+          <p:nvPr/>
+        </p:nvSpPr>
+        <p:spPr>
+          <a:xfrm>
+            <a:off x="3268141" y="234553"/>
+            <a:ext cx="3447943" cy="3121269"/>
+          </a:xfrm>
+          <a:prstGeom prst="rect">
+            <a:avLst/>
+          </a:prstGeom>
+          <a:noFill/>
+          <a:ln w="38100">
+            <a:noFill/>
+          </a:ln>
+        </p:spPr>
+        <p:style>
+          <a:lnRef idx="2">
+            <a:schemeClr val="accent1">
+              <a:shade val="50000"/>
+            </a:schemeClr>
+          </a:lnRef>
+          <a:fillRef idx="1">
+            <a:schemeClr val="accent1"/>
+          </a:fillRef>
+          <a:effectRef idx="0">
+            <a:schemeClr val="accent1"/>
+          </a:effectRef>
+          <a:fontRef idx="minor">
+            <a:schemeClr val="lt1"/>
+          </a:fontRef>
+        </p:style>
+        <p:txBody>
+          <a:bodyPr rtlCol="0" anchor="ctr"/>
+          <a:lstStyle/>
+          <a:p>
+            <a:pPr algn="ctr"/>
+            <a:endParaRPr lang="en-CA">
+              <a:solidFill>
+                <a:schemeClr val="bg1"/>
+              </a:solidFill>
+            </a:endParaRPr>
+          </a:p>
+        </p:txBody>
+      </p:sp>
+      <p:sp>
+        <p:nvSpPr>
+          <p:cNvPr id="92" name="Rectangle 91">
+            <a:extLst>
+              <a:ext uri="{FF2B5EF4-FFF2-40B4-BE49-F238E27FC236}">
+                <a16:creationId xmlns:a16="http://schemas.microsoft.com/office/drawing/2014/main" id="{91197B83-94B7-44A8-8561-09B11AA95644}"/>
+              </a:ext>
+            </a:extLst>
+          </p:cNvPr>
+          <p:cNvSpPr/>
+          <p:nvPr/>
+        </p:nvSpPr>
+        <p:spPr>
+          <a:xfrm>
+            <a:off x="5017972" y="383647"/>
+            <a:ext cx="1199708" cy="583726"/>
+          </a:xfrm>
+          <a:prstGeom prst="rect">
+            <a:avLst/>
+          </a:prstGeom>
+          <a:solidFill>
+            <a:schemeClr val="accent6">
+              <a:lumMod val="20000"/>
+              <a:lumOff val="80000"/>
+            </a:schemeClr>
+          </a:solidFill>
+          <a:ln w="9525" cap="flat" cmpd="sng" algn="ctr">
+            <a:solidFill>
+              <a:schemeClr val="bg1"/>
+            </a:solidFill>
+            <a:prstDash val="solid"/>
+            <a:round/>
+            <a:headEnd type="none" w="med" len="med"/>
+            <a:tailEnd type="none" w="med" len="med"/>
+          </a:ln>
+        </p:spPr>
+        <p:style>
+          <a:lnRef idx="0">
+            <a:scrgbClr r="0" g="0" b="0"/>
+          </a:lnRef>
+          <a:fillRef idx="0">
+            <a:scrgbClr r="0" g="0" b="0"/>
+          </a:fillRef>
+          <a:effectRef idx="0">
+            <a:scrgbClr r="0" g="0" b="0"/>
+          </a:effectRef>
+          <a:fontRef idx="minor">
+            <a:schemeClr val="dk1"/>
+          </a:fontRef>
+        </p:style>
+        <p:txBody>
+          <a:bodyPr rot="0" spcFirstLastPara="0" vertOverflow="overflow" horzOverflow="overflow" vert="horz" wrap="square" lIns="68580" tIns="34290" rIns="68580" bIns="34290" numCol="1" spcCol="0" rtlCol="0" fromWordArt="0" anchor="ctr" anchorCtr="0" forceAA="0" compatLnSpc="1">
+            <a:prstTxWarp prst="textNoShape">
+              <a:avLst/>
+            </a:prstTxWarp>
+            <a:noAutofit/>
+          </a:bodyPr>
+          <a:lstStyle/>
+          <a:p>
+            <a:pPr algn="ctr"/>
+            <a:r>
+              <a:rPr lang="en-CA" sz="1200" dirty="0"/>
+              <a:t>ACLED</a:t>
+            </a:r>
+          </a:p>
+        </p:txBody>
+      </p:sp>
+      <p:cxnSp>
+        <p:nvCxnSpPr>
+          <p:cNvPr id="93" name="Connector: Elbow 92">
+            <a:extLst>
+              <a:ext uri="{FF2B5EF4-FFF2-40B4-BE49-F238E27FC236}">
+                <a16:creationId xmlns:a16="http://schemas.microsoft.com/office/drawing/2014/main" id="{3E5FB78A-9918-4A1F-BA66-4155D49B26FA}"/>
+              </a:ext>
+            </a:extLst>
+          </p:cNvPr>
+          <p:cNvCxnSpPr>
+            <a:cxnSpLocks/>
+            <a:stCxn id="64" idx="2"/>
+            <a:endCxn id="69" idx="0"/>
+          </p:cNvCxnSpPr>
+          <p:nvPr/>
+        </p:nvCxnSpPr>
+        <p:spPr>
+          <a:xfrm rot="5400000">
+            <a:off x="6475647" y="700120"/>
+            <a:ext cx="318813" cy="902597"/>
+          </a:xfrm>
+          <a:prstGeom prst="bentConnector3">
+            <a:avLst>
+              <a:gd name="adj1" fmla="val 50000"/>
+            </a:avLst>
+          </a:prstGeom>
+          <a:ln w="28575">
+            <a:tailEnd type="triangle"/>
+          </a:ln>
+        </p:spPr>
+        <p:style>
+          <a:lnRef idx="1">
+            <a:schemeClr val="dk1"/>
+          </a:lnRef>
+          <a:fillRef idx="0">
+            <a:schemeClr val="dk1"/>
+          </a:fillRef>
+          <a:effectRef idx="0">
+            <a:schemeClr val="dk1"/>
+          </a:effectRef>
+          <a:fontRef idx="minor">
+            <a:schemeClr val="tx1"/>
+          </a:fontRef>
+        </p:style>
+      </p:cxnSp>
+      <p:sp>
+        <p:nvSpPr>
+          <p:cNvPr id="94" name="Rectangle 93">
+            <a:extLst>
+              <a:ext uri="{FF2B5EF4-FFF2-40B4-BE49-F238E27FC236}">
+                <a16:creationId xmlns:a16="http://schemas.microsoft.com/office/drawing/2014/main" id="{7AF75749-2311-4CFD-8E49-6E7DC851E7A8}"/>
+              </a:ext>
+            </a:extLst>
+          </p:cNvPr>
+          <p:cNvSpPr/>
+          <p:nvPr/>
+        </p:nvSpPr>
+        <p:spPr>
+          <a:xfrm>
+            <a:off x="7941677" y="1323078"/>
+            <a:ext cx="1319273" cy="583726"/>
+          </a:xfrm>
+          <a:prstGeom prst="rect">
+            <a:avLst/>
+          </a:prstGeom>
+          <a:solidFill>
+            <a:schemeClr val="accent2">
+              <a:lumMod val="20000"/>
+              <a:lumOff val="80000"/>
+            </a:schemeClr>
+          </a:solidFill>
+          <a:ln w="9525" cap="flat" cmpd="sng" algn="ctr">
+            <a:solidFill>
+              <a:schemeClr val="bg1"/>
+            </a:solidFill>
+            <a:prstDash val="solid"/>
+            <a:round/>
+            <a:headEnd type="none" w="med" len="med"/>
+            <a:tailEnd type="none" w="med" len="med"/>
+          </a:ln>
+        </p:spPr>
+        <p:style>
+          <a:lnRef idx="0">
+            <a:scrgbClr r="0" g="0" b="0"/>
+          </a:lnRef>
+          <a:fillRef idx="0">
+            <a:scrgbClr r="0" g="0" b="0"/>
+          </a:fillRef>
+          <a:effectRef idx="0">
+            <a:scrgbClr r="0" g="0" b="0"/>
+          </a:effectRef>
+          <a:fontRef idx="minor">
+            <a:schemeClr val="dk1"/>
+          </a:fontRef>
+        </p:style>
+        <p:txBody>
+          <a:bodyPr rot="0" spcFirstLastPara="0" vertOverflow="overflow" horzOverflow="overflow" vert="horz" wrap="square" lIns="68580" tIns="34290" rIns="68580" bIns="34290" numCol="1" spcCol="0" rtlCol="0" fromWordArt="0" anchor="ctr" anchorCtr="0" forceAA="0" compatLnSpc="1">
+            <a:prstTxWarp prst="textNoShape">
+              <a:avLst/>
+            </a:prstTxWarp>
+            <a:noAutofit/>
+          </a:bodyPr>
+          <a:lstStyle/>
+          <a:p>
+            <a:pPr algn="ctr"/>
+            <a:r>
+              <a:rPr lang="en-CA" sz="1000" dirty="0"/>
+              <a:t>State level legislative responses to policing</a:t>
+            </a:r>
+          </a:p>
+        </p:txBody>
+      </p:sp>
+      <p:cxnSp>
+        <p:nvCxnSpPr>
+          <p:cNvPr id="95" name="Connector: Elbow 94">
+            <a:extLst>
+              <a:ext uri="{FF2B5EF4-FFF2-40B4-BE49-F238E27FC236}">
+                <a16:creationId xmlns:a16="http://schemas.microsoft.com/office/drawing/2014/main" id="{E952F000-22B5-4C09-B53B-CB6DC4E56804}"/>
+              </a:ext>
+            </a:extLst>
+          </p:cNvPr>
+          <p:cNvCxnSpPr>
+            <a:cxnSpLocks/>
+            <a:stCxn id="85" idx="2"/>
+            <a:endCxn id="94" idx="0"/>
+          </p:cNvCxnSpPr>
+          <p:nvPr/>
+        </p:nvCxnSpPr>
+        <p:spPr>
+          <a:xfrm rot="16200000" flipH="1">
+            <a:off x="8418514" y="1140279"/>
+            <a:ext cx="363982" cy="1616"/>
+          </a:xfrm>
+          <a:prstGeom prst="bentConnector3">
+            <a:avLst>
+              <a:gd name="adj1" fmla="val 50000"/>
+            </a:avLst>
+          </a:prstGeom>
+          <a:ln w="28575">
+            <a:tailEnd type="triangle"/>
+          </a:ln>
+        </p:spPr>
+        <p:style>
+          <a:lnRef idx="1">
+            <a:schemeClr val="dk1"/>
+          </a:lnRef>
+          <a:fillRef idx="0">
+            <a:schemeClr val="dk1"/>
+          </a:fillRef>
+          <a:effectRef idx="0">
+            <a:schemeClr val="dk1"/>
+          </a:effectRef>
+          <a:fontRef idx="minor">
+            <a:schemeClr val="tx1"/>
+          </a:fontRef>
+        </p:style>
+      </p:cxnSp>
+      <p:cxnSp>
+        <p:nvCxnSpPr>
+          <p:cNvPr id="96" name="Connector: Elbow 95">
+            <a:extLst>
+              <a:ext uri="{FF2B5EF4-FFF2-40B4-BE49-F238E27FC236}">
+                <a16:creationId xmlns:a16="http://schemas.microsoft.com/office/drawing/2014/main" id="{50170593-A485-4771-87F8-5D4AF676BABC}"/>
+              </a:ext>
+            </a:extLst>
+          </p:cNvPr>
+          <p:cNvCxnSpPr>
+            <a:cxnSpLocks/>
+            <a:stCxn id="92" idx="2"/>
+            <a:endCxn id="69" idx="0"/>
+          </p:cNvCxnSpPr>
+          <p:nvPr/>
+        </p:nvCxnSpPr>
+        <p:spPr>
+          <a:xfrm rot="16200000" flipH="1">
+            <a:off x="5729065" y="856135"/>
+            <a:ext cx="343451" cy="565927"/>
+          </a:xfrm>
+          <a:prstGeom prst="bentConnector3">
+            <a:avLst>
+              <a:gd name="adj1" fmla="val 50000"/>
+            </a:avLst>
+          </a:prstGeom>
+          <a:ln w="28575">
+            <a:tailEnd type="triangle"/>
+          </a:ln>
+        </p:spPr>
+        <p:style>
+          <a:lnRef idx="1">
+            <a:schemeClr val="dk1"/>
+          </a:lnRef>
+          <a:fillRef idx="0">
+            <a:schemeClr val="dk1"/>
+          </a:fillRef>
+          <a:effectRef idx="0">
+            <a:schemeClr val="dk1"/>
+          </a:effectRef>
+          <a:fontRef idx="minor">
+            <a:schemeClr val="tx1"/>
+          </a:fontRef>
+        </p:style>
+      </p:cxnSp>
+      <p:sp>
+        <p:nvSpPr>
+          <p:cNvPr id="97" name="Rectangle 96">
+            <a:extLst>
+              <a:ext uri="{FF2B5EF4-FFF2-40B4-BE49-F238E27FC236}">
+                <a16:creationId xmlns:a16="http://schemas.microsoft.com/office/drawing/2014/main" id="{EB4DBE34-B443-4A7D-AF82-659296AFE8E9}"/>
+              </a:ext>
+            </a:extLst>
+          </p:cNvPr>
+          <p:cNvSpPr/>
+          <p:nvPr/>
+        </p:nvSpPr>
+        <p:spPr>
+          <a:xfrm>
+            <a:off x="6538405" y="2235992"/>
+            <a:ext cx="1095889" cy="583726"/>
+          </a:xfrm>
+          <a:prstGeom prst="rect">
+            <a:avLst/>
+          </a:prstGeom>
+          <a:solidFill>
+            <a:schemeClr val="accent4">
+              <a:lumMod val="20000"/>
+              <a:lumOff val="80000"/>
+            </a:schemeClr>
+          </a:solidFill>
+          <a:ln w="9525" cap="flat" cmpd="sng" algn="ctr">
+            <a:solidFill>
+              <a:schemeClr val="bg1"/>
+            </a:solidFill>
+            <a:prstDash val="solid"/>
+            <a:round/>
+            <a:headEnd type="none" w="med" len="med"/>
+            <a:tailEnd type="none" w="med" len="med"/>
+          </a:ln>
+        </p:spPr>
+        <p:style>
+          <a:lnRef idx="0">
+            <a:scrgbClr r="0" g="0" b="0"/>
+          </a:lnRef>
+          <a:fillRef idx="0">
+            <a:scrgbClr r="0" g="0" b="0"/>
+          </a:fillRef>
+          <a:effectRef idx="0">
+            <a:scrgbClr r="0" g="0" b="0"/>
+          </a:effectRef>
+          <a:fontRef idx="minor">
+            <a:schemeClr val="dk1"/>
+          </a:fontRef>
+        </p:style>
+        <p:txBody>
+          <a:bodyPr rot="0" spcFirstLastPara="0" vertOverflow="overflow" horzOverflow="overflow" vert="horz" wrap="square" lIns="68580" tIns="34290" rIns="68580" bIns="34290" numCol="1" spcCol="0" rtlCol="0" fromWordArt="0" anchor="ctr" anchorCtr="0" forceAA="0" compatLnSpc="1">
+            <a:prstTxWarp prst="textNoShape">
+              <a:avLst/>
+            </a:prstTxWarp>
+            <a:noAutofit/>
+          </a:bodyPr>
+          <a:lstStyle/>
+          <a:p>
+            <a:pPr algn="ctr"/>
+            <a:r>
+              <a:rPr lang="en-CA" sz="1200" dirty="0"/>
+              <a:t>Data aggregated by day (count)</a:t>
+            </a:r>
+          </a:p>
+        </p:txBody>
+      </p:sp>
+      <p:cxnSp>
+        <p:nvCxnSpPr>
+          <p:cNvPr id="98" name="Connector: Elbow 97">
+            <a:extLst>
+              <a:ext uri="{FF2B5EF4-FFF2-40B4-BE49-F238E27FC236}">
+                <a16:creationId xmlns:a16="http://schemas.microsoft.com/office/drawing/2014/main" id="{1708FCE8-1745-4D7F-A489-F8AA1467E0BB}"/>
+              </a:ext>
+            </a:extLst>
+          </p:cNvPr>
+          <p:cNvCxnSpPr>
+            <a:cxnSpLocks/>
+            <a:stCxn id="69" idx="1"/>
+            <a:endCxn id="75" idx="3"/>
+          </p:cNvCxnSpPr>
+          <p:nvPr/>
+        </p:nvCxnSpPr>
+        <p:spPr>
+          <a:xfrm rot="10800000" flipV="1">
+            <a:off x="5100865" y="1602687"/>
+            <a:ext cx="219645" cy="953700"/>
+          </a:xfrm>
+          <a:prstGeom prst="bentConnector3">
+            <a:avLst>
+              <a:gd name="adj1" fmla="val 33988"/>
+            </a:avLst>
+          </a:prstGeom>
+          <a:ln w="28575">
+            <a:tailEnd type="triangle"/>
+          </a:ln>
+        </p:spPr>
+        <p:style>
+          <a:lnRef idx="1">
+            <a:schemeClr val="dk1"/>
+          </a:lnRef>
+          <a:fillRef idx="0">
+            <a:schemeClr val="dk1"/>
+          </a:fillRef>
+          <a:effectRef idx="0">
+            <a:schemeClr val="dk1"/>
+          </a:effectRef>
+          <a:fontRef idx="minor">
+            <a:schemeClr val="tx1"/>
+          </a:fontRef>
+        </p:style>
+      </p:cxnSp>
+      <p:cxnSp>
+        <p:nvCxnSpPr>
+          <p:cNvPr id="99" name="Connector: Elbow 98">
+            <a:extLst>
+              <a:ext uri="{FF2B5EF4-FFF2-40B4-BE49-F238E27FC236}">
+                <a16:creationId xmlns:a16="http://schemas.microsoft.com/office/drawing/2014/main" id="{676BE680-D8DC-4A42-A93B-81CE6C3EB51E}"/>
+              </a:ext>
+            </a:extLst>
+          </p:cNvPr>
+          <p:cNvCxnSpPr>
+            <a:cxnSpLocks/>
+            <a:endCxn id="97" idx="1"/>
+          </p:cNvCxnSpPr>
+          <p:nvPr/>
+        </p:nvCxnSpPr>
+        <p:spPr>
+          <a:xfrm rot="16200000" flipH="1">
+            <a:off x="5952758" y="1942207"/>
+            <a:ext cx="642501" cy="528794"/>
+          </a:xfrm>
+          <a:prstGeom prst="bentConnector2">
+            <a:avLst/>
+          </a:prstGeom>
+          <a:ln w="28575">
+            <a:tailEnd type="triangle"/>
+          </a:ln>
+        </p:spPr>
+        <p:style>
+          <a:lnRef idx="1">
+            <a:schemeClr val="dk1"/>
+          </a:lnRef>
+          <a:fillRef idx="0">
+            <a:schemeClr val="dk1"/>
+          </a:fillRef>
+          <a:effectRef idx="0">
+            <a:schemeClr val="dk1"/>
+          </a:effectRef>
+          <a:fontRef idx="minor">
+            <a:schemeClr val="tx1"/>
+          </a:fontRef>
+        </p:style>
+      </p:cxnSp>
+      <p:cxnSp>
+        <p:nvCxnSpPr>
+          <p:cNvPr id="100" name="Connector: Elbow 99">
+            <a:extLst>
+              <a:ext uri="{FF2B5EF4-FFF2-40B4-BE49-F238E27FC236}">
+                <a16:creationId xmlns:a16="http://schemas.microsoft.com/office/drawing/2014/main" id="{50798C6A-136F-41AF-9536-56B48FBBE031}"/>
+              </a:ext>
+            </a:extLst>
+          </p:cNvPr>
+          <p:cNvCxnSpPr>
+            <a:cxnSpLocks/>
+            <a:stCxn id="94" idx="2"/>
+            <a:endCxn id="76" idx="3"/>
+          </p:cNvCxnSpPr>
+          <p:nvPr/>
+        </p:nvCxnSpPr>
+        <p:spPr>
+          <a:xfrm rot="16200000" flipH="1">
+            <a:off x="9010799" y="1497318"/>
+            <a:ext cx="650370" cy="1469342"/>
+          </a:xfrm>
+          <a:prstGeom prst="bentConnector4">
+            <a:avLst>
+              <a:gd name="adj1" fmla="val 13942"/>
+              <a:gd name="adj2" fmla="val 115558"/>
+            </a:avLst>
+          </a:prstGeom>
+          <a:ln w="28575">
+            <a:tailEnd type="triangle"/>
+          </a:ln>
+        </p:spPr>
+        <p:style>
+          <a:lnRef idx="1">
+            <a:schemeClr val="dk1"/>
+          </a:lnRef>
+          <a:fillRef idx="0">
+            <a:schemeClr val="dk1"/>
+          </a:fillRef>
+          <a:effectRef idx="0">
+            <a:schemeClr val="dk1"/>
+          </a:effectRef>
+          <a:fontRef idx="minor">
+            <a:schemeClr val="tx1"/>
+          </a:fontRef>
+        </p:style>
+      </p:cxnSp>
+      <p:cxnSp>
+        <p:nvCxnSpPr>
+          <p:cNvPr id="101" name="Connector: Elbow 100">
+            <a:extLst>
+              <a:ext uri="{FF2B5EF4-FFF2-40B4-BE49-F238E27FC236}">
+                <a16:creationId xmlns:a16="http://schemas.microsoft.com/office/drawing/2014/main" id="{14A27137-FFF3-4E6B-80DF-E5EC9B4E0F27}"/>
+              </a:ext>
+            </a:extLst>
+          </p:cNvPr>
+          <p:cNvCxnSpPr>
+            <a:cxnSpLocks/>
+            <a:endCxn id="119" idx="0"/>
+          </p:cNvCxnSpPr>
+          <p:nvPr/>
+        </p:nvCxnSpPr>
+        <p:spPr>
+          <a:xfrm rot="10800000" flipV="1">
+            <a:off x="5481655" y="2751553"/>
+            <a:ext cx="1055917" cy="608396"/>
+          </a:xfrm>
+          <a:prstGeom prst="bentConnector2">
+            <a:avLst/>
+          </a:prstGeom>
+          <a:ln w="28575">
+            <a:tailEnd type="triangle"/>
+          </a:ln>
+        </p:spPr>
+        <p:style>
+          <a:lnRef idx="1">
+            <a:schemeClr val="dk1"/>
+          </a:lnRef>
+          <a:fillRef idx="0">
+            <a:schemeClr val="dk1"/>
+          </a:fillRef>
+          <a:effectRef idx="0">
+            <a:schemeClr val="dk1"/>
+          </a:effectRef>
+          <a:fontRef idx="minor">
+            <a:schemeClr val="tx1"/>
+          </a:fontRef>
+        </p:style>
+      </p:cxnSp>
+      <p:sp>
+        <p:nvSpPr>
+          <p:cNvPr id="102" name="Rectangle 101">
+            <a:extLst>
+              <a:ext uri="{FF2B5EF4-FFF2-40B4-BE49-F238E27FC236}">
+                <a16:creationId xmlns:a16="http://schemas.microsoft.com/office/drawing/2014/main" id="{93A9EC37-6D43-4010-B3B5-BD55DD6838CD}"/>
+              </a:ext>
+            </a:extLst>
+          </p:cNvPr>
+          <p:cNvSpPr/>
+          <p:nvPr/>
+        </p:nvSpPr>
+        <p:spPr>
+          <a:xfrm>
+            <a:off x="6993657" y="3352512"/>
+            <a:ext cx="1030599" cy="583726"/>
+          </a:xfrm>
+          <a:prstGeom prst="rect">
+            <a:avLst/>
+          </a:prstGeom>
+          <a:solidFill>
+            <a:schemeClr val="accent5">
+              <a:lumMod val="20000"/>
+              <a:lumOff val="80000"/>
+            </a:schemeClr>
+          </a:solidFill>
+          <a:ln w="9525" cap="flat" cmpd="sng" algn="ctr">
+            <a:solidFill>
+              <a:schemeClr val="bg1"/>
+            </a:solidFill>
+            <a:prstDash val="solid"/>
+            <a:round/>
+            <a:headEnd type="none" w="med" len="med"/>
+            <a:tailEnd type="none" w="med" len="med"/>
+          </a:ln>
+        </p:spPr>
+        <p:style>
+          <a:lnRef idx="0">
+            <a:scrgbClr r="0" g="0" b="0"/>
+          </a:lnRef>
+          <a:fillRef idx="0">
+            <a:scrgbClr r="0" g="0" b="0"/>
+          </a:fillRef>
+          <a:effectRef idx="0">
+            <a:scrgbClr r="0" g="0" b="0"/>
+          </a:effectRef>
+          <a:fontRef idx="minor">
+            <a:schemeClr val="dk1"/>
+          </a:fontRef>
+        </p:style>
+        <p:txBody>
+          <a:bodyPr rot="0" spcFirstLastPara="0" vertOverflow="overflow" horzOverflow="overflow" vert="horz" wrap="square" lIns="68580" tIns="34290" rIns="68580" bIns="34290" numCol="1" spcCol="0" rtlCol="0" fromWordArt="0" anchor="ctr" anchorCtr="0" forceAA="0" compatLnSpc="1">
+            <a:prstTxWarp prst="textNoShape">
+              <a:avLst/>
+            </a:prstTxWarp>
+            <a:noAutofit/>
+          </a:bodyPr>
+          <a:lstStyle/>
+          <a:p>
+            <a:pPr algn="ctr"/>
+            <a:r>
+              <a:rPr lang="en-CA" sz="900" dirty="0"/>
+              <a:t>Multivariate time-series forecasting (LSTM, VAR)</a:t>
+            </a:r>
+          </a:p>
+        </p:txBody>
+      </p:sp>
+      <p:cxnSp>
+        <p:nvCxnSpPr>
+          <p:cNvPr id="105" name="Connector: Elbow 104">
+            <a:extLst>
+              <a:ext uri="{FF2B5EF4-FFF2-40B4-BE49-F238E27FC236}">
+                <a16:creationId xmlns:a16="http://schemas.microsoft.com/office/drawing/2014/main" id="{EC107074-F01D-42FF-A498-80DEC7AF3C3B}"/>
+              </a:ext>
+            </a:extLst>
+          </p:cNvPr>
+          <p:cNvCxnSpPr>
+            <a:cxnSpLocks/>
+            <a:stCxn id="97" idx="2"/>
+            <a:endCxn id="102" idx="0"/>
+          </p:cNvCxnSpPr>
+          <p:nvPr/>
+        </p:nvCxnSpPr>
+        <p:spPr>
+          <a:xfrm rot="16200000" flipH="1">
+            <a:off x="7031255" y="2874812"/>
+            <a:ext cx="532794" cy="422607"/>
+          </a:xfrm>
+          <a:prstGeom prst="bentConnector3">
+            <a:avLst>
+              <a:gd name="adj1" fmla="val 50000"/>
+            </a:avLst>
+          </a:prstGeom>
+          <a:ln w="28575">
+            <a:tailEnd type="triangle"/>
+          </a:ln>
+        </p:spPr>
+        <p:style>
+          <a:lnRef idx="1">
+            <a:schemeClr val="dk1"/>
+          </a:lnRef>
+          <a:fillRef idx="0">
+            <a:schemeClr val="dk1"/>
+          </a:fillRef>
+          <a:effectRef idx="0">
+            <a:schemeClr val="dk1"/>
+          </a:effectRef>
+          <a:fontRef idx="minor">
+            <a:schemeClr val="tx1"/>
+          </a:fontRef>
+        </p:style>
+      </p:cxnSp>
+      <p:sp>
+        <p:nvSpPr>
+          <p:cNvPr id="106" name="Rectangle 105">
+            <a:extLst>
+              <a:ext uri="{FF2B5EF4-FFF2-40B4-BE49-F238E27FC236}">
+                <a16:creationId xmlns:a16="http://schemas.microsoft.com/office/drawing/2014/main" id="{088DE489-0D75-4452-A901-7FA176F25795}"/>
+              </a:ext>
+            </a:extLst>
+          </p:cNvPr>
+          <p:cNvSpPr/>
+          <p:nvPr/>
+        </p:nvSpPr>
+        <p:spPr>
+          <a:xfrm>
+            <a:off x="3523523" y="4632600"/>
+            <a:ext cx="1260737" cy="583726"/>
+          </a:xfrm>
+          <a:prstGeom prst="rect">
+            <a:avLst/>
+          </a:prstGeom>
+          <a:solidFill>
+            <a:srgbClr val="FF0000">
+              <a:alpha val="41176"/>
+            </a:srgbClr>
+          </a:solidFill>
+          <a:ln w="9525" cap="flat" cmpd="sng" algn="ctr">
+            <a:solidFill>
+              <a:schemeClr val="bg1"/>
+            </a:solidFill>
+            <a:prstDash val="solid"/>
+            <a:round/>
+            <a:headEnd type="none" w="med" len="med"/>
+            <a:tailEnd type="none" w="med" len="med"/>
+          </a:ln>
+        </p:spPr>
+        <p:style>
+          <a:lnRef idx="0">
+            <a:scrgbClr r="0" g="0" b="0"/>
+          </a:lnRef>
+          <a:fillRef idx="0">
+            <a:scrgbClr r="0" g="0" b="0"/>
+          </a:fillRef>
+          <a:effectRef idx="0">
+            <a:scrgbClr r="0" g="0" b="0"/>
+          </a:effectRef>
+          <a:fontRef idx="minor">
+            <a:schemeClr val="dk1"/>
+          </a:fontRef>
+        </p:style>
+        <p:txBody>
+          <a:bodyPr rot="0" spcFirstLastPara="0" vertOverflow="overflow" horzOverflow="overflow" vert="horz" wrap="square" lIns="68580" tIns="34290" rIns="68580" bIns="34290" numCol="1" spcCol="0" rtlCol="0" fromWordArt="0" anchor="ctr" anchorCtr="0" forceAA="0" compatLnSpc="1">
+            <a:prstTxWarp prst="textNoShape">
+              <a:avLst/>
+            </a:prstTxWarp>
+            <a:noAutofit/>
+          </a:bodyPr>
+          <a:lstStyle/>
+          <a:p>
+            <a:pPr algn="ctr"/>
+            <a:r>
+              <a:rPr lang="en-CA" sz="1200" dirty="0"/>
+              <a:t>tweets vs. physical protests</a:t>
+            </a:r>
+          </a:p>
+        </p:txBody>
+      </p:sp>
+      <p:sp>
+        <p:nvSpPr>
+          <p:cNvPr id="107" name="Rectangle 106">
+            <a:extLst>
+              <a:ext uri="{FF2B5EF4-FFF2-40B4-BE49-F238E27FC236}">
+                <a16:creationId xmlns:a16="http://schemas.microsoft.com/office/drawing/2014/main" id="{1CA47ADA-53DA-4950-AC62-80BDD6742410}"/>
+              </a:ext>
+            </a:extLst>
+          </p:cNvPr>
+          <p:cNvSpPr/>
+          <p:nvPr/>
+        </p:nvSpPr>
+        <p:spPr>
+          <a:xfrm>
+            <a:off x="6133269" y="4636691"/>
+            <a:ext cx="1518577" cy="583726"/>
+          </a:xfrm>
+          <a:prstGeom prst="rect">
+            <a:avLst/>
+          </a:prstGeom>
+          <a:solidFill>
+            <a:srgbClr val="FF0000">
+              <a:alpha val="41176"/>
+            </a:srgbClr>
+          </a:solidFill>
+          <a:ln w="9525" cap="flat" cmpd="sng" algn="ctr">
+            <a:solidFill>
+              <a:schemeClr val="bg1"/>
+            </a:solidFill>
+            <a:prstDash val="solid"/>
+            <a:round/>
+            <a:headEnd type="none" w="med" len="med"/>
+            <a:tailEnd type="none" w="med" len="med"/>
+          </a:ln>
+        </p:spPr>
+        <p:style>
+          <a:lnRef idx="0">
+            <a:scrgbClr r="0" g="0" b="0"/>
+          </a:lnRef>
+          <a:fillRef idx="0">
+            <a:scrgbClr r="0" g="0" b="0"/>
+          </a:fillRef>
+          <a:effectRef idx="0">
+            <a:scrgbClr r="0" g="0" b="0"/>
+          </a:effectRef>
+          <a:fontRef idx="minor">
+            <a:schemeClr val="dk1"/>
+          </a:fontRef>
+        </p:style>
+        <p:txBody>
+          <a:bodyPr rot="0" spcFirstLastPara="0" vertOverflow="overflow" horzOverflow="overflow" vert="horz" wrap="square" lIns="68580" tIns="34290" rIns="68580" bIns="34290" numCol="1" spcCol="0" rtlCol="0" fromWordArt="0" anchor="ctr" anchorCtr="0" forceAA="0" compatLnSpc="1">
+            <a:prstTxWarp prst="textNoShape">
+              <a:avLst/>
+            </a:prstTxWarp>
+            <a:noAutofit/>
+          </a:bodyPr>
+          <a:lstStyle/>
+          <a:p>
+            <a:pPr algn="ctr"/>
+            <a:r>
+              <a:rPr lang="en-CA" sz="1200" dirty="0"/>
+              <a:t>tweets vs. legislation count</a:t>
+            </a:r>
+          </a:p>
+        </p:txBody>
+      </p:sp>
+      <p:cxnSp>
+        <p:nvCxnSpPr>
+          <p:cNvPr id="108" name="Connector: Elbow 107">
+            <a:extLst>
+              <a:ext uri="{FF2B5EF4-FFF2-40B4-BE49-F238E27FC236}">
+                <a16:creationId xmlns:a16="http://schemas.microsoft.com/office/drawing/2014/main" id="{0B5D6A79-1D8F-4254-B50C-6178D096E616}"/>
+              </a:ext>
+            </a:extLst>
+          </p:cNvPr>
+          <p:cNvCxnSpPr>
+            <a:cxnSpLocks/>
+            <a:stCxn id="76" idx="2"/>
+            <a:endCxn id="79" idx="3"/>
+          </p:cNvCxnSpPr>
+          <p:nvPr/>
+        </p:nvCxnSpPr>
+        <p:spPr>
+          <a:xfrm rot="16200000" flipH="1">
+            <a:off x="8722742" y="3633500"/>
+            <a:ext cx="2084364" cy="518065"/>
+          </a:xfrm>
+          <a:prstGeom prst="bentConnector4">
+            <a:avLst>
+              <a:gd name="adj1" fmla="val 77378"/>
+              <a:gd name="adj2" fmla="val 153140"/>
+            </a:avLst>
+          </a:prstGeom>
+          <a:ln w="28575">
+            <a:tailEnd type="triangle"/>
+          </a:ln>
+        </p:spPr>
+        <p:style>
+          <a:lnRef idx="1">
+            <a:schemeClr val="dk1"/>
+          </a:lnRef>
+          <a:fillRef idx="0">
+            <a:schemeClr val="dk1"/>
+          </a:fillRef>
+          <a:effectRef idx="0">
+            <a:schemeClr val="dk1"/>
+          </a:effectRef>
+          <a:fontRef idx="minor">
+            <a:schemeClr val="tx1"/>
+          </a:fontRef>
+        </p:style>
+      </p:cxnSp>
+      <p:cxnSp>
+        <p:nvCxnSpPr>
+          <p:cNvPr id="110" name="Connector: Elbow 109">
+            <a:extLst>
+              <a:ext uri="{FF2B5EF4-FFF2-40B4-BE49-F238E27FC236}">
+                <a16:creationId xmlns:a16="http://schemas.microsoft.com/office/drawing/2014/main" id="{23107793-954F-4511-90B9-77121D6D2DC9}"/>
+              </a:ext>
+            </a:extLst>
+          </p:cNvPr>
+          <p:cNvCxnSpPr>
+            <a:cxnSpLocks/>
+            <a:stCxn id="69" idx="2"/>
+            <a:endCxn id="76" idx="0"/>
+          </p:cNvCxnSpPr>
+          <p:nvPr/>
+        </p:nvCxnSpPr>
+        <p:spPr>
+          <a:xfrm rot="16200000" flipH="1">
+            <a:off x="7660098" y="418205"/>
+            <a:ext cx="369448" cy="3322139"/>
+          </a:xfrm>
+          <a:prstGeom prst="bentConnector3">
+            <a:avLst>
+              <a:gd name="adj1" fmla="val 50000"/>
+            </a:avLst>
+          </a:prstGeom>
+          <a:ln w="28575">
+            <a:tailEnd type="triangle"/>
+          </a:ln>
+        </p:spPr>
+        <p:style>
+          <a:lnRef idx="1">
+            <a:schemeClr val="dk1"/>
+          </a:lnRef>
+          <a:fillRef idx="0">
+            <a:schemeClr val="dk1"/>
+          </a:fillRef>
+          <a:effectRef idx="0">
+            <a:schemeClr val="dk1"/>
+          </a:effectRef>
+          <a:fontRef idx="minor">
+            <a:schemeClr val="tx1"/>
+          </a:fontRef>
+        </p:style>
+      </p:cxnSp>
+      <p:cxnSp>
+        <p:nvCxnSpPr>
+          <p:cNvPr id="111" name="Connector: Elbow 110">
+            <a:extLst>
+              <a:ext uri="{FF2B5EF4-FFF2-40B4-BE49-F238E27FC236}">
+                <a16:creationId xmlns:a16="http://schemas.microsoft.com/office/drawing/2014/main" id="{4EBD692C-F496-4DDA-8E68-A0490FB9A6C3}"/>
+              </a:ext>
+            </a:extLst>
+          </p:cNvPr>
+          <p:cNvCxnSpPr>
+            <a:cxnSpLocks/>
+            <a:stCxn id="76" idx="2"/>
+            <a:endCxn id="107" idx="0"/>
+          </p:cNvCxnSpPr>
+          <p:nvPr/>
+        </p:nvCxnSpPr>
+        <p:spPr>
+          <a:xfrm rot="5400000">
+            <a:off x="7306056" y="2436854"/>
+            <a:ext cx="1786341" cy="2613335"/>
+          </a:xfrm>
+          <a:prstGeom prst="bentConnector3">
+            <a:avLst>
+              <a:gd name="adj1" fmla="val 90114"/>
+            </a:avLst>
+          </a:prstGeom>
+          <a:ln w="28575">
+            <a:tailEnd type="triangle"/>
+          </a:ln>
+        </p:spPr>
+        <p:style>
+          <a:lnRef idx="1">
+            <a:schemeClr val="dk1"/>
+          </a:lnRef>
+          <a:fillRef idx="0">
+            <a:schemeClr val="dk1"/>
+          </a:fillRef>
+          <a:effectRef idx="0">
+            <a:schemeClr val="dk1"/>
+          </a:effectRef>
+          <a:fontRef idx="minor">
+            <a:schemeClr val="tx1"/>
+          </a:fontRef>
+        </p:style>
+      </p:cxnSp>
+      <p:cxnSp>
+        <p:nvCxnSpPr>
+          <p:cNvPr id="115" name="Connector: Elbow 114">
+            <a:extLst>
+              <a:ext uri="{FF2B5EF4-FFF2-40B4-BE49-F238E27FC236}">
+                <a16:creationId xmlns:a16="http://schemas.microsoft.com/office/drawing/2014/main" id="{105BE76C-7531-4567-8378-A8B9973A4A0C}"/>
+              </a:ext>
+            </a:extLst>
+          </p:cNvPr>
+          <p:cNvCxnSpPr>
+            <a:cxnSpLocks/>
+          </p:cNvCxnSpPr>
+          <p:nvPr/>
+        </p:nvCxnSpPr>
+        <p:spPr>
+          <a:xfrm rot="5400000">
+            <a:off x="4793853" y="4246129"/>
+            <a:ext cx="664345" cy="701114"/>
+          </a:xfrm>
+          <a:prstGeom prst="bentConnector2">
+            <a:avLst/>
+          </a:prstGeom>
+          <a:ln w="28575">
+            <a:tailEnd type="triangle"/>
+          </a:ln>
+        </p:spPr>
+        <p:style>
+          <a:lnRef idx="1">
+            <a:schemeClr val="dk1"/>
+          </a:lnRef>
+          <a:fillRef idx="0">
+            <a:schemeClr val="dk1"/>
+          </a:fillRef>
+          <a:effectRef idx="0">
+            <a:schemeClr val="dk1"/>
+          </a:effectRef>
+          <a:fontRef idx="minor">
+            <a:schemeClr val="tx1"/>
+          </a:fontRef>
+        </p:style>
+      </p:cxnSp>
+      <p:cxnSp>
+        <p:nvCxnSpPr>
+          <p:cNvPr id="118" name="Connector: Elbow 117">
+            <a:extLst>
+              <a:ext uri="{FF2B5EF4-FFF2-40B4-BE49-F238E27FC236}">
+                <a16:creationId xmlns:a16="http://schemas.microsoft.com/office/drawing/2014/main" id="{7AB97673-7C09-4FBD-AF9A-59B953328AB4}"/>
+              </a:ext>
+            </a:extLst>
+          </p:cNvPr>
+          <p:cNvCxnSpPr>
+            <a:cxnSpLocks/>
+          </p:cNvCxnSpPr>
+          <p:nvPr/>
+        </p:nvCxnSpPr>
+        <p:spPr>
+          <a:xfrm rot="16200000" flipH="1">
+            <a:off x="5338004" y="4128892"/>
+            <a:ext cx="938917" cy="651614"/>
+          </a:xfrm>
+          <a:prstGeom prst="bentConnector2">
+            <a:avLst/>
+          </a:prstGeom>
+          <a:ln w="28575">
+            <a:tailEnd type="triangle"/>
+          </a:ln>
+        </p:spPr>
+        <p:style>
+          <a:lnRef idx="1">
+            <a:schemeClr val="dk1"/>
+          </a:lnRef>
+          <a:fillRef idx="0">
+            <a:schemeClr val="dk1"/>
+          </a:fillRef>
+          <a:effectRef idx="0">
+            <a:schemeClr val="dk1"/>
+          </a:effectRef>
+          <a:fontRef idx="minor">
+            <a:schemeClr val="tx1"/>
+          </a:fontRef>
+        </p:style>
+      </p:cxnSp>
+      <p:sp>
+        <p:nvSpPr>
+          <p:cNvPr id="119" name="Rectangle 118">
+            <a:extLst>
+              <a:ext uri="{FF2B5EF4-FFF2-40B4-BE49-F238E27FC236}">
+                <a16:creationId xmlns:a16="http://schemas.microsoft.com/office/drawing/2014/main" id="{8678CBDC-C7CD-49CA-B29C-262F87739020}"/>
+              </a:ext>
+            </a:extLst>
+          </p:cNvPr>
+          <p:cNvSpPr/>
+          <p:nvPr/>
+        </p:nvSpPr>
+        <p:spPr>
+          <a:xfrm>
+            <a:off x="4901524" y="3359949"/>
+            <a:ext cx="1160259" cy="583726"/>
+          </a:xfrm>
+          <a:prstGeom prst="rect">
+            <a:avLst/>
+          </a:prstGeom>
+          <a:solidFill>
+            <a:schemeClr val="accent5">
+              <a:lumMod val="20000"/>
+              <a:lumOff val="80000"/>
+            </a:schemeClr>
+          </a:solidFill>
+          <a:ln w="9525" cap="flat" cmpd="sng" algn="ctr">
+            <a:solidFill>
+              <a:schemeClr val="bg1"/>
+            </a:solidFill>
+            <a:prstDash val="solid"/>
+            <a:round/>
+            <a:headEnd type="none" w="med" len="med"/>
+            <a:tailEnd type="none" w="med" len="med"/>
+          </a:ln>
+        </p:spPr>
+        <p:style>
+          <a:lnRef idx="0">
+            <a:scrgbClr r="0" g="0" b="0"/>
+          </a:lnRef>
+          <a:fillRef idx="0">
+            <a:scrgbClr r="0" g="0" b="0"/>
+          </a:fillRef>
+          <a:effectRef idx="0">
+            <a:scrgbClr r="0" g="0" b="0"/>
+          </a:effectRef>
+          <a:fontRef idx="minor">
+            <a:schemeClr val="dk1"/>
+          </a:fontRef>
+        </p:style>
+        <p:txBody>
+          <a:bodyPr rot="0" spcFirstLastPara="0" vertOverflow="overflow" horzOverflow="overflow" vert="horz" wrap="square" lIns="68580" tIns="34290" rIns="68580" bIns="34290" numCol="1" spcCol="0" rtlCol="0" fromWordArt="0" anchor="ctr" anchorCtr="0" forceAA="0" compatLnSpc="1">
+            <a:prstTxWarp prst="textNoShape">
+              <a:avLst/>
+            </a:prstTxWarp>
+            <a:noAutofit/>
+          </a:bodyPr>
+          <a:lstStyle/>
+          <a:p>
+            <a:pPr algn="ctr"/>
+            <a:r>
+              <a:rPr lang="en-CA" sz="1200" dirty="0"/>
+              <a:t>Correlated time series analysis</a:t>
+            </a:r>
+          </a:p>
+        </p:txBody>
+      </p:sp>
+      <p:sp>
+        <p:nvSpPr>
+          <p:cNvPr id="120" name="Rectangle 119">
+            <a:extLst>
+              <a:ext uri="{FF2B5EF4-FFF2-40B4-BE49-F238E27FC236}">
+                <a16:creationId xmlns:a16="http://schemas.microsoft.com/office/drawing/2014/main" id="{048177DD-C998-45C7-A046-D800B5ABC960}"/>
+              </a:ext>
+            </a:extLst>
+          </p:cNvPr>
+          <p:cNvSpPr/>
+          <p:nvPr/>
+        </p:nvSpPr>
+        <p:spPr>
+          <a:xfrm>
+            <a:off x="6129548" y="3352512"/>
+            <a:ext cx="786314" cy="583726"/>
+          </a:xfrm>
+          <a:prstGeom prst="rect">
+            <a:avLst/>
+          </a:prstGeom>
+          <a:solidFill>
+            <a:schemeClr val="accent5">
+              <a:lumMod val="20000"/>
+              <a:lumOff val="80000"/>
+            </a:schemeClr>
+          </a:solidFill>
+          <a:ln w="9525" cap="flat" cmpd="sng" algn="ctr">
+            <a:solidFill>
+              <a:schemeClr val="bg1"/>
+            </a:solidFill>
+            <a:prstDash val="solid"/>
+            <a:round/>
+            <a:headEnd type="none" w="med" len="med"/>
+            <a:tailEnd type="none" w="med" len="med"/>
+          </a:ln>
+        </p:spPr>
+        <p:style>
+          <a:lnRef idx="0">
+            <a:scrgbClr r="0" g="0" b="0"/>
+          </a:lnRef>
+          <a:fillRef idx="0">
+            <a:scrgbClr r="0" g="0" b="0"/>
+          </a:fillRef>
+          <a:effectRef idx="0">
+            <a:scrgbClr r="0" g="0" b="0"/>
+          </a:effectRef>
+          <a:fontRef idx="minor">
+            <a:schemeClr val="dk1"/>
+          </a:fontRef>
+        </p:style>
+        <p:txBody>
+          <a:bodyPr rot="0" spcFirstLastPara="0" vertOverflow="overflow" horzOverflow="overflow" vert="horz" wrap="square" lIns="68580" tIns="34290" rIns="68580" bIns="34290" numCol="1" spcCol="0" rtlCol="0" fromWordArt="0" anchor="ctr" anchorCtr="0" forceAA="0" compatLnSpc="1">
+            <a:prstTxWarp prst="textNoShape">
+              <a:avLst/>
+            </a:prstTxWarp>
+            <a:noAutofit/>
+          </a:bodyPr>
+          <a:lstStyle/>
+          <a:p>
+            <a:pPr algn="ctr"/>
+            <a:r>
+              <a:rPr lang="en-CA" sz="900" dirty="0"/>
+              <a:t>TLCC + Granger causality</a:t>
+            </a:r>
+          </a:p>
+        </p:txBody>
+      </p:sp>
+      <p:cxnSp>
+        <p:nvCxnSpPr>
+          <p:cNvPr id="121" name="Connector: Elbow 120">
+            <a:extLst>
+              <a:ext uri="{FF2B5EF4-FFF2-40B4-BE49-F238E27FC236}">
+                <a16:creationId xmlns:a16="http://schemas.microsoft.com/office/drawing/2014/main" id="{9BDBFF1D-55E6-4C05-A921-2292988E3E47}"/>
+              </a:ext>
+            </a:extLst>
+          </p:cNvPr>
+          <p:cNvCxnSpPr>
+            <a:cxnSpLocks/>
+            <a:stCxn id="119" idx="2"/>
+            <a:endCxn id="120" idx="2"/>
+          </p:cNvCxnSpPr>
+          <p:nvPr/>
+        </p:nvCxnSpPr>
+        <p:spPr>
+          <a:xfrm rot="5400000" flipH="1" flipV="1">
+            <a:off x="5998461" y="3419431"/>
+            <a:ext cx="7437" cy="1041052"/>
+          </a:xfrm>
+          <a:prstGeom prst="bentConnector3">
+            <a:avLst>
+              <a:gd name="adj1" fmla="val -1832473"/>
+            </a:avLst>
+          </a:prstGeom>
+          <a:ln w="28575">
+            <a:tailEnd type="triangle"/>
+          </a:ln>
+        </p:spPr>
+        <p:style>
+          <a:lnRef idx="1">
+            <a:schemeClr val="dk1"/>
+          </a:lnRef>
+          <a:fillRef idx="0">
+            <a:schemeClr val="dk1"/>
+          </a:fillRef>
+          <a:effectRef idx="0">
+            <a:schemeClr val="dk1"/>
+          </a:effectRef>
+          <a:fontRef idx="minor">
+            <a:schemeClr val="tx1"/>
+          </a:fontRef>
+        </p:style>
+      </p:cxnSp>
+      <p:pic>
+        <p:nvPicPr>
+          <p:cNvPr id="63" name="Picture 62" descr="Icon&#10;&#10;Description automatically generated">
+            <a:extLst>
+              <a:ext uri="{FF2B5EF4-FFF2-40B4-BE49-F238E27FC236}">
+                <a16:creationId xmlns:a16="http://schemas.microsoft.com/office/drawing/2014/main" id="{5D5373B3-305B-48AA-B9DA-1B9BD141BF43}"/>
+              </a:ext>
+            </a:extLst>
+          </p:cNvPr>
+          <p:cNvPicPr>
+            <a:picLocks noChangeAspect="1"/>
+          </p:cNvPicPr>
+          <p:nvPr/>
+        </p:nvPicPr>
+        <p:blipFill>
+          <a:blip r:embed="rId2">
+            <a:extLst>
+              <a:ext uri="{28A0092B-C50C-407E-A947-70E740481C1C}">
+                <a14:useLocalDpi xmlns:a14="http://schemas.microsoft.com/office/drawing/2010/main" val="0"/>
+              </a:ext>
+            </a:extLst>
+          </a:blip>
+          <a:stretch>
+            <a:fillRect/>
+          </a:stretch>
+        </p:blipFill>
+        <p:spPr>
+          <a:xfrm>
+            <a:off x="1715688" y="2422472"/>
+            <a:ext cx="241427" cy="241427"/>
+          </a:xfrm>
+          <a:prstGeom prst="rect">
+            <a:avLst/>
+          </a:prstGeom>
+        </p:spPr>
+      </p:pic>
+      <p:pic>
+        <p:nvPicPr>
+          <p:cNvPr id="67" name="Picture 66" descr="Icon&#10;&#10;Description automatically generated">
+            <a:extLst>
+              <a:ext uri="{FF2B5EF4-FFF2-40B4-BE49-F238E27FC236}">
+                <a16:creationId xmlns:a16="http://schemas.microsoft.com/office/drawing/2014/main" id="{2211E549-44AF-4BCD-8E27-6055438AAB38}"/>
+              </a:ext>
+            </a:extLst>
+          </p:cNvPr>
+          <p:cNvPicPr>
+            <a:picLocks noChangeAspect="1"/>
+          </p:cNvPicPr>
+          <p:nvPr/>
+        </p:nvPicPr>
+        <p:blipFill>
+          <a:blip r:embed="rId2">
+            <a:extLst>
+              <a:ext uri="{28A0092B-C50C-407E-A947-70E740481C1C}">
+                <a14:useLocalDpi xmlns:a14="http://schemas.microsoft.com/office/drawing/2010/main" val="0"/>
+              </a:ext>
+            </a:extLst>
+          </a:blip>
+          <a:stretch>
+            <a:fillRect/>
+          </a:stretch>
+        </p:blipFill>
+        <p:spPr>
+          <a:xfrm>
+            <a:off x="1712757" y="3506753"/>
+            <a:ext cx="241427" cy="241427"/>
+          </a:xfrm>
+          <a:prstGeom prst="rect">
+            <a:avLst/>
+          </a:prstGeom>
+        </p:spPr>
+      </p:pic>
+      <p:pic>
+        <p:nvPicPr>
+          <p:cNvPr id="71" name="Picture 70" descr="Icon&#10;&#10;Description automatically generated">
+            <a:extLst>
+              <a:ext uri="{FF2B5EF4-FFF2-40B4-BE49-F238E27FC236}">
+                <a16:creationId xmlns:a16="http://schemas.microsoft.com/office/drawing/2014/main" id="{988DC0DF-466C-42EA-852F-D51024F0B0ED}"/>
+              </a:ext>
+            </a:extLst>
+          </p:cNvPr>
+          <p:cNvPicPr>
+            <a:picLocks noChangeAspect="1"/>
+          </p:cNvPicPr>
+          <p:nvPr/>
+        </p:nvPicPr>
+        <p:blipFill>
+          <a:blip r:embed="rId2">
+            <a:extLst>
+              <a:ext uri="{28A0092B-C50C-407E-A947-70E740481C1C}">
+                <a14:useLocalDpi xmlns:a14="http://schemas.microsoft.com/office/drawing/2010/main" val="0"/>
+              </a:ext>
+            </a:extLst>
+          </a:blip>
+          <a:stretch>
+            <a:fillRect/>
+          </a:stretch>
+        </p:blipFill>
+        <p:spPr>
+          <a:xfrm>
+            <a:off x="1712757" y="4797092"/>
+            <a:ext cx="241427" cy="241427"/>
+          </a:xfrm>
+          <a:prstGeom prst="rect">
+            <a:avLst/>
+          </a:prstGeom>
+        </p:spPr>
+      </p:pic>
+      <p:pic>
+        <p:nvPicPr>
+          <p:cNvPr id="91" name="Picture 90" descr="Icon&#10;&#10;Description automatically generated">
+            <a:extLst>
+              <a:ext uri="{FF2B5EF4-FFF2-40B4-BE49-F238E27FC236}">
+                <a16:creationId xmlns:a16="http://schemas.microsoft.com/office/drawing/2014/main" id="{658473FF-AA5E-45AD-884B-FED892052841}"/>
+              </a:ext>
+            </a:extLst>
+          </p:cNvPr>
+          <p:cNvPicPr>
+            <a:picLocks noChangeAspect="1"/>
+          </p:cNvPicPr>
+          <p:nvPr/>
+        </p:nvPicPr>
+        <p:blipFill>
+          <a:blip r:embed="rId2">
+            <a:extLst>
+              <a:ext uri="{28A0092B-C50C-407E-A947-70E740481C1C}">
+                <a14:useLocalDpi xmlns:a14="http://schemas.microsoft.com/office/drawing/2010/main" val="0"/>
+              </a:ext>
+            </a:extLst>
+          </a:blip>
+          <a:stretch>
+            <a:fillRect/>
+          </a:stretch>
+        </p:blipFill>
+        <p:spPr>
+          <a:xfrm>
+            <a:off x="8747659" y="5932443"/>
+            <a:ext cx="241427" cy="241427"/>
+          </a:xfrm>
+          <a:prstGeom prst="rect">
+            <a:avLst/>
+          </a:prstGeom>
+        </p:spPr>
+      </p:pic>
+      <p:sp>
+        <p:nvSpPr>
+          <p:cNvPr id="3" name="TextBox 2">
+            <a:extLst>
+              <a:ext uri="{FF2B5EF4-FFF2-40B4-BE49-F238E27FC236}">
+                <a16:creationId xmlns:a16="http://schemas.microsoft.com/office/drawing/2014/main" id="{28B032CD-EC5A-482E-B3AD-CC8F543CA39B}"/>
+              </a:ext>
+            </a:extLst>
+          </p:cNvPr>
+          <p:cNvSpPr txBox="1"/>
+          <p:nvPr/>
+        </p:nvSpPr>
+        <p:spPr>
+          <a:xfrm>
+            <a:off x="8871304" y="5914656"/>
+            <a:ext cx="1621293" cy="276999"/>
+          </a:xfrm>
+          <a:prstGeom prst="rect">
+            <a:avLst/>
+          </a:prstGeom>
+          <a:noFill/>
+        </p:spPr>
+        <p:txBody>
+          <a:bodyPr wrap="square" rtlCol="0">
+            <a:spAutoFit/>
+          </a:bodyPr>
+          <a:lstStyle/>
+          <a:p>
+            <a:pPr algn="ctr">
+              <a:defRPr/>
+            </a:pPr>
+            <a:r>
+              <a:rPr lang="en-CA" sz="1200" b="1" dirty="0">
+                <a:solidFill>
+                  <a:prstClr val="black"/>
+                </a:solidFill>
+                <a:latin typeface="Calibri" panose="020F0502020204030204"/>
+              </a:rPr>
+              <a:t>= Geospatial Analysis</a:t>
+            </a:r>
+          </a:p>
+        </p:txBody>
+      </p:sp>
+      <p:sp>
+        <p:nvSpPr>
+          <p:cNvPr id="117" name="TextBox 116">
+            <a:extLst>
+              <a:ext uri="{FF2B5EF4-FFF2-40B4-BE49-F238E27FC236}">
+                <a16:creationId xmlns:a16="http://schemas.microsoft.com/office/drawing/2014/main" id="{64E3B00E-A379-439D-B67B-DD1B355ECEB8}"/>
+              </a:ext>
+            </a:extLst>
+          </p:cNvPr>
+          <p:cNvSpPr txBox="1"/>
+          <p:nvPr/>
+        </p:nvSpPr>
+        <p:spPr>
+          <a:xfrm>
+            <a:off x="10644619" y="2985563"/>
+            <a:ext cx="758358" cy="338554"/>
+          </a:xfrm>
+          <a:prstGeom prst="rect">
+            <a:avLst/>
+          </a:prstGeom>
+          <a:noFill/>
+        </p:spPr>
+        <p:txBody>
+          <a:bodyPr wrap="square">
+            <a:spAutoFit/>
+          </a:bodyPr>
+          <a:lstStyle/>
+          <a:p>
+            <a:pPr algn="ctr"/>
+            <a:r>
+              <a:rPr lang="en-CA" sz="1600" b="1" dirty="0"/>
+              <a:t>TIME</a:t>
+            </a:r>
+            <a:endParaRPr lang="en-CA" sz="1200" b="1" dirty="0"/>
+          </a:p>
+        </p:txBody>
+      </p:sp>
+      <p:cxnSp>
+        <p:nvCxnSpPr>
+          <p:cNvPr id="126" name="Straight Arrow Connector 125">
+            <a:extLst>
+              <a:ext uri="{FF2B5EF4-FFF2-40B4-BE49-F238E27FC236}">
+                <a16:creationId xmlns:a16="http://schemas.microsoft.com/office/drawing/2014/main" id="{AB6E53B4-87E1-4CA1-8C4B-FD0F3ABF450B}"/>
+              </a:ext>
+            </a:extLst>
+          </p:cNvPr>
+          <p:cNvCxnSpPr>
+            <a:cxnSpLocks/>
+          </p:cNvCxnSpPr>
+          <p:nvPr/>
+        </p:nvCxnSpPr>
+        <p:spPr>
+          <a:xfrm>
+            <a:off x="11029555" y="4586093"/>
+            <a:ext cx="0" cy="884784"/>
+          </a:xfrm>
+          <a:prstGeom prst="straightConnector1">
+            <a:avLst/>
+          </a:prstGeom>
+          <a:ln w="127000">
+            <a:solidFill>
+              <a:srgbClr val="F2B8BE"/>
+            </a:solidFill>
+            <a:prstDash val="solid"/>
+            <a:tailEnd type="triangle"/>
+          </a:ln>
+        </p:spPr>
+        <p:style>
+          <a:lnRef idx="1">
+            <a:schemeClr val="dk1"/>
+          </a:lnRef>
+          <a:fillRef idx="0">
+            <a:schemeClr val="dk1"/>
+          </a:fillRef>
+          <a:effectRef idx="0">
+            <a:schemeClr val="dk1"/>
+          </a:effectRef>
+          <a:fontRef idx="minor">
+            <a:schemeClr val="tx1"/>
+          </a:fontRef>
+        </p:style>
+      </p:cxnSp>
+      <p:sp>
+        <p:nvSpPr>
+          <p:cNvPr id="127" name="TextBox 126">
+            <a:extLst>
+              <a:ext uri="{FF2B5EF4-FFF2-40B4-BE49-F238E27FC236}">
+                <a16:creationId xmlns:a16="http://schemas.microsoft.com/office/drawing/2014/main" id="{29ED0092-79C9-4586-8CDA-CE50CC0FDFDC}"/>
+              </a:ext>
+            </a:extLst>
+          </p:cNvPr>
+          <p:cNvSpPr txBox="1"/>
+          <p:nvPr/>
+        </p:nvSpPr>
+        <p:spPr>
+          <a:xfrm>
+            <a:off x="10492597" y="4279895"/>
+            <a:ext cx="1068902" cy="338554"/>
+          </a:xfrm>
+          <a:prstGeom prst="rect">
+            <a:avLst/>
+          </a:prstGeom>
+          <a:noFill/>
+        </p:spPr>
+        <p:txBody>
+          <a:bodyPr wrap="square">
+            <a:spAutoFit/>
+          </a:bodyPr>
+          <a:lstStyle/>
+          <a:p>
+            <a:pPr algn="ctr"/>
+            <a:r>
+              <a:rPr lang="en-CA" sz="1600" b="1" dirty="0"/>
+              <a:t>RELATION</a:t>
+            </a:r>
+            <a:endParaRPr lang="en-CA" sz="1200" b="1" dirty="0"/>
+          </a:p>
+        </p:txBody>
+      </p:sp>
+      <p:cxnSp>
+        <p:nvCxnSpPr>
+          <p:cNvPr id="128" name="Straight Arrow Connector 127">
+            <a:extLst>
+              <a:ext uri="{FF2B5EF4-FFF2-40B4-BE49-F238E27FC236}">
+                <a16:creationId xmlns:a16="http://schemas.microsoft.com/office/drawing/2014/main" id="{C0983F57-26BA-4782-B8EC-22604B0CAD1B}"/>
+              </a:ext>
+            </a:extLst>
+          </p:cNvPr>
+          <p:cNvCxnSpPr>
+            <a:cxnSpLocks/>
+            <a:stCxn id="129" idx="2"/>
+          </p:cNvCxnSpPr>
+          <p:nvPr/>
+        </p:nvCxnSpPr>
+        <p:spPr>
+          <a:xfrm flipH="1">
+            <a:off x="1293768" y="2543185"/>
+            <a:ext cx="862" cy="2927692"/>
+          </a:xfrm>
+          <a:prstGeom prst="straightConnector1">
+            <a:avLst/>
+          </a:prstGeom>
+          <a:ln w="127000">
+            <a:solidFill>
+              <a:srgbClr val="E7E6E6"/>
+            </a:solidFill>
+            <a:prstDash val="solid"/>
+            <a:tailEnd type="triangle"/>
+          </a:ln>
+        </p:spPr>
+        <p:style>
+          <a:lnRef idx="1">
+            <a:schemeClr val="dk1"/>
+          </a:lnRef>
+          <a:fillRef idx="0">
+            <a:schemeClr val="dk1"/>
+          </a:fillRef>
+          <a:effectRef idx="0">
+            <a:schemeClr val="dk1"/>
+          </a:effectRef>
+          <a:fontRef idx="minor">
+            <a:schemeClr val="tx1"/>
+          </a:fontRef>
+        </p:style>
+      </p:cxnSp>
+      <p:sp>
+        <p:nvSpPr>
+          <p:cNvPr id="129" name="TextBox 128">
+            <a:extLst>
+              <a:ext uri="{FF2B5EF4-FFF2-40B4-BE49-F238E27FC236}">
+                <a16:creationId xmlns:a16="http://schemas.microsoft.com/office/drawing/2014/main" id="{6DF765A0-0979-4602-90C3-4FEDA8EFA969}"/>
+              </a:ext>
+            </a:extLst>
+          </p:cNvPr>
+          <p:cNvSpPr txBox="1"/>
+          <p:nvPr/>
+        </p:nvSpPr>
+        <p:spPr>
+          <a:xfrm>
+            <a:off x="915451" y="2204631"/>
+            <a:ext cx="758358" cy="338554"/>
+          </a:xfrm>
+          <a:prstGeom prst="rect">
+            <a:avLst/>
+          </a:prstGeom>
+          <a:noFill/>
+        </p:spPr>
+        <p:txBody>
+          <a:bodyPr wrap="square">
+            <a:spAutoFit/>
+          </a:bodyPr>
+          <a:lstStyle/>
+          <a:p>
+            <a:pPr algn="ctr"/>
+            <a:r>
+              <a:rPr lang="en-CA" sz="1600" b="1" dirty="0"/>
+              <a:t>SPACE</a:t>
+            </a:r>
+            <a:endParaRPr lang="en-CA" sz="1200" b="1" dirty="0"/>
+          </a:p>
+        </p:txBody>
+      </p:sp>
+    </p:spTree>
+    <p:extLst>
+      <p:ext uri="{BB962C8B-B14F-4D97-AF65-F5344CB8AC3E}">
+        <p14:creationId xmlns:p14="http://schemas.microsoft.com/office/powerpoint/2010/main" val="3797838532"/>
       </p:ext>
     </p:extLst>
   </p:cSld>

</xml_diff>